<commit_message>
added a template for documentation
</commit_message>
<xml_diff>
--- a/resources/icons.pptx
+++ b/resources/icons.pptx
@@ -3407,1066 +3407,164 @@
           <a:chExt cx="0" cy="0"/>
         </a:xfrm>
       </p:grpSpPr>
-      <p:grpSp>
-        <p:nvGrpSpPr>
-          <p:cNvPr id="10" name="Group 9">
+      <p:sp>
+        <p:nvSpPr>
+          <p:cNvPr id="2" name="Moon 1">
             <a:extLst>
               <a:ext uri="{FF2B5EF4-FFF2-40B4-BE49-F238E27FC236}">
-                <a16:creationId xmlns:a16="http://schemas.microsoft.com/office/drawing/2014/main" id="{622133C3-9663-4292-941D-533253180257}"/>
+                <a16:creationId xmlns:a16="http://schemas.microsoft.com/office/drawing/2014/main" id="{4330A0B2-832A-426A-8513-25EAA04A5B0F}"/>
               </a:ext>
             </a:extLst>
           </p:cNvPr>
-          <p:cNvGrpSpPr/>
+          <p:cNvSpPr>
+            <a:spLocks noChangeAspect="1"/>
+          </p:cNvSpPr>
           <p:nvPr/>
-        </p:nvGrpSpPr>
-        <p:grpSpPr>
-          <a:xfrm rot="20811435">
-            <a:off x="696377" y="1015456"/>
-            <a:ext cx="4023512" cy="4023361"/>
-            <a:chOff x="936376" y="1091684"/>
-            <a:chExt cx="3613751" cy="3657600"/>
+        </p:nvSpPr>
+        <p:spPr>
+          <a:xfrm rot="14412068">
+            <a:off x="810189" y="1154690"/>
+            <a:ext cx="4669286" cy="4114800"/>
           </a:xfrm>
-        </p:grpSpPr>
-        <p:sp>
-          <p:nvSpPr>
-            <p:cNvPr id="9" name="Teardrop 1">
-              <a:extLst>
-                <a:ext uri="{FF2B5EF4-FFF2-40B4-BE49-F238E27FC236}">
-                  <a16:creationId xmlns:a16="http://schemas.microsoft.com/office/drawing/2014/main" id="{E51F7346-E56F-4B49-8C5F-55FEA5210E75}"/>
-                </a:ext>
-              </a:extLst>
-            </p:cNvPr>
-            <p:cNvSpPr>
-              <a:spLocks noChangeAspect="1"/>
-            </p:cNvSpPr>
-            <p:nvPr/>
-          </p:nvSpPr>
-          <p:spPr>
-            <a:xfrm rot="18668047">
-              <a:off x="914452" y="1113608"/>
-              <a:ext cx="3657600" cy="3613751"/>
-            </a:xfrm>
-            <a:custGeom>
-              <a:avLst/>
-              <a:gdLst>
-                <a:gd name="connsiteX0" fmla="*/ 0 w 2834640"/>
-                <a:gd name="connsiteY0" fmla="*/ 1417320 h 2834640"/>
-                <a:gd name="connsiteX1" fmla="*/ 1417320 w 2834640"/>
-                <a:gd name="connsiteY1" fmla="*/ 0 h 2834640"/>
-                <a:gd name="connsiteX2" fmla="*/ 3597059 w 2834640"/>
-                <a:gd name="connsiteY2" fmla="*/ -762419 h 2834640"/>
-                <a:gd name="connsiteX3" fmla="*/ 2834640 w 2834640"/>
-                <a:gd name="connsiteY3" fmla="*/ 1417320 h 2834640"/>
-                <a:gd name="connsiteX4" fmla="*/ 1417320 w 2834640"/>
-                <a:gd name="connsiteY4" fmla="*/ 2834640 h 2834640"/>
-                <a:gd name="connsiteX5" fmla="*/ 0 w 2834640"/>
-                <a:gd name="connsiteY5" fmla="*/ 1417320 h 2834640"/>
-                <a:gd name="connsiteX0" fmla="*/ 0 w 3597059"/>
-                <a:gd name="connsiteY0" fmla="*/ 2179739 h 3597059"/>
-                <a:gd name="connsiteX1" fmla="*/ 1417320 w 3597059"/>
-                <a:gd name="connsiteY1" fmla="*/ 762419 h 3597059"/>
-                <a:gd name="connsiteX2" fmla="*/ 3597059 w 3597059"/>
-                <a:gd name="connsiteY2" fmla="*/ 0 h 3597059"/>
-                <a:gd name="connsiteX3" fmla="*/ 2834640 w 3597059"/>
-                <a:gd name="connsiteY3" fmla="*/ 2179739 h 3597059"/>
-                <a:gd name="connsiteX4" fmla="*/ 1417320 w 3597059"/>
-                <a:gd name="connsiteY4" fmla="*/ 3597059 h 3597059"/>
-                <a:gd name="connsiteX5" fmla="*/ 0 w 3597059"/>
-                <a:gd name="connsiteY5" fmla="*/ 2179739 h 3597059"/>
-                <a:gd name="connsiteX0" fmla="*/ 0 w 3597059"/>
-                <a:gd name="connsiteY0" fmla="*/ 2179739 h 3597059"/>
-                <a:gd name="connsiteX1" fmla="*/ 1417320 w 3597059"/>
-                <a:gd name="connsiteY1" fmla="*/ 762419 h 3597059"/>
-                <a:gd name="connsiteX2" fmla="*/ 3597059 w 3597059"/>
-                <a:gd name="connsiteY2" fmla="*/ 0 h 3597059"/>
-                <a:gd name="connsiteX3" fmla="*/ 2834640 w 3597059"/>
-                <a:gd name="connsiteY3" fmla="*/ 2179739 h 3597059"/>
-                <a:gd name="connsiteX4" fmla="*/ 1417320 w 3597059"/>
-                <a:gd name="connsiteY4" fmla="*/ 3597059 h 3597059"/>
-                <a:gd name="connsiteX5" fmla="*/ 0 w 3597059"/>
-                <a:gd name="connsiteY5" fmla="*/ 2179739 h 3597059"/>
-                <a:gd name="connsiteX0" fmla="*/ 0 w 3597059"/>
-                <a:gd name="connsiteY0" fmla="*/ 2179739 h 3597059"/>
-                <a:gd name="connsiteX1" fmla="*/ 1417320 w 3597059"/>
-                <a:gd name="connsiteY1" fmla="*/ 762419 h 3597059"/>
-                <a:gd name="connsiteX2" fmla="*/ 3597059 w 3597059"/>
-                <a:gd name="connsiteY2" fmla="*/ 0 h 3597059"/>
-                <a:gd name="connsiteX3" fmla="*/ 2834640 w 3597059"/>
-                <a:gd name="connsiteY3" fmla="*/ 2179739 h 3597059"/>
-                <a:gd name="connsiteX4" fmla="*/ 1417320 w 3597059"/>
-                <a:gd name="connsiteY4" fmla="*/ 3597059 h 3597059"/>
-                <a:gd name="connsiteX5" fmla="*/ 0 w 3597059"/>
-                <a:gd name="connsiteY5" fmla="*/ 2179739 h 3597059"/>
-                <a:gd name="connsiteX0" fmla="*/ 0 w 3597059"/>
-                <a:gd name="connsiteY0" fmla="*/ 2179739 h 3597059"/>
-                <a:gd name="connsiteX1" fmla="*/ 1417320 w 3597059"/>
-                <a:gd name="connsiteY1" fmla="*/ 762419 h 3597059"/>
-                <a:gd name="connsiteX2" fmla="*/ 3597059 w 3597059"/>
-                <a:gd name="connsiteY2" fmla="*/ 0 h 3597059"/>
-                <a:gd name="connsiteX3" fmla="*/ 2834640 w 3597059"/>
-                <a:gd name="connsiteY3" fmla="*/ 2179739 h 3597059"/>
-                <a:gd name="connsiteX4" fmla="*/ 1417320 w 3597059"/>
-                <a:gd name="connsiteY4" fmla="*/ 3597059 h 3597059"/>
-                <a:gd name="connsiteX5" fmla="*/ 0 w 3597059"/>
-                <a:gd name="connsiteY5" fmla="*/ 2179739 h 3597059"/>
-                <a:gd name="connsiteX0" fmla="*/ 0 w 3597059"/>
-                <a:gd name="connsiteY0" fmla="*/ 2179739 h 3597059"/>
-                <a:gd name="connsiteX1" fmla="*/ 1417320 w 3597059"/>
-                <a:gd name="connsiteY1" fmla="*/ 762419 h 3597059"/>
-                <a:gd name="connsiteX2" fmla="*/ 3597059 w 3597059"/>
-                <a:gd name="connsiteY2" fmla="*/ 0 h 3597059"/>
-                <a:gd name="connsiteX3" fmla="*/ 2834640 w 3597059"/>
-                <a:gd name="connsiteY3" fmla="*/ 2179739 h 3597059"/>
-                <a:gd name="connsiteX4" fmla="*/ 1417320 w 3597059"/>
-                <a:gd name="connsiteY4" fmla="*/ 3597059 h 3597059"/>
-                <a:gd name="connsiteX5" fmla="*/ 0 w 3597059"/>
-                <a:gd name="connsiteY5" fmla="*/ 2179739 h 3597059"/>
-                <a:gd name="connsiteX0" fmla="*/ 0 w 3597059"/>
-                <a:gd name="connsiteY0" fmla="*/ 2179739 h 3597059"/>
-                <a:gd name="connsiteX1" fmla="*/ 1417320 w 3597059"/>
-                <a:gd name="connsiteY1" fmla="*/ 762419 h 3597059"/>
-                <a:gd name="connsiteX2" fmla="*/ 3597059 w 3597059"/>
-                <a:gd name="connsiteY2" fmla="*/ 0 h 3597059"/>
-                <a:gd name="connsiteX3" fmla="*/ 2834640 w 3597059"/>
-                <a:gd name="connsiteY3" fmla="*/ 2179739 h 3597059"/>
-                <a:gd name="connsiteX4" fmla="*/ 1417320 w 3597059"/>
-                <a:gd name="connsiteY4" fmla="*/ 3597059 h 3597059"/>
-                <a:gd name="connsiteX5" fmla="*/ 0 w 3597059"/>
-                <a:gd name="connsiteY5" fmla="*/ 2179739 h 3597059"/>
-                <a:gd name="connsiteX0" fmla="*/ 0 w 3598623"/>
-                <a:gd name="connsiteY0" fmla="*/ 2170343 h 3587663"/>
-                <a:gd name="connsiteX1" fmla="*/ 1417320 w 3598623"/>
-                <a:gd name="connsiteY1" fmla="*/ 753023 h 3587663"/>
-                <a:gd name="connsiteX2" fmla="*/ 3598623 w 3598623"/>
-                <a:gd name="connsiteY2" fmla="*/ 0 h 3587663"/>
-                <a:gd name="connsiteX3" fmla="*/ 2834640 w 3598623"/>
-                <a:gd name="connsiteY3" fmla="*/ 2170343 h 3587663"/>
-                <a:gd name="connsiteX4" fmla="*/ 1417320 w 3598623"/>
-                <a:gd name="connsiteY4" fmla="*/ 3587663 h 3587663"/>
-                <a:gd name="connsiteX5" fmla="*/ 0 w 3598623"/>
-                <a:gd name="connsiteY5" fmla="*/ 2170343 h 3587663"/>
-                <a:gd name="connsiteX0" fmla="*/ 0 w 3598623"/>
-                <a:gd name="connsiteY0" fmla="*/ 2170343 h 3587663"/>
-                <a:gd name="connsiteX1" fmla="*/ 1417320 w 3598623"/>
-                <a:gd name="connsiteY1" fmla="*/ 753023 h 3587663"/>
-                <a:gd name="connsiteX2" fmla="*/ 3598623 w 3598623"/>
-                <a:gd name="connsiteY2" fmla="*/ 0 h 3587663"/>
-                <a:gd name="connsiteX3" fmla="*/ 2834640 w 3598623"/>
-                <a:gd name="connsiteY3" fmla="*/ 2170343 h 3587663"/>
-                <a:gd name="connsiteX4" fmla="*/ 1417320 w 3598623"/>
-                <a:gd name="connsiteY4" fmla="*/ 3587663 h 3587663"/>
-                <a:gd name="connsiteX5" fmla="*/ 0 w 3598623"/>
-                <a:gd name="connsiteY5" fmla="*/ 2170343 h 3587663"/>
-                <a:gd name="connsiteX0" fmla="*/ 0 w 3598623"/>
-                <a:gd name="connsiteY0" fmla="*/ 2170343 h 3587663"/>
-                <a:gd name="connsiteX1" fmla="*/ 1417320 w 3598623"/>
-                <a:gd name="connsiteY1" fmla="*/ 753023 h 3587663"/>
-                <a:gd name="connsiteX2" fmla="*/ 3598623 w 3598623"/>
-                <a:gd name="connsiteY2" fmla="*/ 0 h 3587663"/>
-                <a:gd name="connsiteX3" fmla="*/ 2834640 w 3598623"/>
-                <a:gd name="connsiteY3" fmla="*/ 2170343 h 3587663"/>
-                <a:gd name="connsiteX4" fmla="*/ 1417320 w 3598623"/>
-                <a:gd name="connsiteY4" fmla="*/ 3587663 h 3587663"/>
-                <a:gd name="connsiteX5" fmla="*/ 0 w 3598623"/>
-                <a:gd name="connsiteY5" fmla="*/ 2170343 h 3587663"/>
-                <a:gd name="connsiteX0" fmla="*/ 0 w 3598623"/>
-                <a:gd name="connsiteY0" fmla="*/ 2170343 h 3587663"/>
-                <a:gd name="connsiteX1" fmla="*/ 1417320 w 3598623"/>
-                <a:gd name="connsiteY1" fmla="*/ 753023 h 3587663"/>
-                <a:gd name="connsiteX2" fmla="*/ 3598623 w 3598623"/>
-                <a:gd name="connsiteY2" fmla="*/ 0 h 3587663"/>
-                <a:gd name="connsiteX3" fmla="*/ 2834640 w 3598623"/>
-                <a:gd name="connsiteY3" fmla="*/ 2170343 h 3587663"/>
-                <a:gd name="connsiteX4" fmla="*/ 1417320 w 3598623"/>
-                <a:gd name="connsiteY4" fmla="*/ 3587663 h 3587663"/>
-                <a:gd name="connsiteX5" fmla="*/ 0 w 3598623"/>
-                <a:gd name="connsiteY5" fmla="*/ 2170343 h 3587663"/>
-                <a:gd name="connsiteX0" fmla="*/ 0 w 3174485"/>
-                <a:gd name="connsiteY0" fmla="*/ 1718994 h 3136314"/>
-                <a:gd name="connsiteX1" fmla="*/ 1417320 w 3174485"/>
-                <a:gd name="connsiteY1" fmla="*/ 301674 h 3136314"/>
-                <a:gd name="connsiteX2" fmla="*/ 3174485 w 3174485"/>
-                <a:gd name="connsiteY2" fmla="*/ 0 h 3136314"/>
-                <a:gd name="connsiteX3" fmla="*/ 2834640 w 3174485"/>
-                <a:gd name="connsiteY3" fmla="*/ 1718994 h 3136314"/>
-                <a:gd name="connsiteX4" fmla="*/ 1417320 w 3174485"/>
-                <a:gd name="connsiteY4" fmla="*/ 3136314 h 3136314"/>
-                <a:gd name="connsiteX5" fmla="*/ 0 w 3174485"/>
-                <a:gd name="connsiteY5" fmla="*/ 1718994 h 3136314"/>
-                <a:gd name="connsiteX0" fmla="*/ 0 w 3174485"/>
-                <a:gd name="connsiteY0" fmla="*/ 1718994 h 3136314"/>
-                <a:gd name="connsiteX1" fmla="*/ 1417320 w 3174485"/>
-                <a:gd name="connsiteY1" fmla="*/ 301674 h 3136314"/>
-                <a:gd name="connsiteX2" fmla="*/ 3174485 w 3174485"/>
-                <a:gd name="connsiteY2" fmla="*/ 0 h 3136314"/>
-                <a:gd name="connsiteX3" fmla="*/ 2834640 w 3174485"/>
-                <a:gd name="connsiteY3" fmla="*/ 1718994 h 3136314"/>
-                <a:gd name="connsiteX4" fmla="*/ 1417320 w 3174485"/>
-                <a:gd name="connsiteY4" fmla="*/ 3136314 h 3136314"/>
-                <a:gd name="connsiteX5" fmla="*/ 0 w 3174485"/>
-                <a:gd name="connsiteY5" fmla="*/ 1718994 h 3136314"/>
-                <a:gd name="connsiteX0" fmla="*/ 0 w 3174485"/>
-                <a:gd name="connsiteY0" fmla="*/ 1718994 h 3136314"/>
-                <a:gd name="connsiteX1" fmla="*/ 1417320 w 3174485"/>
-                <a:gd name="connsiteY1" fmla="*/ 301674 h 3136314"/>
-                <a:gd name="connsiteX2" fmla="*/ 3174485 w 3174485"/>
-                <a:gd name="connsiteY2" fmla="*/ 0 h 3136314"/>
-                <a:gd name="connsiteX3" fmla="*/ 2834640 w 3174485"/>
-                <a:gd name="connsiteY3" fmla="*/ 1718994 h 3136314"/>
-                <a:gd name="connsiteX4" fmla="*/ 1417320 w 3174485"/>
-                <a:gd name="connsiteY4" fmla="*/ 3136314 h 3136314"/>
-                <a:gd name="connsiteX5" fmla="*/ 0 w 3174485"/>
-                <a:gd name="connsiteY5" fmla="*/ 1718994 h 3136314"/>
-                <a:gd name="connsiteX0" fmla="*/ 0 w 3174485"/>
-                <a:gd name="connsiteY0" fmla="*/ 1718994 h 3136314"/>
-                <a:gd name="connsiteX1" fmla="*/ 1417320 w 3174485"/>
-                <a:gd name="connsiteY1" fmla="*/ 301674 h 3136314"/>
-                <a:gd name="connsiteX2" fmla="*/ 3174485 w 3174485"/>
-                <a:gd name="connsiteY2" fmla="*/ 0 h 3136314"/>
-                <a:gd name="connsiteX3" fmla="*/ 2834640 w 3174485"/>
-                <a:gd name="connsiteY3" fmla="*/ 1718994 h 3136314"/>
-                <a:gd name="connsiteX4" fmla="*/ 1417320 w 3174485"/>
-                <a:gd name="connsiteY4" fmla="*/ 3136314 h 3136314"/>
-                <a:gd name="connsiteX5" fmla="*/ 0 w 3174485"/>
-                <a:gd name="connsiteY5" fmla="*/ 1718994 h 3136314"/>
-                <a:gd name="connsiteX0" fmla="*/ 0 w 3174485"/>
-                <a:gd name="connsiteY0" fmla="*/ 1718994 h 3136314"/>
-                <a:gd name="connsiteX1" fmla="*/ 1417320 w 3174485"/>
-                <a:gd name="connsiteY1" fmla="*/ 301674 h 3136314"/>
-                <a:gd name="connsiteX2" fmla="*/ 3174485 w 3174485"/>
-                <a:gd name="connsiteY2" fmla="*/ 0 h 3136314"/>
-                <a:gd name="connsiteX3" fmla="*/ 2834640 w 3174485"/>
-                <a:gd name="connsiteY3" fmla="*/ 1718994 h 3136314"/>
-                <a:gd name="connsiteX4" fmla="*/ 1417320 w 3174485"/>
-                <a:gd name="connsiteY4" fmla="*/ 3136314 h 3136314"/>
-                <a:gd name="connsiteX5" fmla="*/ 0 w 3174485"/>
-                <a:gd name="connsiteY5" fmla="*/ 1718994 h 3136314"/>
-                <a:gd name="connsiteX0" fmla="*/ 0 w 3174485"/>
-                <a:gd name="connsiteY0" fmla="*/ 1718994 h 3136314"/>
-                <a:gd name="connsiteX1" fmla="*/ 1417320 w 3174485"/>
-                <a:gd name="connsiteY1" fmla="*/ 301674 h 3136314"/>
-                <a:gd name="connsiteX2" fmla="*/ 3174485 w 3174485"/>
-                <a:gd name="connsiteY2" fmla="*/ 0 h 3136314"/>
-                <a:gd name="connsiteX3" fmla="*/ 2834640 w 3174485"/>
-                <a:gd name="connsiteY3" fmla="*/ 1718994 h 3136314"/>
-                <a:gd name="connsiteX4" fmla="*/ 1417320 w 3174485"/>
-                <a:gd name="connsiteY4" fmla="*/ 3136314 h 3136314"/>
-                <a:gd name="connsiteX5" fmla="*/ 0 w 3174485"/>
-                <a:gd name="connsiteY5" fmla="*/ 1718994 h 3136314"/>
-                <a:gd name="connsiteX0" fmla="*/ 0 w 3174485"/>
-                <a:gd name="connsiteY0" fmla="*/ 1718994 h 3136314"/>
-                <a:gd name="connsiteX1" fmla="*/ 1417320 w 3174485"/>
-                <a:gd name="connsiteY1" fmla="*/ 301674 h 3136314"/>
-                <a:gd name="connsiteX2" fmla="*/ 3174485 w 3174485"/>
-                <a:gd name="connsiteY2" fmla="*/ 0 h 3136314"/>
-                <a:gd name="connsiteX3" fmla="*/ 2834640 w 3174485"/>
-                <a:gd name="connsiteY3" fmla="*/ 1718994 h 3136314"/>
-                <a:gd name="connsiteX4" fmla="*/ 1417320 w 3174485"/>
-                <a:gd name="connsiteY4" fmla="*/ 3136314 h 3136314"/>
-                <a:gd name="connsiteX5" fmla="*/ 0 w 3174485"/>
-                <a:gd name="connsiteY5" fmla="*/ 1718994 h 3136314"/>
-                <a:gd name="connsiteX0" fmla="*/ 0 w 3174485"/>
-                <a:gd name="connsiteY0" fmla="*/ 1718994 h 3136314"/>
-                <a:gd name="connsiteX1" fmla="*/ 1417320 w 3174485"/>
-                <a:gd name="connsiteY1" fmla="*/ 301674 h 3136314"/>
-                <a:gd name="connsiteX2" fmla="*/ 3174485 w 3174485"/>
-                <a:gd name="connsiteY2" fmla="*/ 0 h 3136314"/>
-                <a:gd name="connsiteX3" fmla="*/ 2834640 w 3174485"/>
-                <a:gd name="connsiteY3" fmla="*/ 1718994 h 3136314"/>
-                <a:gd name="connsiteX4" fmla="*/ 1417320 w 3174485"/>
-                <a:gd name="connsiteY4" fmla="*/ 3136314 h 3136314"/>
-                <a:gd name="connsiteX5" fmla="*/ 0 w 3174485"/>
-                <a:gd name="connsiteY5" fmla="*/ 1718994 h 3136314"/>
-                <a:gd name="connsiteX0" fmla="*/ 0 w 3174485"/>
-                <a:gd name="connsiteY0" fmla="*/ 1718994 h 3136314"/>
-                <a:gd name="connsiteX1" fmla="*/ 1417320 w 3174485"/>
-                <a:gd name="connsiteY1" fmla="*/ 301674 h 3136314"/>
-                <a:gd name="connsiteX2" fmla="*/ 3174485 w 3174485"/>
-                <a:gd name="connsiteY2" fmla="*/ 0 h 3136314"/>
-                <a:gd name="connsiteX3" fmla="*/ 2834640 w 3174485"/>
-                <a:gd name="connsiteY3" fmla="*/ 1718994 h 3136314"/>
-                <a:gd name="connsiteX4" fmla="*/ 1417320 w 3174485"/>
-                <a:gd name="connsiteY4" fmla="*/ 3136314 h 3136314"/>
-                <a:gd name="connsiteX5" fmla="*/ 0 w 3174485"/>
-                <a:gd name="connsiteY5" fmla="*/ 1718994 h 3136314"/>
-                <a:gd name="connsiteX0" fmla="*/ 0 w 3174485"/>
-                <a:gd name="connsiteY0" fmla="*/ 1718994 h 3136314"/>
-                <a:gd name="connsiteX1" fmla="*/ 1417320 w 3174485"/>
-                <a:gd name="connsiteY1" fmla="*/ 301674 h 3136314"/>
-                <a:gd name="connsiteX2" fmla="*/ 3174485 w 3174485"/>
-                <a:gd name="connsiteY2" fmla="*/ 0 h 3136314"/>
-                <a:gd name="connsiteX3" fmla="*/ 2834640 w 3174485"/>
-                <a:gd name="connsiteY3" fmla="*/ 1718994 h 3136314"/>
-                <a:gd name="connsiteX4" fmla="*/ 1417320 w 3174485"/>
-                <a:gd name="connsiteY4" fmla="*/ 3136314 h 3136314"/>
-                <a:gd name="connsiteX5" fmla="*/ 0 w 3174485"/>
-                <a:gd name="connsiteY5" fmla="*/ 1718994 h 3136314"/>
-                <a:gd name="connsiteX0" fmla="*/ 0 w 3174485"/>
-                <a:gd name="connsiteY0" fmla="*/ 1718994 h 3136314"/>
-                <a:gd name="connsiteX1" fmla="*/ 1417320 w 3174485"/>
-                <a:gd name="connsiteY1" fmla="*/ 301674 h 3136314"/>
-                <a:gd name="connsiteX2" fmla="*/ 3174485 w 3174485"/>
-                <a:gd name="connsiteY2" fmla="*/ 0 h 3136314"/>
-                <a:gd name="connsiteX3" fmla="*/ 2834640 w 3174485"/>
-                <a:gd name="connsiteY3" fmla="*/ 1718994 h 3136314"/>
-                <a:gd name="connsiteX4" fmla="*/ 1417320 w 3174485"/>
-                <a:gd name="connsiteY4" fmla="*/ 3136314 h 3136314"/>
-                <a:gd name="connsiteX5" fmla="*/ 0 w 3174485"/>
-                <a:gd name="connsiteY5" fmla="*/ 1718994 h 3136314"/>
-                <a:gd name="connsiteX0" fmla="*/ 0 w 3174485"/>
-                <a:gd name="connsiteY0" fmla="*/ 1718994 h 3136314"/>
-                <a:gd name="connsiteX1" fmla="*/ 1417320 w 3174485"/>
-                <a:gd name="connsiteY1" fmla="*/ 301674 h 3136314"/>
-                <a:gd name="connsiteX2" fmla="*/ 3174485 w 3174485"/>
-                <a:gd name="connsiteY2" fmla="*/ 0 h 3136314"/>
-                <a:gd name="connsiteX3" fmla="*/ 2834640 w 3174485"/>
-                <a:gd name="connsiteY3" fmla="*/ 1718994 h 3136314"/>
-                <a:gd name="connsiteX4" fmla="*/ 1417320 w 3174485"/>
-                <a:gd name="connsiteY4" fmla="*/ 3136314 h 3136314"/>
-                <a:gd name="connsiteX5" fmla="*/ 0 w 3174485"/>
-                <a:gd name="connsiteY5" fmla="*/ 1718994 h 3136314"/>
-                <a:gd name="connsiteX0" fmla="*/ 0 w 3174485"/>
-                <a:gd name="connsiteY0" fmla="*/ 1718994 h 3136314"/>
-                <a:gd name="connsiteX1" fmla="*/ 1417320 w 3174485"/>
-                <a:gd name="connsiteY1" fmla="*/ 301674 h 3136314"/>
-                <a:gd name="connsiteX2" fmla="*/ 3174485 w 3174485"/>
-                <a:gd name="connsiteY2" fmla="*/ 0 h 3136314"/>
-                <a:gd name="connsiteX3" fmla="*/ 2834640 w 3174485"/>
-                <a:gd name="connsiteY3" fmla="*/ 1718994 h 3136314"/>
-                <a:gd name="connsiteX4" fmla="*/ 1417320 w 3174485"/>
-                <a:gd name="connsiteY4" fmla="*/ 3136314 h 3136314"/>
-                <a:gd name="connsiteX5" fmla="*/ 0 w 3174485"/>
-                <a:gd name="connsiteY5" fmla="*/ 1718994 h 3136314"/>
-                <a:gd name="connsiteX0" fmla="*/ 0 w 3174485"/>
-                <a:gd name="connsiteY0" fmla="*/ 1718994 h 3136314"/>
-                <a:gd name="connsiteX1" fmla="*/ 1417320 w 3174485"/>
-                <a:gd name="connsiteY1" fmla="*/ 301674 h 3136314"/>
-                <a:gd name="connsiteX2" fmla="*/ 3174485 w 3174485"/>
-                <a:gd name="connsiteY2" fmla="*/ 0 h 3136314"/>
-                <a:gd name="connsiteX3" fmla="*/ 2834640 w 3174485"/>
-                <a:gd name="connsiteY3" fmla="*/ 1718994 h 3136314"/>
-                <a:gd name="connsiteX4" fmla="*/ 1417320 w 3174485"/>
-                <a:gd name="connsiteY4" fmla="*/ 3136314 h 3136314"/>
-                <a:gd name="connsiteX5" fmla="*/ 0 w 3174485"/>
-                <a:gd name="connsiteY5" fmla="*/ 1718994 h 3136314"/>
-                <a:gd name="connsiteX0" fmla="*/ 0 w 3174485"/>
-                <a:gd name="connsiteY0" fmla="*/ 1718994 h 3136314"/>
-                <a:gd name="connsiteX1" fmla="*/ 1417320 w 3174485"/>
-                <a:gd name="connsiteY1" fmla="*/ 301674 h 3136314"/>
-                <a:gd name="connsiteX2" fmla="*/ 3174485 w 3174485"/>
-                <a:gd name="connsiteY2" fmla="*/ 0 h 3136314"/>
-                <a:gd name="connsiteX3" fmla="*/ 2834640 w 3174485"/>
-                <a:gd name="connsiteY3" fmla="*/ 1718994 h 3136314"/>
-                <a:gd name="connsiteX4" fmla="*/ 1417320 w 3174485"/>
-                <a:gd name="connsiteY4" fmla="*/ 3136314 h 3136314"/>
-                <a:gd name="connsiteX5" fmla="*/ 0 w 3174485"/>
-                <a:gd name="connsiteY5" fmla="*/ 1718994 h 3136314"/>
-                <a:gd name="connsiteX0" fmla="*/ 0 w 3174485"/>
-                <a:gd name="connsiteY0" fmla="*/ 1718994 h 3136314"/>
-                <a:gd name="connsiteX1" fmla="*/ 1417320 w 3174485"/>
-                <a:gd name="connsiteY1" fmla="*/ 301674 h 3136314"/>
-                <a:gd name="connsiteX2" fmla="*/ 3174485 w 3174485"/>
-                <a:gd name="connsiteY2" fmla="*/ 0 h 3136314"/>
-                <a:gd name="connsiteX3" fmla="*/ 2834640 w 3174485"/>
-                <a:gd name="connsiteY3" fmla="*/ 1718994 h 3136314"/>
-                <a:gd name="connsiteX4" fmla="*/ 1417320 w 3174485"/>
-                <a:gd name="connsiteY4" fmla="*/ 3136314 h 3136314"/>
-                <a:gd name="connsiteX5" fmla="*/ 0 w 3174485"/>
-                <a:gd name="connsiteY5" fmla="*/ 1718994 h 3136314"/>
-                <a:gd name="connsiteX0" fmla="*/ 0 w 3174485"/>
-                <a:gd name="connsiteY0" fmla="*/ 1718994 h 3136314"/>
-                <a:gd name="connsiteX1" fmla="*/ 1417320 w 3174485"/>
-                <a:gd name="connsiteY1" fmla="*/ 301674 h 3136314"/>
-                <a:gd name="connsiteX2" fmla="*/ 3174485 w 3174485"/>
-                <a:gd name="connsiteY2" fmla="*/ 0 h 3136314"/>
-                <a:gd name="connsiteX3" fmla="*/ 2834640 w 3174485"/>
-                <a:gd name="connsiteY3" fmla="*/ 1718994 h 3136314"/>
-                <a:gd name="connsiteX4" fmla="*/ 1417320 w 3174485"/>
-                <a:gd name="connsiteY4" fmla="*/ 3136314 h 3136314"/>
-                <a:gd name="connsiteX5" fmla="*/ 0 w 3174485"/>
-                <a:gd name="connsiteY5" fmla="*/ 1718994 h 3136314"/>
-                <a:gd name="connsiteX0" fmla="*/ 0 w 3174485"/>
-                <a:gd name="connsiteY0" fmla="*/ 1718994 h 3136314"/>
-                <a:gd name="connsiteX1" fmla="*/ 1417320 w 3174485"/>
-                <a:gd name="connsiteY1" fmla="*/ 301674 h 3136314"/>
-                <a:gd name="connsiteX2" fmla="*/ 3174485 w 3174485"/>
-                <a:gd name="connsiteY2" fmla="*/ 0 h 3136314"/>
-                <a:gd name="connsiteX3" fmla="*/ 2834640 w 3174485"/>
-                <a:gd name="connsiteY3" fmla="*/ 1718994 h 3136314"/>
-                <a:gd name="connsiteX4" fmla="*/ 1417320 w 3174485"/>
-                <a:gd name="connsiteY4" fmla="*/ 3136314 h 3136314"/>
-                <a:gd name="connsiteX5" fmla="*/ 0 w 3174485"/>
-                <a:gd name="connsiteY5" fmla="*/ 1718994 h 3136314"/>
-                <a:gd name="connsiteX0" fmla="*/ 0 w 3174485"/>
-                <a:gd name="connsiteY0" fmla="*/ 1718994 h 3136314"/>
-                <a:gd name="connsiteX1" fmla="*/ 1417320 w 3174485"/>
-                <a:gd name="connsiteY1" fmla="*/ 301674 h 3136314"/>
-                <a:gd name="connsiteX2" fmla="*/ 3174485 w 3174485"/>
-                <a:gd name="connsiteY2" fmla="*/ 0 h 3136314"/>
-                <a:gd name="connsiteX3" fmla="*/ 2834640 w 3174485"/>
-                <a:gd name="connsiteY3" fmla="*/ 1718994 h 3136314"/>
-                <a:gd name="connsiteX4" fmla="*/ 1417320 w 3174485"/>
-                <a:gd name="connsiteY4" fmla="*/ 3136314 h 3136314"/>
-                <a:gd name="connsiteX5" fmla="*/ 0 w 3174485"/>
-                <a:gd name="connsiteY5" fmla="*/ 1718994 h 3136314"/>
-                <a:gd name="connsiteX0" fmla="*/ 0 w 3174485"/>
-                <a:gd name="connsiteY0" fmla="*/ 1718994 h 3136314"/>
-                <a:gd name="connsiteX1" fmla="*/ 1417320 w 3174485"/>
-                <a:gd name="connsiteY1" fmla="*/ 301674 h 3136314"/>
-                <a:gd name="connsiteX2" fmla="*/ 3174485 w 3174485"/>
-                <a:gd name="connsiteY2" fmla="*/ 0 h 3136314"/>
-                <a:gd name="connsiteX3" fmla="*/ 2834640 w 3174485"/>
-                <a:gd name="connsiteY3" fmla="*/ 1718994 h 3136314"/>
-                <a:gd name="connsiteX4" fmla="*/ 1417320 w 3174485"/>
-                <a:gd name="connsiteY4" fmla="*/ 3136314 h 3136314"/>
-                <a:gd name="connsiteX5" fmla="*/ 0 w 3174485"/>
-                <a:gd name="connsiteY5" fmla="*/ 1718994 h 3136314"/>
-                <a:gd name="connsiteX0" fmla="*/ 0 w 3174485"/>
-                <a:gd name="connsiteY0" fmla="*/ 1718994 h 3136314"/>
-                <a:gd name="connsiteX1" fmla="*/ 1417320 w 3174485"/>
-                <a:gd name="connsiteY1" fmla="*/ 301674 h 3136314"/>
-                <a:gd name="connsiteX2" fmla="*/ 3174485 w 3174485"/>
-                <a:gd name="connsiteY2" fmla="*/ 0 h 3136314"/>
-                <a:gd name="connsiteX3" fmla="*/ 2834640 w 3174485"/>
-                <a:gd name="connsiteY3" fmla="*/ 1718994 h 3136314"/>
-                <a:gd name="connsiteX4" fmla="*/ 1417320 w 3174485"/>
-                <a:gd name="connsiteY4" fmla="*/ 3136314 h 3136314"/>
-                <a:gd name="connsiteX5" fmla="*/ 0 w 3174485"/>
-                <a:gd name="connsiteY5" fmla="*/ 1718994 h 3136314"/>
-                <a:gd name="connsiteX0" fmla="*/ 0 w 3174485"/>
-                <a:gd name="connsiteY0" fmla="*/ 1718994 h 3136314"/>
-                <a:gd name="connsiteX1" fmla="*/ 1417320 w 3174485"/>
-                <a:gd name="connsiteY1" fmla="*/ 301674 h 3136314"/>
-                <a:gd name="connsiteX2" fmla="*/ 3174485 w 3174485"/>
-                <a:gd name="connsiteY2" fmla="*/ 0 h 3136314"/>
-                <a:gd name="connsiteX3" fmla="*/ 2834640 w 3174485"/>
-                <a:gd name="connsiteY3" fmla="*/ 1718994 h 3136314"/>
-                <a:gd name="connsiteX4" fmla="*/ 1417320 w 3174485"/>
-                <a:gd name="connsiteY4" fmla="*/ 3136314 h 3136314"/>
-                <a:gd name="connsiteX5" fmla="*/ 0 w 3174485"/>
-                <a:gd name="connsiteY5" fmla="*/ 1718994 h 3136314"/>
-                <a:gd name="connsiteX0" fmla="*/ 0 w 3174485"/>
-                <a:gd name="connsiteY0" fmla="*/ 1718994 h 3136314"/>
-                <a:gd name="connsiteX1" fmla="*/ 1417320 w 3174485"/>
-                <a:gd name="connsiteY1" fmla="*/ 301674 h 3136314"/>
-                <a:gd name="connsiteX2" fmla="*/ 3174485 w 3174485"/>
-                <a:gd name="connsiteY2" fmla="*/ 0 h 3136314"/>
-                <a:gd name="connsiteX3" fmla="*/ 2834640 w 3174485"/>
-                <a:gd name="connsiteY3" fmla="*/ 1718994 h 3136314"/>
-                <a:gd name="connsiteX4" fmla="*/ 1417320 w 3174485"/>
-                <a:gd name="connsiteY4" fmla="*/ 3136314 h 3136314"/>
-                <a:gd name="connsiteX5" fmla="*/ 0 w 3174485"/>
-                <a:gd name="connsiteY5" fmla="*/ 1718994 h 3136314"/>
-                <a:gd name="connsiteX0" fmla="*/ 0 w 3174485"/>
-                <a:gd name="connsiteY0" fmla="*/ 1718994 h 3136314"/>
-                <a:gd name="connsiteX1" fmla="*/ 1417320 w 3174485"/>
-                <a:gd name="connsiteY1" fmla="*/ 301674 h 3136314"/>
-                <a:gd name="connsiteX2" fmla="*/ 3174485 w 3174485"/>
-                <a:gd name="connsiteY2" fmla="*/ 0 h 3136314"/>
-                <a:gd name="connsiteX3" fmla="*/ 2834640 w 3174485"/>
-                <a:gd name="connsiteY3" fmla="*/ 1718994 h 3136314"/>
-                <a:gd name="connsiteX4" fmla="*/ 1417320 w 3174485"/>
-                <a:gd name="connsiteY4" fmla="*/ 3136314 h 3136314"/>
-                <a:gd name="connsiteX5" fmla="*/ 0 w 3174485"/>
-                <a:gd name="connsiteY5" fmla="*/ 1718994 h 3136314"/>
-                <a:gd name="connsiteX0" fmla="*/ 0 w 3174485"/>
-                <a:gd name="connsiteY0" fmla="*/ 1718994 h 3136314"/>
-                <a:gd name="connsiteX1" fmla="*/ 1417320 w 3174485"/>
-                <a:gd name="connsiteY1" fmla="*/ 301674 h 3136314"/>
-                <a:gd name="connsiteX2" fmla="*/ 3174485 w 3174485"/>
-                <a:gd name="connsiteY2" fmla="*/ 0 h 3136314"/>
-                <a:gd name="connsiteX3" fmla="*/ 2834640 w 3174485"/>
-                <a:gd name="connsiteY3" fmla="*/ 1718994 h 3136314"/>
-                <a:gd name="connsiteX4" fmla="*/ 1417320 w 3174485"/>
-                <a:gd name="connsiteY4" fmla="*/ 3136314 h 3136314"/>
-                <a:gd name="connsiteX5" fmla="*/ 0 w 3174485"/>
-                <a:gd name="connsiteY5" fmla="*/ 1718994 h 3136314"/>
-                <a:gd name="connsiteX0" fmla="*/ 0 w 3174485"/>
-                <a:gd name="connsiteY0" fmla="*/ 1718994 h 3136314"/>
-                <a:gd name="connsiteX1" fmla="*/ 1417320 w 3174485"/>
-                <a:gd name="connsiteY1" fmla="*/ 301674 h 3136314"/>
-                <a:gd name="connsiteX2" fmla="*/ 3174485 w 3174485"/>
-                <a:gd name="connsiteY2" fmla="*/ 0 h 3136314"/>
-                <a:gd name="connsiteX3" fmla="*/ 2834640 w 3174485"/>
-                <a:gd name="connsiteY3" fmla="*/ 1718994 h 3136314"/>
-                <a:gd name="connsiteX4" fmla="*/ 1417320 w 3174485"/>
-                <a:gd name="connsiteY4" fmla="*/ 3136314 h 3136314"/>
-                <a:gd name="connsiteX5" fmla="*/ 0 w 3174485"/>
-                <a:gd name="connsiteY5" fmla="*/ 1718994 h 3136314"/>
-                <a:gd name="connsiteX0" fmla="*/ 0 w 3174485"/>
-                <a:gd name="connsiteY0" fmla="*/ 1718994 h 3136314"/>
-                <a:gd name="connsiteX1" fmla="*/ 1417320 w 3174485"/>
-                <a:gd name="connsiteY1" fmla="*/ 301674 h 3136314"/>
-                <a:gd name="connsiteX2" fmla="*/ 3174485 w 3174485"/>
-                <a:gd name="connsiteY2" fmla="*/ 0 h 3136314"/>
-                <a:gd name="connsiteX3" fmla="*/ 2834640 w 3174485"/>
-                <a:gd name="connsiteY3" fmla="*/ 1718994 h 3136314"/>
-                <a:gd name="connsiteX4" fmla="*/ 1417320 w 3174485"/>
-                <a:gd name="connsiteY4" fmla="*/ 3136314 h 3136314"/>
-                <a:gd name="connsiteX5" fmla="*/ 0 w 3174485"/>
-                <a:gd name="connsiteY5" fmla="*/ 1718994 h 3136314"/>
-                <a:gd name="connsiteX0" fmla="*/ 0 w 3174485"/>
-                <a:gd name="connsiteY0" fmla="*/ 1718994 h 3136314"/>
-                <a:gd name="connsiteX1" fmla="*/ 1417320 w 3174485"/>
-                <a:gd name="connsiteY1" fmla="*/ 301674 h 3136314"/>
-                <a:gd name="connsiteX2" fmla="*/ 3174485 w 3174485"/>
-                <a:gd name="connsiteY2" fmla="*/ 0 h 3136314"/>
-                <a:gd name="connsiteX3" fmla="*/ 2834640 w 3174485"/>
-                <a:gd name="connsiteY3" fmla="*/ 1718994 h 3136314"/>
-                <a:gd name="connsiteX4" fmla="*/ 1417320 w 3174485"/>
-                <a:gd name="connsiteY4" fmla="*/ 3136314 h 3136314"/>
-                <a:gd name="connsiteX5" fmla="*/ 0 w 3174485"/>
-                <a:gd name="connsiteY5" fmla="*/ 1718994 h 3136314"/>
-                <a:gd name="connsiteX0" fmla="*/ 0 w 3174485"/>
-                <a:gd name="connsiteY0" fmla="*/ 1718994 h 3136314"/>
-                <a:gd name="connsiteX1" fmla="*/ 1417320 w 3174485"/>
-                <a:gd name="connsiteY1" fmla="*/ 301674 h 3136314"/>
-                <a:gd name="connsiteX2" fmla="*/ 3174485 w 3174485"/>
-                <a:gd name="connsiteY2" fmla="*/ 0 h 3136314"/>
-                <a:gd name="connsiteX3" fmla="*/ 2834640 w 3174485"/>
-                <a:gd name="connsiteY3" fmla="*/ 1718994 h 3136314"/>
-                <a:gd name="connsiteX4" fmla="*/ 1417320 w 3174485"/>
-                <a:gd name="connsiteY4" fmla="*/ 3136314 h 3136314"/>
-                <a:gd name="connsiteX5" fmla="*/ 0 w 3174485"/>
-                <a:gd name="connsiteY5" fmla="*/ 1718994 h 3136314"/>
-                <a:gd name="connsiteX0" fmla="*/ 0 w 3174485"/>
-                <a:gd name="connsiteY0" fmla="*/ 1718994 h 3136314"/>
-                <a:gd name="connsiteX1" fmla="*/ 1417320 w 3174485"/>
-                <a:gd name="connsiteY1" fmla="*/ 301674 h 3136314"/>
-                <a:gd name="connsiteX2" fmla="*/ 3174485 w 3174485"/>
-                <a:gd name="connsiteY2" fmla="*/ 0 h 3136314"/>
-                <a:gd name="connsiteX3" fmla="*/ 2834640 w 3174485"/>
-                <a:gd name="connsiteY3" fmla="*/ 1718994 h 3136314"/>
-                <a:gd name="connsiteX4" fmla="*/ 1417320 w 3174485"/>
-                <a:gd name="connsiteY4" fmla="*/ 3136314 h 3136314"/>
-                <a:gd name="connsiteX5" fmla="*/ 0 w 3174485"/>
-                <a:gd name="connsiteY5" fmla="*/ 1718994 h 3136314"/>
-                <a:gd name="connsiteX0" fmla="*/ 0 w 3174485"/>
-                <a:gd name="connsiteY0" fmla="*/ 1718994 h 3136324"/>
-                <a:gd name="connsiteX1" fmla="*/ 1417320 w 3174485"/>
-                <a:gd name="connsiteY1" fmla="*/ 301674 h 3136324"/>
-                <a:gd name="connsiteX2" fmla="*/ 3174485 w 3174485"/>
-                <a:gd name="connsiteY2" fmla="*/ 0 h 3136324"/>
-                <a:gd name="connsiteX3" fmla="*/ 2812982 w 3174485"/>
-                <a:gd name="connsiteY3" fmla="*/ 1700907 h 3136324"/>
-                <a:gd name="connsiteX4" fmla="*/ 1417320 w 3174485"/>
-                <a:gd name="connsiteY4" fmla="*/ 3136314 h 3136324"/>
-                <a:gd name="connsiteX5" fmla="*/ 0 w 3174485"/>
-                <a:gd name="connsiteY5" fmla="*/ 1718994 h 3136324"/>
-                <a:gd name="connsiteX0" fmla="*/ 0 w 3174485"/>
-                <a:gd name="connsiteY0" fmla="*/ 1718994 h 3136343"/>
-                <a:gd name="connsiteX1" fmla="*/ 1417320 w 3174485"/>
-                <a:gd name="connsiteY1" fmla="*/ 301674 h 3136343"/>
-                <a:gd name="connsiteX2" fmla="*/ 3174485 w 3174485"/>
-                <a:gd name="connsiteY2" fmla="*/ 0 h 3136343"/>
-                <a:gd name="connsiteX3" fmla="*/ 2837698 w 3174485"/>
-                <a:gd name="connsiteY3" fmla="*/ 1746850 h 3136343"/>
-                <a:gd name="connsiteX4" fmla="*/ 1417320 w 3174485"/>
-                <a:gd name="connsiteY4" fmla="*/ 3136314 h 3136343"/>
-                <a:gd name="connsiteX5" fmla="*/ 0 w 3174485"/>
-                <a:gd name="connsiteY5" fmla="*/ 1718994 h 3136343"/>
-                <a:gd name="connsiteX0" fmla="*/ 0 w 3174485"/>
-                <a:gd name="connsiteY0" fmla="*/ 1718994 h 3136477"/>
-                <a:gd name="connsiteX1" fmla="*/ 1417320 w 3174485"/>
-                <a:gd name="connsiteY1" fmla="*/ 301674 h 3136477"/>
-                <a:gd name="connsiteX2" fmla="*/ 3174485 w 3174485"/>
-                <a:gd name="connsiteY2" fmla="*/ 0 h 3136477"/>
-                <a:gd name="connsiteX3" fmla="*/ 2803261 w 3174485"/>
-                <a:gd name="connsiteY3" fmla="*/ 1782609 h 3136477"/>
-                <a:gd name="connsiteX4" fmla="*/ 1417320 w 3174485"/>
-                <a:gd name="connsiteY4" fmla="*/ 3136314 h 3136477"/>
-                <a:gd name="connsiteX5" fmla="*/ 0 w 3174485"/>
-                <a:gd name="connsiteY5" fmla="*/ 1718994 h 3136477"/>
-                <a:gd name="connsiteX0" fmla="*/ 0 w 3174485"/>
-                <a:gd name="connsiteY0" fmla="*/ 1718994 h 3136433"/>
-                <a:gd name="connsiteX1" fmla="*/ 1417320 w 3174485"/>
-                <a:gd name="connsiteY1" fmla="*/ 301674 h 3136433"/>
-                <a:gd name="connsiteX2" fmla="*/ 3174485 w 3174485"/>
-                <a:gd name="connsiteY2" fmla="*/ 0 h 3136433"/>
-                <a:gd name="connsiteX3" fmla="*/ 2786546 w 3174485"/>
-                <a:gd name="connsiteY3" fmla="*/ 1773710 h 3136433"/>
-                <a:gd name="connsiteX4" fmla="*/ 1417320 w 3174485"/>
-                <a:gd name="connsiteY4" fmla="*/ 3136314 h 3136433"/>
-                <a:gd name="connsiteX5" fmla="*/ 0 w 3174485"/>
-                <a:gd name="connsiteY5" fmla="*/ 1718994 h 3136433"/>
-              </a:gdLst>
-              <a:ahLst/>
-              <a:cxnLst>
-                <a:cxn ang="0">
-                  <a:pos x="connsiteX0" y="connsiteY0"/>
-                </a:cxn>
-                <a:cxn ang="0">
-                  <a:pos x="connsiteX1" y="connsiteY1"/>
-                </a:cxn>
-                <a:cxn ang="0">
-                  <a:pos x="connsiteX2" y="connsiteY2"/>
-                </a:cxn>
-                <a:cxn ang="0">
-                  <a:pos x="connsiteX3" y="connsiteY3"/>
-                </a:cxn>
-                <a:cxn ang="0">
-                  <a:pos x="connsiteX4" y="connsiteY4"/>
-                </a:cxn>
-                <a:cxn ang="0">
-                  <a:pos x="connsiteX5" y="connsiteY5"/>
-                </a:cxn>
-              </a:cxnLst>
-              <a:rect l="l" t="t" r="r" b="b"/>
-              <a:pathLst>
-                <a:path w="3174485" h="3136433">
-                  <a:moveTo>
-                    <a:pt x="0" y="1718994"/>
-                  </a:moveTo>
-                  <a:cubicBezTo>
-                    <a:pt x="0" y="936230"/>
-                    <a:pt x="825883" y="412178"/>
-                    <a:pt x="1417320" y="301674"/>
-                  </a:cubicBezTo>
-                  <a:cubicBezTo>
-                    <a:pt x="3189850" y="-29505"/>
-                    <a:pt x="664031" y="417658"/>
-                    <a:pt x="3174485" y="0"/>
-                  </a:cubicBezTo>
-                  <a:cubicBezTo>
-                    <a:pt x="2693847" y="2298681"/>
-                    <a:pt x="2979823" y="934109"/>
-                    <a:pt x="2786546" y="1773710"/>
-                  </a:cubicBezTo>
-                  <a:cubicBezTo>
-                    <a:pt x="2509823" y="2632171"/>
-                    <a:pt x="1881744" y="3145433"/>
-                    <a:pt x="1417320" y="3136314"/>
-                  </a:cubicBezTo>
-                  <a:cubicBezTo>
-                    <a:pt x="952896" y="3127195"/>
-                    <a:pt x="0" y="2501758"/>
-                    <a:pt x="0" y="1718994"/>
-                  </a:cubicBezTo>
-                  <a:close/>
-                </a:path>
-              </a:pathLst>
-            </a:custGeom>
-            <a:gradFill flip="none" rotWithShape="1">
-              <a:gsLst>
-                <a:gs pos="0">
-                  <a:schemeClr val="tx2">
-                    <a:lumMod val="75000"/>
-                    <a:shade val="30000"/>
-                    <a:satMod val="115000"/>
-                  </a:schemeClr>
-                </a:gs>
-                <a:gs pos="40000">
-                  <a:schemeClr val="tx2">
-                    <a:lumMod val="75000"/>
-                    <a:shade val="67500"/>
-                    <a:satMod val="115000"/>
-                  </a:schemeClr>
-                </a:gs>
-                <a:gs pos="100000">
-                  <a:srgbClr val="495E7B"/>
-                </a:gs>
-              </a:gsLst>
-              <a:lin ang="18900000" scaled="1"/>
-              <a:tileRect/>
-            </a:gradFill>
-            <a:ln w="152400">
-              <a:noFill/>
-            </a:ln>
-            <a:scene3d>
-              <a:camera prst="orthographicFront"/>
-              <a:lightRig rig="threePt" dir="t"/>
-            </a:scene3d>
-            <a:sp3d>
-              <a:bevelT w="127000" h="127000"/>
-            </a:sp3d>
-          </p:spPr>
-          <p:style>
-            <a:lnRef idx="2">
-              <a:schemeClr val="accent1">
-                <a:shade val="50000"/>
-              </a:schemeClr>
-            </a:lnRef>
-            <a:fillRef idx="1">
-              <a:schemeClr val="accent1"/>
-            </a:fillRef>
-            <a:effectRef idx="0">
-              <a:schemeClr val="accent1"/>
-            </a:effectRef>
-            <a:fontRef idx="minor">
-              <a:schemeClr val="lt1"/>
-            </a:fontRef>
-          </p:style>
-          <p:txBody>
-            <a:bodyPr rtlCol="0" anchor="ctr"/>
-            <a:lstStyle/>
-            <a:p>
-              <a:pPr algn="ctr"/>
-              <a:endParaRPr lang="en-US" dirty="0"/>
-            </a:p>
-          </p:txBody>
-        </p:sp>
-        <p:sp>
-          <p:nvSpPr>
-            <p:cNvPr id="7" name="Teardrop 1">
-              <a:extLst>
-                <a:ext uri="{FF2B5EF4-FFF2-40B4-BE49-F238E27FC236}">
-                  <a16:creationId xmlns:a16="http://schemas.microsoft.com/office/drawing/2014/main" id="{9E65516A-9506-4353-B197-077F323A9ABF}"/>
-                </a:ext>
-              </a:extLst>
-            </p:cNvPr>
-            <p:cNvSpPr>
-              <a:spLocks/>
-            </p:cNvSpPr>
-            <p:nvPr/>
-          </p:nvSpPr>
-          <p:spPr>
-            <a:xfrm rot="7577613">
-              <a:off x="1942333" y="2835793"/>
-              <a:ext cx="1653565" cy="1501206"/>
-            </a:xfrm>
-            <a:custGeom>
-              <a:avLst/>
-              <a:gdLst>
-                <a:gd name="connsiteX0" fmla="*/ 0 w 2834640"/>
-                <a:gd name="connsiteY0" fmla="*/ 1417320 h 2834640"/>
-                <a:gd name="connsiteX1" fmla="*/ 1417320 w 2834640"/>
-                <a:gd name="connsiteY1" fmla="*/ 0 h 2834640"/>
-                <a:gd name="connsiteX2" fmla="*/ 3597059 w 2834640"/>
-                <a:gd name="connsiteY2" fmla="*/ -762419 h 2834640"/>
-                <a:gd name="connsiteX3" fmla="*/ 2834640 w 2834640"/>
-                <a:gd name="connsiteY3" fmla="*/ 1417320 h 2834640"/>
-                <a:gd name="connsiteX4" fmla="*/ 1417320 w 2834640"/>
-                <a:gd name="connsiteY4" fmla="*/ 2834640 h 2834640"/>
-                <a:gd name="connsiteX5" fmla="*/ 0 w 2834640"/>
-                <a:gd name="connsiteY5" fmla="*/ 1417320 h 2834640"/>
-                <a:gd name="connsiteX0" fmla="*/ 0 w 3597059"/>
-                <a:gd name="connsiteY0" fmla="*/ 2179739 h 3597059"/>
-                <a:gd name="connsiteX1" fmla="*/ 1417320 w 3597059"/>
-                <a:gd name="connsiteY1" fmla="*/ 762419 h 3597059"/>
-                <a:gd name="connsiteX2" fmla="*/ 3597059 w 3597059"/>
-                <a:gd name="connsiteY2" fmla="*/ 0 h 3597059"/>
-                <a:gd name="connsiteX3" fmla="*/ 2834640 w 3597059"/>
-                <a:gd name="connsiteY3" fmla="*/ 2179739 h 3597059"/>
-                <a:gd name="connsiteX4" fmla="*/ 1417320 w 3597059"/>
-                <a:gd name="connsiteY4" fmla="*/ 3597059 h 3597059"/>
-                <a:gd name="connsiteX5" fmla="*/ 0 w 3597059"/>
-                <a:gd name="connsiteY5" fmla="*/ 2179739 h 3597059"/>
-                <a:gd name="connsiteX0" fmla="*/ 0 w 3597059"/>
-                <a:gd name="connsiteY0" fmla="*/ 2179739 h 3597059"/>
-                <a:gd name="connsiteX1" fmla="*/ 1417320 w 3597059"/>
-                <a:gd name="connsiteY1" fmla="*/ 762419 h 3597059"/>
-                <a:gd name="connsiteX2" fmla="*/ 3597059 w 3597059"/>
-                <a:gd name="connsiteY2" fmla="*/ 0 h 3597059"/>
-                <a:gd name="connsiteX3" fmla="*/ 2834640 w 3597059"/>
-                <a:gd name="connsiteY3" fmla="*/ 2179739 h 3597059"/>
-                <a:gd name="connsiteX4" fmla="*/ 1417320 w 3597059"/>
-                <a:gd name="connsiteY4" fmla="*/ 3597059 h 3597059"/>
-                <a:gd name="connsiteX5" fmla="*/ 0 w 3597059"/>
-                <a:gd name="connsiteY5" fmla="*/ 2179739 h 3597059"/>
-                <a:gd name="connsiteX0" fmla="*/ 0 w 3597059"/>
-                <a:gd name="connsiteY0" fmla="*/ 2179739 h 3597059"/>
-                <a:gd name="connsiteX1" fmla="*/ 1417320 w 3597059"/>
-                <a:gd name="connsiteY1" fmla="*/ 762419 h 3597059"/>
-                <a:gd name="connsiteX2" fmla="*/ 3597059 w 3597059"/>
-                <a:gd name="connsiteY2" fmla="*/ 0 h 3597059"/>
-                <a:gd name="connsiteX3" fmla="*/ 2834640 w 3597059"/>
-                <a:gd name="connsiteY3" fmla="*/ 2179739 h 3597059"/>
-                <a:gd name="connsiteX4" fmla="*/ 1417320 w 3597059"/>
-                <a:gd name="connsiteY4" fmla="*/ 3597059 h 3597059"/>
-                <a:gd name="connsiteX5" fmla="*/ 0 w 3597059"/>
-                <a:gd name="connsiteY5" fmla="*/ 2179739 h 3597059"/>
-                <a:gd name="connsiteX0" fmla="*/ 0 w 3597059"/>
-                <a:gd name="connsiteY0" fmla="*/ 2179739 h 3597059"/>
-                <a:gd name="connsiteX1" fmla="*/ 1417320 w 3597059"/>
-                <a:gd name="connsiteY1" fmla="*/ 762419 h 3597059"/>
-                <a:gd name="connsiteX2" fmla="*/ 3597059 w 3597059"/>
-                <a:gd name="connsiteY2" fmla="*/ 0 h 3597059"/>
-                <a:gd name="connsiteX3" fmla="*/ 2834640 w 3597059"/>
-                <a:gd name="connsiteY3" fmla="*/ 2179739 h 3597059"/>
-                <a:gd name="connsiteX4" fmla="*/ 1417320 w 3597059"/>
-                <a:gd name="connsiteY4" fmla="*/ 3597059 h 3597059"/>
-                <a:gd name="connsiteX5" fmla="*/ 0 w 3597059"/>
-                <a:gd name="connsiteY5" fmla="*/ 2179739 h 3597059"/>
-                <a:gd name="connsiteX0" fmla="*/ 0 w 3597059"/>
-                <a:gd name="connsiteY0" fmla="*/ 2179739 h 3597059"/>
-                <a:gd name="connsiteX1" fmla="*/ 1417320 w 3597059"/>
-                <a:gd name="connsiteY1" fmla="*/ 762419 h 3597059"/>
-                <a:gd name="connsiteX2" fmla="*/ 3597059 w 3597059"/>
-                <a:gd name="connsiteY2" fmla="*/ 0 h 3597059"/>
-                <a:gd name="connsiteX3" fmla="*/ 2834640 w 3597059"/>
-                <a:gd name="connsiteY3" fmla="*/ 2179739 h 3597059"/>
-                <a:gd name="connsiteX4" fmla="*/ 1417320 w 3597059"/>
-                <a:gd name="connsiteY4" fmla="*/ 3597059 h 3597059"/>
-                <a:gd name="connsiteX5" fmla="*/ 0 w 3597059"/>
-                <a:gd name="connsiteY5" fmla="*/ 2179739 h 3597059"/>
-                <a:gd name="connsiteX0" fmla="*/ 0 w 3597059"/>
-                <a:gd name="connsiteY0" fmla="*/ 2179739 h 3597059"/>
-                <a:gd name="connsiteX1" fmla="*/ 1417320 w 3597059"/>
-                <a:gd name="connsiteY1" fmla="*/ 762419 h 3597059"/>
-                <a:gd name="connsiteX2" fmla="*/ 3597059 w 3597059"/>
-                <a:gd name="connsiteY2" fmla="*/ 0 h 3597059"/>
-                <a:gd name="connsiteX3" fmla="*/ 2834640 w 3597059"/>
-                <a:gd name="connsiteY3" fmla="*/ 2179739 h 3597059"/>
-                <a:gd name="connsiteX4" fmla="*/ 1417320 w 3597059"/>
-                <a:gd name="connsiteY4" fmla="*/ 3597059 h 3597059"/>
-                <a:gd name="connsiteX5" fmla="*/ 0 w 3597059"/>
-                <a:gd name="connsiteY5" fmla="*/ 2179739 h 3597059"/>
-                <a:gd name="connsiteX0" fmla="*/ 0 w 3598623"/>
-                <a:gd name="connsiteY0" fmla="*/ 2170343 h 3587663"/>
-                <a:gd name="connsiteX1" fmla="*/ 1417320 w 3598623"/>
-                <a:gd name="connsiteY1" fmla="*/ 753023 h 3587663"/>
-                <a:gd name="connsiteX2" fmla="*/ 3598623 w 3598623"/>
-                <a:gd name="connsiteY2" fmla="*/ 0 h 3587663"/>
-                <a:gd name="connsiteX3" fmla="*/ 2834640 w 3598623"/>
-                <a:gd name="connsiteY3" fmla="*/ 2170343 h 3587663"/>
-                <a:gd name="connsiteX4" fmla="*/ 1417320 w 3598623"/>
-                <a:gd name="connsiteY4" fmla="*/ 3587663 h 3587663"/>
-                <a:gd name="connsiteX5" fmla="*/ 0 w 3598623"/>
-                <a:gd name="connsiteY5" fmla="*/ 2170343 h 3587663"/>
-                <a:gd name="connsiteX0" fmla="*/ 0 w 3598623"/>
-                <a:gd name="connsiteY0" fmla="*/ 2170343 h 3587663"/>
-                <a:gd name="connsiteX1" fmla="*/ 1417320 w 3598623"/>
-                <a:gd name="connsiteY1" fmla="*/ 753023 h 3587663"/>
-                <a:gd name="connsiteX2" fmla="*/ 3598623 w 3598623"/>
-                <a:gd name="connsiteY2" fmla="*/ 0 h 3587663"/>
-                <a:gd name="connsiteX3" fmla="*/ 2834640 w 3598623"/>
-                <a:gd name="connsiteY3" fmla="*/ 2170343 h 3587663"/>
-                <a:gd name="connsiteX4" fmla="*/ 1417320 w 3598623"/>
-                <a:gd name="connsiteY4" fmla="*/ 3587663 h 3587663"/>
-                <a:gd name="connsiteX5" fmla="*/ 0 w 3598623"/>
-                <a:gd name="connsiteY5" fmla="*/ 2170343 h 3587663"/>
-                <a:gd name="connsiteX0" fmla="*/ 0 w 3598623"/>
-                <a:gd name="connsiteY0" fmla="*/ 2170343 h 3587663"/>
-                <a:gd name="connsiteX1" fmla="*/ 1417320 w 3598623"/>
-                <a:gd name="connsiteY1" fmla="*/ 753023 h 3587663"/>
-                <a:gd name="connsiteX2" fmla="*/ 3598623 w 3598623"/>
-                <a:gd name="connsiteY2" fmla="*/ 0 h 3587663"/>
-                <a:gd name="connsiteX3" fmla="*/ 2834640 w 3598623"/>
-                <a:gd name="connsiteY3" fmla="*/ 2170343 h 3587663"/>
-                <a:gd name="connsiteX4" fmla="*/ 1417320 w 3598623"/>
-                <a:gd name="connsiteY4" fmla="*/ 3587663 h 3587663"/>
-                <a:gd name="connsiteX5" fmla="*/ 0 w 3598623"/>
-                <a:gd name="connsiteY5" fmla="*/ 2170343 h 3587663"/>
-                <a:gd name="connsiteX0" fmla="*/ 0 w 3598623"/>
-                <a:gd name="connsiteY0" fmla="*/ 2170343 h 3587663"/>
-                <a:gd name="connsiteX1" fmla="*/ 1417320 w 3598623"/>
-                <a:gd name="connsiteY1" fmla="*/ 753023 h 3587663"/>
-                <a:gd name="connsiteX2" fmla="*/ 3598623 w 3598623"/>
-                <a:gd name="connsiteY2" fmla="*/ 0 h 3587663"/>
-                <a:gd name="connsiteX3" fmla="*/ 2834640 w 3598623"/>
-                <a:gd name="connsiteY3" fmla="*/ 2170343 h 3587663"/>
-                <a:gd name="connsiteX4" fmla="*/ 1417320 w 3598623"/>
-                <a:gd name="connsiteY4" fmla="*/ 3587663 h 3587663"/>
-                <a:gd name="connsiteX5" fmla="*/ 0 w 3598623"/>
-                <a:gd name="connsiteY5" fmla="*/ 2170343 h 3587663"/>
-                <a:gd name="connsiteX0" fmla="*/ 0 w 3174485"/>
-                <a:gd name="connsiteY0" fmla="*/ 1718994 h 3136314"/>
-                <a:gd name="connsiteX1" fmla="*/ 1417320 w 3174485"/>
-                <a:gd name="connsiteY1" fmla="*/ 301674 h 3136314"/>
-                <a:gd name="connsiteX2" fmla="*/ 3174485 w 3174485"/>
-                <a:gd name="connsiteY2" fmla="*/ 0 h 3136314"/>
-                <a:gd name="connsiteX3" fmla="*/ 2834640 w 3174485"/>
-                <a:gd name="connsiteY3" fmla="*/ 1718994 h 3136314"/>
-                <a:gd name="connsiteX4" fmla="*/ 1417320 w 3174485"/>
-                <a:gd name="connsiteY4" fmla="*/ 3136314 h 3136314"/>
-                <a:gd name="connsiteX5" fmla="*/ 0 w 3174485"/>
-                <a:gd name="connsiteY5" fmla="*/ 1718994 h 3136314"/>
-                <a:gd name="connsiteX0" fmla="*/ 0 w 3174485"/>
-                <a:gd name="connsiteY0" fmla="*/ 1718994 h 3136314"/>
-                <a:gd name="connsiteX1" fmla="*/ 1417320 w 3174485"/>
-                <a:gd name="connsiteY1" fmla="*/ 301674 h 3136314"/>
-                <a:gd name="connsiteX2" fmla="*/ 3174485 w 3174485"/>
-                <a:gd name="connsiteY2" fmla="*/ 0 h 3136314"/>
-                <a:gd name="connsiteX3" fmla="*/ 2834640 w 3174485"/>
-                <a:gd name="connsiteY3" fmla="*/ 1718994 h 3136314"/>
-                <a:gd name="connsiteX4" fmla="*/ 1417320 w 3174485"/>
-                <a:gd name="connsiteY4" fmla="*/ 3136314 h 3136314"/>
-                <a:gd name="connsiteX5" fmla="*/ 0 w 3174485"/>
-                <a:gd name="connsiteY5" fmla="*/ 1718994 h 3136314"/>
-                <a:gd name="connsiteX0" fmla="*/ 0 w 3174485"/>
-                <a:gd name="connsiteY0" fmla="*/ 1718994 h 3136314"/>
-                <a:gd name="connsiteX1" fmla="*/ 1417320 w 3174485"/>
-                <a:gd name="connsiteY1" fmla="*/ 301674 h 3136314"/>
-                <a:gd name="connsiteX2" fmla="*/ 3174485 w 3174485"/>
-                <a:gd name="connsiteY2" fmla="*/ 0 h 3136314"/>
-                <a:gd name="connsiteX3" fmla="*/ 2834640 w 3174485"/>
-                <a:gd name="connsiteY3" fmla="*/ 1718994 h 3136314"/>
-                <a:gd name="connsiteX4" fmla="*/ 1417320 w 3174485"/>
-                <a:gd name="connsiteY4" fmla="*/ 3136314 h 3136314"/>
-                <a:gd name="connsiteX5" fmla="*/ 0 w 3174485"/>
-                <a:gd name="connsiteY5" fmla="*/ 1718994 h 3136314"/>
-                <a:gd name="connsiteX0" fmla="*/ 0 w 3174485"/>
-                <a:gd name="connsiteY0" fmla="*/ 1718994 h 3136314"/>
-                <a:gd name="connsiteX1" fmla="*/ 1417320 w 3174485"/>
-                <a:gd name="connsiteY1" fmla="*/ 301674 h 3136314"/>
-                <a:gd name="connsiteX2" fmla="*/ 3174485 w 3174485"/>
-                <a:gd name="connsiteY2" fmla="*/ 0 h 3136314"/>
-                <a:gd name="connsiteX3" fmla="*/ 2834640 w 3174485"/>
-                <a:gd name="connsiteY3" fmla="*/ 1718994 h 3136314"/>
-                <a:gd name="connsiteX4" fmla="*/ 1417320 w 3174485"/>
-                <a:gd name="connsiteY4" fmla="*/ 3136314 h 3136314"/>
-                <a:gd name="connsiteX5" fmla="*/ 0 w 3174485"/>
-                <a:gd name="connsiteY5" fmla="*/ 1718994 h 3136314"/>
-                <a:gd name="connsiteX0" fmla="*/ 0 w 3174485"/>
-                <a:gd name="connsiteY0" fmla="*/ 1718994 h 3136314"/>
-                <a:gd name="connsiteX1" fmla="*/ 1417320 w 3174485"/>
-                <a:gd name="connsiteY1" fmla="*/ 301674 h 3136314"/>
-                <a:gd name="connsiteX2" fmla="*/ 3174485 w 3174485"/>
-                <a:gd name="connsiteY2" fmla="*/ 0 h 3136314"/>
-                <a:gd name="connsiteX3" fmla="*/ 2834640 w 3174485"/>
-                <a:gd name="connsiteY3" fmla="*/ 1718994 h 3136314"/>
-                <a:gd name="connsiteX4" fmla="*/ 1417320 w 3174485"/>
-                <a:gd name="connsiteY4" fmla="*/ 3136314 h 3136314"/>
-                <a:gd name="connsiteX5" fmla="*/ 0 w 3174485"/>
-                <a:gd name="connsiteY5" fmla="*/ 1718994 h 3136314"/>
-                <a:gd name="connsiteX0" fmla="*/ 0 w 3174485"/>
-                <a:gd name="connsiteY0" fmla="*/ 1718994 h 3136314"/>
-                <a:gd name="connsiteX1" fmla="*/ 1417320 w 3174485"/>
-                <a:gd name="connsiteY1" fmla="*/ 301674 h 3136314"/>
-                <a:gd name="connsiteX2" fmla="*/ 3174485 w 3174485"/>
-                <a:gd name="connsiteY2" fmla="*/ 0 h 3136314"/>
-                <a:gd name="connsiteX3" fmla="*/ 2834640 w 3174485"/>
-                <a:gd name="connsiteY3" fmla="*/ 1718994 h 3136314"/>
-                <a:gd name="connsiteX4" fmla="*/ 1417320 w 3174485"/>
-                <a:gd name="connsiteY4" fmla="*/ 3136314 h 3136314"/>
-                <a:gd name="connsiteX5" fmla="*/ 0 w 3174485"/>
-                <a:gd name="connsiteY5" fmla="*/ 1718994 h 3136314"/>
-                <a:gd name="connsiteX0" fmla="*/ 0 w 3174485"/>
-                <a:gd name="connsiteY0" fmla="*/ 1718994 h 3136314"/>
-                <a:gd name="connsiteX1" fmla="*/ 1417320 w 3174485"/>
-                <a:gd name="connsiteY1" fmla="*/ 301674 h 3136314"/>
-                <a:gd name="connsiteX2" fmla="*/ 3174485 w 3174485"/>
-                <a:gd name="connsiteY2" fmla="*/ 0 h 3136314"/>
-                <a:gd name="connsiteX3" fmla="*/ 2834640 w 3174485"/>
-                <a:gd name="connsiteY3" fmla="*/ 1718994 h 3136314"/>
-                <a:gd name="connsiteX4" fmla="*/ 1417320 w 3174485"/>
-                <a:gd name="connsiteY4" fmla="*/ 3136314 h 3136314"/>
-                <a:gd name="connsiteX5" fmla="*/ 0 w 3174485"/>
-                <a:gd name="connsiteY5" fmla="*/ 1718994 h 3136314"/>
-              </a:gdLst>
-              <a:ahLst/>
-              <a:cxnLst>
-                <a:cxn ang="0">
-                  <a:pos x="connsiteX0" y="connsiteY0"/>
-                </a:cxn>
-                <a:cxn ang="0">
-                  <a:pos x="connsiteX1" y="connsiteY1"/>
-                </a:cxn>
-                <a:cxn ang="0">
-                  <a:pos x="connsiteX2" y="connsiteY2"/>
-                </a:cxn>
-                <a:cxn ang="0">
-                  <a:pos x="connsiteX3" y="connsiteY3"/>
-                </a:cxn>
-                <a:cxn ang="0">
-                  <a:pos x="connsiteX4" y="connsiteY4"/>
-                </a:cxn>
-                <a:cxn ang="0">
-                  <a:pos x="connsiteX5" y="connsiteY5"/>
-                </a:cxn>
-              </a:cxnLst>
-              <a:rect l="l" t="t" r="r" b="b"/>
-              <a:pathLst>
-                <a:path w="3174485" h="3136314">
-                  <a:moveTo>
-                    <a:pt x="0" y="1718994"/>
-                  </a:moveTo>
-                  <a:cubicBezTo>
-                    <a:pt x="0" y="936230"/>
-                    <a:pt x="825883" y="412178"/>
-                    <a:pt x="1417320" y="301674"/>
-                  </a:cubicBezTo>
-                  <a:cubicBezTo>
-                    <a:pt x="3189850" y="-29505"/>
-                    <a:pt x="674211" y="447665"/>
-                    <a:pt x="3174485" y="0"/>
-                  </a:cubicBezTo>
-                  <a:cubicBezTo>
-                    <a:pt x="2705619" y="2298391"/>
-                    <a:pt x="3194869" y="25735"/>
-                    <a:pt x="2834640" y="1718994"/>
-                  </a:cubicBezTo>
-                  <a:cubicBezTo>
-                    <a:pt x="2557917" y="2577455"/>
-                    <a:pt x="2200084" y="3136314"/>
-                    <a:pt x="1417320" y="3136314"/>
-                  </a:cubicBezTo>
-                  <a:cubicBezTo>
-                    <a:pt x="634556" y="3136314"/>
-                    <a:pt x="0" y="2501758"/>
-                    <a:pt x="0" y="1718994"/>
-                  </a:cubicBezTo>
-                  <a:close/>
-                </a:path>
-              </a:pathLst>
-            </a:custGeom>
-            <a:gradFill flip="none" rotWithShape="1">
-              <a:gsLst>
-                <a:gs pos="0">
-                  <a:schemeClr val="accent4">
-                    <a:shade val="30000"/>
-                    <a:satMod val="115000"/>
-                    <a:lumMod val="50000"/>
-                    <a:alpha val="40000"/>
-                  </a:schemeClr>
-                </a:gs>
-                <a:gs pos="65000">
-                  <a:schemeClr val="accent4">
-                    <a:lumMod val="60000"/>
-                    <a:lumOff val="40000"/>
-                    <a:shade val="67500"/>
-                    <a:satMod val="115000"/>
-                  </a:schemeClr>
-                </a:gs>
-                <a:gs pos="100000">
-                  <a:schemeClr val="accent4">
-                    <a:lumMod val="60000"/>
-                    <a:lumOff val="40000"/>
-                    <a:shade val="100000"/>
-                    <a:satMod val="115000"/>
-                  </a:schemeClr>
-                </a:gs>
-              </a:gsLst>
-              <a:lin ang="8100000" scaled="1"/>
-              <a:tileRect/>
-            </a:gradFill>
-            <a:ln w="152400">
-              <a:noFill/>
-            </a:ln>
-            <a:scene3d>
-              <a:camera prst="orthographicFront"/>
-              <a:lightRig rig="threePt" dir="t"/>
-            </a:scene3d>
-            <a:sp3d>
-              <a:bevelT w="127000" h="127000" prst="relaxedInset"/>
-            </a:sp3d>
-          </p:spPr>
-          <p:style>
-            <a:lnRef idx="2">
-              <a:schemeClr val="accent1">
-                <a:shade val="50000"/>
-              </a:schemeClr>
-            </a:lnRef>
-            <a:fillRef idx="1">
-              <a:schemeClr val="accent1"/>
-            </a:fillRef>
-            <a:effectRef idx="0">
-              <a:schemeClr val="accent1"/>
-            </a:effectRef>
-            <a:fontRef idx="minor">
-              <a:schemeClr val="lt1"/>
-            </a:fontRef>
-          </p:style>
-          <p:txBody>
-            <a:bodyPr rtlCol="0" anchor="ctr"/>
-            <a:lstStyle/>
-            <a:p>
-              <a:pPr algn="ctr"/>
-              <a:endParaRPr lang="en-US" dirty="0"/>
-            </a:p>
-          </p:txBody>
-        </p:sp>
-      </p:grpSp>
+          <a:prstGeom prst="moon">
+            <a:avLst/>
+          </a:prstGeom>
+          <a:solidFill>
+            <a:schemeClr val="accent1">
+              <a:lumMod val="50000"/>
+            </a:schemeClr>
+          </a:solidFill>
+          <a:ln>
+            <a:noFill/>
+          </a:ln>
+        </p:spPr>
+        <p:style>
+          <a:lnRef idx="2">
+            <a:schemeClr val="accent1">
+              <a:shade val="50000"/>
+            </a:schemeClr>
+          </a:lnRef>
+          <a:fillRef idx="1">
+            <a:schemeClr val="accent1"/>
+          </a:fillRef>
+          <a:effectRef idx="0">
+            <a:schemeClr val="accent1"/>
+          </a:effectRef>
+          <a:fontRef idx="minor">
+            <a:schemeClr val="lt1"/>
+          </a:fontRef>
+        </p:style>
+        <p:txBody>
+          <a:bodyPr rtlCol="0" anchor="ctr"/>
+          <a:lstStyle/>
+          <a:p>
+            <a:pPr algn="ctr"/>
+            <a:endParaRPr lang="en-US"/>
+          </a:p>
+        </p:txBody>
+      </p:sp>
+      <p:sp>
+        <p:nvSpPr>
+          <p:cNvPr id="6" name="Moon 5">
+            <a:extLst>
+              <a:ext uri="{FF2B5EF4-FFF2-40B4-BE49-F238E27FC236}">
+                <a16:creationId xmlns:a16="http://schemas.microsoft.com/office/drawing/2014/main" id="{8190BC94-B3B8-48E8-9525-95B17EA60EEB}"/>
+              </a:ext>
+            </a:extLst>
+          </p:cNvPr>
+          <p:cNvSpPr>
+            <a:spLocks noChangeAspect="1"/>
+          </p:cNvSpPr>
+          <p:nvPr/>
+        </p:nvSpPr>
+        <p:spPr>
+          <a:xfrm rot="3571770">
+            <a:off x="1820688" y="1796053"/>
+            <a:ext cx="2144234" cy="2103120"/>
+          </a:xfrm>
+          <a:prstGeom prst="moon">
+            <a:avLst/>
+          </a:prstGeom>
+          <a:ln>
+            <a:noFill/>
+          </a:ln>
+        </p:spPr>
+        <p:style>
+          <a:lnRef idx="2">
+            <a:schemeClr val="accent4">
+              <a:shade val="50000"/>
+            </a:schemeClr>
+          </a:lnRef>
+          <a:fillRef idx="1">
+            <a:schemeClr val="accent4"/>
+          </a:fillRef>
+          <a:effectRef idx="0">
+            <a:schemeClr val="accent4"/>
+          </a:effectRef>
+          <a:fontRef idx="minor">
+            <a:schemeClr val="lt1"/>
+          </a:fontRef>
+        </p:style>
+        <p:txBody>
+          <a:bodyPr rtlCol="0" anchor="ctr"/>
+          <a:lstStyle/>
+          <a:p>
+            <a:pPr algn="ctr"/>
+            <a:endParaRPr lang="en-US"/>
+          </a:p>
+        </p:txBody>
+      </p:sp>
+      <p:sp>
+        <p:nvSpPr>
+          <p:cNvPr id="8" name="Moon 7">
+            <a:extLst>
+              <a:ext uri="{FF2B5EF4-FFF2-40B4-BE49-F238E27FC236}">
+                <a16:creationId xmlns:a16="http://schemas.microsoft.com/office/drawing/2014/main" id="{24A56D97-0E03-4125-936F-52FF39292FFA}"/>
+              </a:ext>
+            </a:extLst>
+          </p:cNvPr>
+          <p:cNvSpPr>
+            <a:spLocks noChangeAspect="1"/>
+          </p:cNvSpPr>
+          <p:nvPr/>
+        </p:nvSpPr>
+        <p:spPr>
+          <a:xfrm rot="3571770">
+            <a:off x="2978532" y="3352981"/>
+            <a:ext cx="1130645" cy="1188720"/>
+          </a:xfrm>
+          <a:prstGeom prst="moon">
+            <a:avLst/>
+          </a:prstGeom>
+          <a:ln>
+            <a:noFill/>
+          </a:ln>
+        </p:spPr>
+        <p:style>
+          <a:lnRef idx="2">
+            <a:schemeClr val="accent4">
+              <a:shade val="50000"/>
+            </a:schemeClr>
+          </a:lnRef>
+          <a:fillRef idx="1">
+            <a:schemeClr val="accent4"/>
+          </a:fillRef>
+          <a:effectRef idx="0">
+            <a:schemeClr val="accent4"/>
+          </a:effectRef>
+          <a:fontRef idx="minor">
+            <a:schemeClr val="lt1"/>
+          </a:fontRef>
+        </p:style>
+        <p:txBody>
+          <a:bodyPr rtlCol="0" anchor="ctr"/>
+          <a:lstStyle/>
+          <a:p>
+            <a:pPr algn="ctr"/>
+            <a:endParaRPr lang="en-US"/>
+          </a:p>
+        </p:txBody>
+      </p:sp>
     </p:spTree>
     <p:extLst>
       <p:ext uri="{BB962C8B-B14F-4D97-AF65-F5344CB8AC3E}">

</xml_diff>

<commit_message>
moved notebooks under namespace
</commit_message>
<xml_diff>
--- a/resources/icons.pptx
+++ b/resources/icons.pptx
@@ -5,10 +5,11 @@
     <p:sldMasterId id="2147483672" r:id="rId1"/>
   </p:sldMasterIdLst>
   <p:notesMasterIdLst>
-    <p:notesMasterId r:id="rId3"/>
+    <p:notesMasterId r:id="rId4"/>
   </p:notesMasterIdLst>
   <p:sldIdLst>
     <p:sldId id="277" r:id="rId2"/>
+    <p:sldId id="278" r:id="rId3"/>
   </p:sldIdLst>
   <p:sldSz cx="5486400" cy="5486400"/>
   <p:notesSz cx="6858000" cy="9144000"/>
@@ -197,7 +198,7 @@
           <a:p>
             <a:fld id="{173FD435-C119-4590-9D53-7CAF83F19020}" type="datetimeFigureOut">
               <a:rPr lang="en-US" smtClean="0"/>
-              <a:t>2/8/2019</a:t>
+              <a:t>3/3/2019</a:t>
             </a:fld>
             <a:endParaRPr lang="en-US"/>
           </a:p>
@@ -548,6 +549,90 @@
 </p:notes>
 </file>
 
+<file path=ppt/notesSlides/notesSlide2.xml><?xml version="1.0" encoding="utf-8"?>
+<p:notes xmlns:a="http://schemas.openxmlformats.org/drawingml/2006/main" xmlns:r="http://schemas.openxmlformats.org/officeDocument/2006/relationships" xmlns:p="http://schemas.openxmlformats.org/presentationml/2006/main">
+  <p:cSld>
+    <p:spTree>
+      <p:nvGrpSpPr>
+        <p:cNvPr id="1" name=""/>
+        <p:cNvGrpSpPr/>
+        <p:nvPr/>
+      </p:nvGrpSpPr>
+      <p:grpSpPr>
+        <a:xfrm>
+          <a:off x="0" y="0"/>
+          <a:ext cx="0" cy="0"/>
+          <a:chOff x="0" y="0"/>
+          <a:chExt cx="0" cy="0"/>
+        </a:xfrm>
+      </p:grpSpPr>
+      <p:sp>
+        <p:nvSpPr>
+          <p:cNvPr id="2" name="Slide Image Placeholder 1"/>
+          <p:cNvSpPr>
+            <a:spLocks noGrp="1" noRot="1" noChangeAspect="1"/>
+          </p:cNvSpPr>
+          <p:nvPr>
+            <p:ph type="sldImg"/>
+          </p:nvPr>
+        </p:nvSpPr>
+        <p:spPr/>
+      </p:sp>
+      <p:sp>
+        <p:nvSpPr>
+          <p:cNvPr id="3" name="Notes Placeholder 2"/>
+          <p:cNvSpPr>
+            <a:spLocks noGrp="1"/>
+          </p:cNvSpPr>
+          <p:nvPr>
+            <p:ph type="body" idx="1"/>
+          </p:nvPr>
+        </p:nvSpPr>
+        <p:spPr/>
+        <p:txBody>
+          <a:bodyPr/>
+          <a:lstStyle/>
+          <a:p>
+            <a:endParaRPr lang="en-US" dirty="0"/>
+          </a:p>
+        </p:txBody>
+      </p:sp>
+      <p:sp>
+        <p:nvSpPr>
+          <p:cNvPr id="4" name="Slide Number Placeholder 3"/>
+          <p:cNvSpPr>
+            <a:spLocks noGrp="1"/>
+          </p:cNvSpPr>
+          <p:nvPr>
+            <p:ph type="sldNum" sz="quarter" idx="10"/>
+          </p:nvPr>
+        </p:nvSpPr>
+        <p:spPr/>
+        <p:txBody>
+          <a:bodyPr/>
+          <a:lstStyle/>
+          <a:p>
+            <a:fld id="{EE6CE23A-BB01-46B4-BDD6-2DE3EFA83C70}" type="slidenum">
+              <a:rPr lang="en-US" smtClean="0"/>
+              <a:t>2</a:t>
+            </a:fld>
+            <a:endParaRPr lang="en-US"/>
+          </a:p>
+        </p:txBody>
+      </p:sp>
+    </p:spTree>
+    <p:extLst>
+      <p:ext uri="{BB962C8B-B14F-4D97-AF65-F5344CB8AC3E}">
+        <p14:creationId xmlns:p14="http://schemas.microsoft.com/office/powerpoint/2010/main" val="1453637158"/>
+      </p:ext>
+    </p:extLst>
+  </p:cSld>
+  <p:clrMapOvr>
+    <a:masterClrMapping/>
+  </p:clrMapOvr>
+</p:notes>
+</file>
+
 <file path=ppt/slideLayouts/slideLayout1.xml><?xml version="1.0" encoding="utf-8"?>
 <p:sldLayout xmlns:a="http://schemas.openxmlformats.org/drawingml/2006/main" xmlns:r="http://schemas.openxmlformats.org/officeDocument/2006/relationships" xmlns:p="http://schemas.openxmlformats.org/presentationml/2006/main" type="title" preserve="1">
   <p:cSld name="Title Slide">
@@ -679,7 +764,7 @@
           <a:p>
             <a:fld id="{D296FE55-24A0-4405-87BA-F203EB2AA989}" type="datetimeFigureOut">
               <a:rPr lang="en-US" smtClean="0"/>
-              <a:t>2/8/2019</a:t>
+              <a:t>3/3/2019</a:t>
             </a:fld>
             <a:endParaRPr lang="en-US"/>
           </a:p>
@@ -849,7 +934,7 @@
           <a:p>
             <a:fld id="{D296FE55-24A0-4405-87BA-F203EB2AA989}" type="datetimeFigureOut">
               <a:rPr lang="en-US" smtClean="0"/>
-              <a:t>2/8/2019</a:t>
+              <a:t>3/3/2019</a:t>
             </a:fld>
             <a:endParaRPr lang="en-US"/>
           </a:p>
@@ -1029,7 +1114,7 @@
           <a:p>
             <a:fld id="{D296FE55-24A0-4405-87BA-F203EB2AA989}" type="datetimeFigureOut">
               <a:rPr lang="en-US" smtClean="0"/>
-              <a:t>2/8/2019</a:t>
+              <a:t>3/3/2019</a:t>
             </a:fld>
             <a:endParaRPr lang="en-US"/>
           </a:p>
@@ -1199,7 +1284,7 @@
           <a:p>
             <a:fld id="{D296FE55-24A0-4405-87BA-F203EB2AA989}" type="datetimeFigureOut">
               <a:rPr lang="en-US" smtClean="0"/>
-              <a:t>2/8/2019</a:t>
+              <a:t>3/3/2019</a:t>
             </a:fld>
             <a:endParaRPr lang="en-US"/>
           </a:p>
@@ -1443,7 +1528,7 @@
           <a:p>
             <a:fld id="{D296FE55-24A0-4405-87BA-F203EB2AA989}" type="datetimeFigureOut">
               <a:rPr lang="en-US" smtClean="0"/>
-              <a:t>2/8/2019</a:t>
+              <a:t>3/3/2019</a:t>
             </a:fld>
             <a:endParaRPr lang="en-US"/>
           </a:p>
@@ -1675,7 +1760,7 @@
           <a:p>
             <a:fld id="{D296FE55-24A0-4405-87BA-F203EB2AA989}" type="datetimeFigureOut">
               <a:rPr lang="en-US" smtClean="0"/>
-              <a:t>2/8/2019</a:t>
+              <a:t>3/3/2019</a:t>
             </a:fld>
             <a:endParaRPr lang="en-US"/>
           </a:p>
@@ -2042,7 +2127,7 @@
           <a:p>
             <a:fld id="{D296FE55-24A0-4405-87BA-F203EB2AA989}" type="datetimeFigureOut">
               <a:rPr lang="en-US" smtClean="0"/>
-              <a:t>2/8/2019</a:t>
+              <a:t>3/3/2019</a:t>
             </a:fld>
             <a:endParaRPr lang="en-US"/>
           </a:p>
@@ -2160,7 +2245,7 @@
           <a:p>
             <a:fld id="{D296FE55-24A0-4405-87BA-F203EB2AA989}" type="datetimeFigureOut">
               <a:rPr lang="en-US" smtClean="0"/>
-              <a:t>2/8/2019</a:t>
+              <a:t>3/3/2019</a:t>
             </a:fld>
             <a:endParaRPr lang="en-US"/>
           </a:p>
@@ -2255,7 +2340,7 @@
           <a:p>
             <a:fld id="{D296FE55-24A0-4405-87BA-F203EB2AA989}" type="datetimeFigureOut">
               <a:rPr lang="en-US" smtClean="0"/>
-              <a:t>2/8/2019</a:t>
+              <a:t>3/3/2019</a:t>
             </a:fld>
             <a:endParaRPr lang="en-US"/>
           </a:p>
@@ -2532,7 +2617,7 @@
           <a:p>
             <a:fld id="{D296FE55-24A0-4405-87BA-F203EB2AA989}" type="datetimeFigureOut">
               <a:rPr lang="en-US" smtClean="0"/>
-              <a:t>2/8/2019</a:t>
+              <a:t>3/3/2019</a:t>
             </a:fld>
             <a:endParaRPr lang="en-US"/>
           </a:p>
@@ -2789,7 +2874,7 @@
           <a:p>
             <a:fld id="{D296FE55-24A0-4405-87BA-F203EB2AA989}" type="datetimeFigureOut">
               <a:rPr lang="en-US" smtClean="0"/>
-              <a:t>2/8/2019</a:t>
+              <a:t>3/3/2019</a:t>
             </a:fld>
             <a:endParaRPr lang="en-US"/>
           </a:p>
@@ -3002,7 +3087,7 @@
           <a:p>
             <a:fld id="{D296FE55-24A0-4405-87BA-F203EB2AA989}" type="datetimeFigureOut">
               <a:rPr lang="en-US" smtClean="0"/>
-              <a:t>2/8/2019</a:t>
+              <a:t>3/3/2019</a:t>
             </a:fld>
             <a:endParaRPr lang="en-US"/>
           </a:p>
@@ -3569,6 +3654,230 @@
     <p:extLst>
       <p:ext uri="{BB962C8B-B14F-4D97-AF65-F5344CB8AC3E}">
         <p14:creationId xmlns:p14="http://schemas.microsoft.com/office/powerpoint/2010/main" val="3723002190"/>
+      </p:ext>
+    </p:extLst>
+  </p:cSld>
+  <p:clrMapOvr>
+    <a:masterClrMapping/>
+  </p:clrMapOvr>
+</p:sld>
+</file>
+
+<file path=ppt/slides/slide2.xml><?xml version="1.0" encoding="utf-8"?>
+<p:sld xmlns:a="http://schemas.openxmlformats.org/drawingml/2006/main" xmlns:r="http://schemas.openxmlformats.org/officeDocument/2006/relationships" xmlns:p="http://schemas.openxmlformats.org/presentationml/2006/main">
+  <p:cSld>
+    <p:spTree>
+      <p:nvGrpSpPr>
+        <p:cNvPr id="1" name=""/>
+        <p:cNvGrpSpPr/>
+        <p:nvPr/>
+      </p:nvGrpSpPr>
+      <p:grpSpPr>
+        <a:xfrm>
+          <a:off x="0" y="0"/>
+          <a:ext cx="0" cy="0"/>
+          <a:chOff x="0" y="0"/>
+          <a:chExt cx="0" cy="0"/>
+        </a:xfrm>
+      </p:grpSpPr>
+      <p:sp>
+        <p:nvSpPr>
+          <p:cNvPr id="7" name="Rectangle 6">
+            <a:extLst>
+              <a:ext uri="{FF2B5EF4-FFF2-40B4-BE49-F238E27FC236}">
+                <a16:creationId xmlns:a16="http://schemas.microsoft.com/office/drawing/2014/main" id="{E374BAB0-D569-4A3B-B4CD-86201611567C}"/>
+              </a:ext>
+            </a:extLst>
+          </p:cNvPr>
+          <p:cNvSpPr/>
+          <p:nvPr/>
+        </p:nvSpPr>
+        <p:spPr>
+          <a:xfrm>
+            <a:off x="21942" y="-657752"/>
+            <a:ext cx="5442516" cy="5386090"/>
+          </a:xfrm>
+          <a:prstGeom prst="rect">
+            <a:avLst/>
+          </a:prstGeom>
+          <a:noFill/>
+        </p:spPr>
+        <p:txBody>
+          <a:bodyPr wrap="none" lIns="91440" tIns="45720" rIns="91440" bIns="45720" anchor="ctr">
+            <a:spAutoFit/>
+            <a:scene3d>
+              <a:camera prst="orthographicFront"/>
+              <a:lightRig rig="soft" dir="t">
+                <a:rot lat="0" lon="0" rev="15600000"/>
+              </a:lightRig>
+            </a:scene3d>
+            <a:sp3d extrusionH="57150" prstMaterial="softEdge">
+              <a:bevelT w="25400" h="38100"/>
+            </a:sp3d>
+          </a:bodyPr>
+          <a:lstStyle/>
+          <a:p>
+            <a:pPr algn="ctr"/>
+            <a:r>
+              <a:rPr lang="en-US" sz="34400" dirty="0">
+                <a:ln/>
+                <a:solidFill>
+                  <a:schemeClr val="accent1">
+                    <a:lumMod val="50000"/>
+                  </a:schemeClr>
+                </a:solidFill>
+                <a:latin typeface="Bahnschrift Condensed" panose="020B0502040204020203" pitchFamily="34" charset="0"/>
+              </a:rPr>
+              <a:t>X</a:t>
+            </a:r>
+            <a:r>
+              <a:rPr lang="en-US" sz="34400" b="1" dirty="0">
+                <a:ln/>
+                <a:solidFill>
+                  <a:schemeClr val="accent1">
+                    <a:lumMod val="50000"/>
+                  </a:schemeClr>
+                </a:solidFill>
+                <a:effectLst>
+                  <a:outerShdw dist="63500" dir="5400000" algn="tl">
+                    <a:srgbClr val="FFC000"/>
+                  </a:outerShdw>
+                </a:effectLst>
+                <a:latin typeface="Bahnschrift Condensed" panose="020B0502040204020203" pitchFamily="34" charset="0"/>
+              </a:rPr>
+              <a:t>S</a:t>
+            </a:r>
+            <a:r>
+              <a:rPr lang="en-US" sz="34400" dirty="0">
+                <a:ln/>
+                <a:solidFill>
+                  <a:schemeClr val="accent1">
+                    <a:lumMod val="50000"/>
+                  </a:schemeClr>
+                </a:solidFill>
+                <a:latin typeface="Bahnschrift Condensed" panose="020B0502040204020203" pitchFamily="34" charset="0"/>
+              </a:rPr>
+              <a:t>F</a:t>
+            </a:r>
+            <a:endParaRPr lang="en-US" sz="34400" cap="none" spc="0" dirty="0">
+              <a:ln/>
+              <a:solidFill>
+                <a:schemeClr val="accent1">
+                  <a:lumMod val="50000"/>
+                </a:schemeClr>
+              </a:solidFill>
+              <a:effectLst/>
+              <a:latin typeface="Bahnschrift Condensed" panose="020B0502040204020203" pitchFamily="34" charset="0"/>
+            </a:endParaRPr>
+          </a:p>
+        </p:txBody>
+      </p:sp>
+      <p:sp>
+        <p:nvSpPr>
+          <p:cNvPr id="10" name="Moon 9">
+            <a:extLst>
+              <a:ext uri="{FF2B5EF4-FFF2-40B4-BE49-F238E27FC236}">
+                <a16:creationId xmlns:a16="http://schemas.microsoft.com/office/drawing/2014/main" id="{6BB50BB6-78A6-4FDA-96EA-93239DE6ECE9}"/>
+              </a:ext>
+            </a:extLst>
+          </p:cNvPr>
+          <p:cNvSpPr>
+            <a:spLocks/>
+          </p:cNvSpPr>
+          <p:nvPr/>
+        </p:nvSpPr>
+        <p:spPr>
+          <a:xfrm rot="16200000">
+            <a:off x="2516005" y="3381744"/>
+            <a:ext cx="454391" cy="1645920"/>
+          </a:xfrm>
+          <a:prstGeom prst="moon">
+            <a:avLst/>
+          </a:prstGeom>
+          <a:ln>
+            <a:noFill/>
+          </a:ln>
+        </p:spPr>
+        <p:style>
+          <a:lnRef idx="2">
+            <a:schemeClr val="accent4">
+              <a:shade val="50000"/>
+            </a:schemeClr>
+          </a:lnRef>
+          <a:fillRef idx="1">
+            <a:schemeClr val="accent4"/>
+          </a:fillRef>
+          <a:effectRef idx="0">
+            <a:schemeClr val="accent4"/>
+          </a:effectRef>
+          <a:fontRef idx="minor">
+            <a:schemeClr val="lt1"/>
+          </a:fontRef>
+        </p:style>
+        <p:txBody>
+          <a:bodyPr rtlCol="0" anchor="ctr"/>
+          <a:lstStyle/>
+          <a:p>
+            <a:pPr algn="ctr"/>
+            <a:endParaRPr lang="en-US"/>
+          </a:p>
+        </p:txBody>
+      </p:sp>
+      <p:sp>
+        <p:nvSpPr>
+          <p:cNvPr id="11" name="Moon 10">
+            <a:extLst>
+              <a:ext uri="{FF2B5EF4-FFF2-40B4-BE49-F238E27FC236}">
+                <a16:creationId xmlns:a16="http://schemas.microsoft.com/office/drawing/2014/main" id="{0DD33751-D60B-4337-8B81-7C94C5796CB4}"/>
+              </a:ext>
+            </a:extLst>
+          </p:cNvPr>
+          <p:cNvSpPr>
+            <a:spLocks/>
+          </p:cNvSpPr>
+          <p:nvPr/>
+        </p:nvSpPr>
+        <p:spPr>
+          <a:xfrm rot="16200000">
+            <a:off x="2451091" y="3622609"/>
+            <a:ext cx="584219" cy="2194560"/>
+          </a:xfrm>
+          <a:prstGeom prst="moon">
+            <a:avLst/>
+          </a:prstGeom>
+          <a:ln>
+            <a:noFill/>
+          </a:ln>
+        </p:spPr>
+        <p:style>
+          <a:lnRef idx="2">
+            <a:schemeClr val="accent4">
+              <a:shade val="50000"/>
+            </a:schemeClr>
+          </a:lnRef>
+          <a:fillRef idx="1">
+            <a:schemeClr val="accent4"/>
+          </a:fillRef>
+          <a:effectRef idx="0">
+            <a:schemeClr val="accent4"/>
+          </a:effectRef>
+          <a:fontRef idx="minor">
+            <a:schemeClr val="lt1"/>
+          </a:fontRef>
+        </p:style>
+        <p:txBody>
+          <a:bodyPr rtlCol="0" anchor="ctr"/>
+          <a:lstStyle/>
+          <a:p>
+            <a:pPr algn="ctr"/>
+            <a:endParaRPr lang="en-US"/>
+          </a:p>
+        </p:txBody>
+      </p:sp>
+    </p:spTree>
+    <p:extLst>
+      <p:ext uri="{BB962C8B-B14F-4D97-AF65-F5344CB8AC3E}">
+        <p14:creationId xmlns:p14="http://schemas.microsoft.com/office/powerpoint/2010/main" val="2360613690"/>
       </p:ext>
     </p:extLst>
   </p:cSld>

</xml_diff>

<commit_message>
added 2d and 3d plot for Jackson model
</commit_message>
<xml_diff>
--- a/resources/icons.pptx
+++ b/resources/icons.pptx
@@ -5,12 +5,14 @@
     <p:sldMasterId id="2147483672" r:id="rId1"/>
   </p:sldMasterIdLst>
   <p:notesMasterIdLst>
-    <p:notesMasterId r:id="rId5"/>
+    <p:notesMasterId r:id="rId7"/>
   </p:notesMasterIdLst>
   <p:sldIdLst>
     <p:sldId id="277" r:id="rId2"/>
     <p:sldId id="279" r:id="rId3"/>
     <p:sldId id="278" r:id="rId4"/>
+    <p:sldId id="280" r:id="rId5"/>
+    <p:sldId id="281" r:id="rId6"/>
   </p:sldIdLst>
   <p:sldSz cx="5486400" cy="5486400"/>
   <p:notesSz cx="6858000" cy="9144000"/>
@@ -199,7 +201,7 @@
           <a:p>
             <a:fld id="{173FD435-C119-4590-9D53-7CAF83F19020}" type="datetimeFigureOut">
               <a:rPr lang="en-US" smtClean="0"/>
-              <a:t>3/3/2019</a:t>
+              <a:t>5/31/2019</a:t>
             </a:fld>
             <a:endParaRPr lang="en-US"/>
           </a:p>
@@ -849,7 +851,7 @@
           <a:p>
             <a:fld id="{D296FE55-24A0-4405-87BA-F203EB2AA989}" type="datetimeFigureOut">
               <a:rPr lang="en-US" smtClean="0"/>
-              <a:t>3/3/2019</a:t>
+              <a:t>5/31/2019</a:t>
             </a:fld>
             <a:endParaRPr lang="en-US"/>
           </a:p>
@@ -1019,7 +1021,7 @@
           <a:p>
             <a:fld id="{D296FE55-24A0-4405-87BA-F203EB2AA989}" type="datetimeFigureOut">
               <a:rPr lang="en-US" smtClean="0"/>
-              <a:t>3/3/2019</a:t>
+              <a:t>5/31/2019</a:t>
             </a:fld>
             <a:endParaRPr lang="en-US"/>
           </a:p>
@@ -1199,7 +1201,7 @@
           <a:p>
             <a:fld id="{D296FE55-24A0-4405-87BA-F203EB2AA989}" type="datetimeFigureOut">
               <a:rPr lang="en-US" smtClean="0"/>
-              <a:t>3/3/2019</a:t>
+              <a:t>5/31/2019</a:t>
             </a:fld>
             <a:endParaRPr lang="en-US"/>
           </a:p>
@@ -1369,7 +1371,7 @@
           <a:p>
             <a:fld id="{D296FE55-24A0-4405-87BA-F203EB2AA989}" type="datetimeFigureOut">
               <a:rPr lang="en-US" smtClean="0"/>
-              <a:t>3/3/2019</a:t>
+              <a:t>5/31/2019</a:t>
             </a:fld>
             <a:endParaRPr lang="en-US"/>
           </a:p>
@@ -1613,7 +1615,7 @@
           <a:p>
             <a:fld id="{D296FE55-24A0-4405-87BA-F203EB2AA989}" type="datetimeFigureOut">
               <a:rPr lang="en-US" smtClean="0"/>
-              <a:t>3/3/2019</a:t>
+              <a:t>5/31/2019</a:t>
             </a:fld>
             <a:endParaRPr lang="en-US"/>
           </a:p>
@@ -1845,7 +1847,7 @@
           <a:p>
             <a:fld id="{D296FE55-24A0-4405-87BA-F203EB2AA989}" type="datetimeFigureOut">
               <a:rPr lang="en-US" smtClean="0"/>
-              <a:t>3/3/2019</a:t>
+              <a:t>5/31/2019</a:t>
             </a:fld>
             <a:endParaRPr lang="en-US"/>
           </a:p>
@@ -2212,7 +2214,7 @@
           <a:p>
             <a:fld id="{D296FE55-24A0-4405-87BA-F203EB2AA989}" type="datetimeFigureOut">
               <a:rPr lang="en-US" smtClean="0"/>
-              <a:t>3/3/2019</a:t>
+              <a:t>5/31/2019</a:t>
             </a:fld>
             <a:endParaRPr lang="en-US"/>
           </a:p>
@@ -2330,7 +2332,7 @@
           <a:p>
             <a:fld id="{D296FE55-24A0-4405-87BA-F203EB2AA989}" type="datetimeFigureOut">
               <a:rPr lang="en-US" smtClean="0"/>
-              <a:t>3/3/2019</a:t>
+              <a:t>5/31/2019</a:t>
             </a:fld>
             <a:endParaRPr lang="en-US"/>
           </a:p>
@@ -2425,7 +2427,7 @@
           <a:p>
             <a:fld id="{D296FE55-24A0-4405-87BA-F203EB2AA989}" type="datetimeFigureOut">
               <a:rPr lang="en-US" smtClean="0"/>
-              <a:t>3/3/2019</a:t>
+              <a:t>5/31/2019</a:t>
             </a:fld>
             <a:endParaRPr lang="en-US"/>
           </a:p>
@@ -2702,7 +2704,7 @@
           <a:p>
             <a:fld id="{D296FE55-24A0-4405-87BA-F203EB2AA989}" type="datetimeFigureOut">
               <a:rPr lang="en-US" smtClean="0"/>
-              <a:t>3/3/2019</a:t>
+              <a:t>5/31/2019</a:t>
             </a:fld>
             <a:endParaRPr lang="en-US"/>
           </a:p>
@@ -2959,7 +2961,7 @@
           <a:p>
             <a:fld id="{D296FE55-24A0-4405-87BA-F203EB2AA989}" type="datetimeFigureOut">
               <a:rPr lang="en-US" smtClean="0"/>
-              <a:t>3/3/2019</a:t>
+              <a:t>5/31/2019</a:t>
             </a:fld>
             <a:endParaRPr lang="en-US"/>
           </a:p>
@@ -3172,7 +3174,7 @@
           <a:p>
             <a:fld id="{D296FE55-24A0-4405-87BA-F203EB2AA989}" type="datetimeFigureOut">
               <a:rPr lang="en-US" smtClean="0"/>
-              <a:t>3/3/2019</a:t>
+              <a:t>5/31/2019</a:t>
             </a:fld>
             <a:endParaRPr lang="en-US"/>
           </a:p>
@@ -4035,6 +4037,1170 @@
     <p:extLst>
       <p:ext uri="{BB962C8B-B14F-4D97-AF65-F5344CB8AC3E}">
         <p14:creationId xmlns:p14="http://schemas.microsoft.com/office/powerpoint/2010/main" val="2360613690"/>
+      </p:ext>
+    </p:extLst>
+  </p:cSld>
+  <p:clrMapOvr>
+    <a:masterClrMapping/>
+  </p:clrMapOvr>
+</p:sld>
+</file>
+
+<file path=ppt/slides/slide4.xml><?xml version="1.0" encoding="utf-8"?>
+<p:sld xmlns:a="http://schemas.openxmlformats.org/drawingml/2006/main" xmlns:r="http://schemas.openxmlformats.org/officeDocument/2006/relationships" xmlns:p="http://schemas.openxmlformats.org/presentationml/2006/main">
+  <p:cSld>
+    <p:spTree>
+      <p:nvGrpSpPr>
+        <p:cNvPr id="1" name=""/>
+        <p:cNvGrpSpPr/>
+        <p:nvPr/>
+      </p:nvGrpSpPr>
+      <p:grpSpPr>
+        <a:xfrm>
+          <a:off x="0" y="0"/>
+          <a:ext cx="0" cy="0"/>
+          <a:chOff x="0" y="0"/>
+          <a:chExt cx="0" cy="0"/>
+        </a:xfrm>
+      </p:grpSpPr>
+      <p:grpSp>
+        <p:nvGrpSpPr>
+          <p:cNvPr id="6" name="Group 5">
+            <a:extLst>
+              <a:ext uri="{FF2B5EF4-FFF2-40B4-BE49-F238E27FC236}">
+                <a16:creationId xmlns:a16="http://schemas.microsoft.com/office/drawing/2014/main" id="{86859F10-88F1-4413-A726-E72897FC228F}"/>
+              </a:ext>
+            </a:extLst>
+          </p:cNvPr>
+          <p:cNvGrpSpPr/>
+          <p:nvPr/>
+        </p:nvGrpSpPr>
+        <p:grpSpPr>
+          <a:xfrm>
+            <a:off x="209973" y="1012613"/>
+            <a:ext cx="5093546" cy="3474720"/>
+            <a:chOff x="247233" y="900844"/>
+            <a:chExt cx="5093546" cy="3474720"/>
+          </a:xfrm>
+        </p:grpSpPr>
+        <p:cxnSp>
+          <p:nvCxnSpPr>
+            <p:cNvPr id="3" name="Straight Arrow Connector 2">
+              <a:extLst>
+                <a:ext uri="{FF2B5EF4-FFF2-40B4-BE49-F238E27FC236}">
+                  <a16:creationId xmlns:a16="http://schemas.microsoft.com/office/drawing/2014/main" id="{EFDD1E1C-D271-45FB-A1BD-B509B5C45BE1}"/>
+                </a:ext>
+              </a:extLst>
+            </p:cNvPr>
+            <p:cNvCxnSpPr/>
+            <p:nvPr/>
+          </p:nvCxnSpPr>
+          <p:spPr>
+            <a:xfrm>
+              <a:off x="247233" y="4273976"/>
+              <a:ext cx="5093546" cy="0"/>
+            </a:xfrm>
+            <a:prstGeom prst="straightConnector1">
+              <a:avLst/>
+            </a:prstGeom>
+            <a:ln w="190500">
+              <a:solidFill>
+                <a:schemeClr val="tx2"/>
+              </a:solidFill>
+              <a:headEnd w="med" len="sm"/>
+              <a:tailEnd type="triangle" w="med" len="sm"/>
+            </a:ln>
+          </p:spPr>
+          <p:style>
+            <a:lnRef idx="1">
+              <a:schemeClr val="accent1"/>
+            </a:lnRef>
+            <a:fillRef idx="0">
+              <a:schemeClr val="accent1"/>
+            </a:fillRef>
+            <a:effectRef idx="0">
+              <a:schemeClr val="accent1"/>
+            </a:effectRef>
+            <a:fontRef idx="minor">
+              <a:schemeClr val="tx1"/>
+            </a:fontRef>
+          </p:style>
+        </p:cxnSp>
+        <p:cxnSp>
+          <p:nvCxnSpPr>
+            <p:cNvPr id="4" name="Straight Arrow Connector 3">
+              <a:extLst>
+                <a:ext uri="{FF2B5EF4-FFF2-40B4-BE49-F238E27FC236}">
+                  <a16:creationId xmlns:a16="http://schemas.microsoft.com/office/drawing/2014/main" id="{5B36365A-1B6C-4BCD-8DE5-9C10CEC1BB52}"/>
+                </a:ext>
+              </a:extLst>
+            </p:cNvPr>
+            <p:cNvCxnSpPr>
+              <a:cxnSpLocks/>
+            </p:cNvCxnSpPr>
+            <p:nvPr/>
+          </p:nvCxnSpPr>
+          <p:spPr>
+            <a:xfrm flipV="1">
+              <a:off x="342055" y="900844"/>
+              <a:ext cx="0" cy="3474720"/>
+            </a:xfrm>
+            <a:prstGeom prst="straightConnector1">
+              <a:avLst/>
+            </a:prstGeom>
+            <a:ln w="190500">
+              <a:solidFill>
+                <a:schemeClr val="tx2"/>
+              </a:solidFill>
+              <a:headEnd w="med" len="sm"/>
+              <a:tailEnd type="triangle" w="med" len="sm"/>
+            </a:ln>
+          </p:spPr>
+          <p:style>
+            <a:lnRef idx="1">
+              <a:schemeClr val="accent1"/>
+            </a:lnRef>
+            <a:fillRef idx="0">
+              <a:schemeClr val="accent1"/>
+            </a:fillRef>
+            <a:effectRef idx="0">
+              <a:schemeClr val="accent1"/>
+            </a:effectRef>
+            <a:fontRef idx="minor">
+              <a:schemeClr val="tx1"/>
+            </a:fontRef>
+          </p:style>
+        </p:cxnSp>
+      </p:grpSp>
+      <p:sp>
+        <p:nvSpPr>
+          <p:cNvPr id="7" name="Freeform: Shape 6">
+            <a:extLst>
+              <a:ext uri="{FF2B5EF4-FFF2-40B4-BE49-F238E27FC236}">
+                <a16:creationId xmlns:a16="http://schemas.microsoft.com/office/drawing/2014/main" id="{926A1611-4F6A-466E-A495-EF557A7F0C30}"/>
+              </a:ext>
+            </a:extLst>
+          </p:cNvPr>
+          <p:cNvSpPr/>
+          <p:nvPr/>
+        </p:nvSpPr>
+        <p:spPr>
+          <a:xfrm>
+            <a:off x="568955" y="1733973"/>
+            <a:ext cx="4114800" cy="2286000"/>
+          </a:xfrm>
+          <a:custGeom>
+            <a:avLst/>
+            <a:gdLst>
+              <a:gd name="connsiteX0" fmla="*/ 0 w 4341706"/>
+              <a:gd name="connsiteY0" fmla="*/ 0 h 2472266"/>
+              <a:gd name="connsiteX1" fmla="*/ 663786 w 4341706"/>
+              <a:gd name="connsiteY1" fmla="*/ 189653 h 2472266"/>
+              <a:gd name="connsiteX2" fmla="*/ 1212426 w 4341706"/>
+              <a:gd name="connsiteY2" fmla="*/ 1124373 h 2472266"/>
+              <a:gd name="connsiteX3" fmla="*/ 1822026 w 4341706"/>
+              <a:gd name="connsiteY3" fmla="*/ 1456266 h 2472266"/>
+              <a:gd name="connsiteX4" fmla="*/ 3393440 w 4341706"/>
+              <a:gd name="connsiteY4" fmla="*/ 1747520 h 2472266"/>
+              <a:gd name="connsiteX5" fmla="*/ 4341706 w 4341706"/>
+              <a:gd name="connsiteY5" fmla="*/ 2472266 h 2472266"/>
+              <a:gd name="connsiteX0" fmla="*/ 0 w 4341706"/>
+              <a:gd name="connsiteY0" fmla="*/ 0 h 2472266"/>
+              <a:gd name="connsiteX1" fmla="*/ 663786 w 4341706"/>
+              <a:gd name="connsiteY1" fmla="*/ 189653 h 2472266"/>
+              <a:gd name="connsiteX2" fmla="*/ 1177468 w 4341706"/>
+              <a:gd name="connsiteY2" fmla="*/ 1124373 h 2472266"/>
+              <a:gd name="connsiteX3" fmla="*/ 1822026 w 4341706"/>
+              <a:gd name="connsiteY3" fmla="*/ 1456266 h 2472266"/>
+              <a:gd name="connsiteX4" fmla="*/ 3393440 w 4341706"/>
+              <a:gd name="connsiteY4" fmla="*/ 1747520 h 2472266"/>
+              <a:gd name="connsiteX5" fmla="*/ 4341706 w 4341706"/>
+              <a:gd name="connsiteY5" fmla="*/ 2472266 h 2472266"/>
+              <a:gd name="connsiteX0" fmla="*/ 0 w 4341706"/>
+              <a:gd name="connsiteY0" fmla="*/ 0 h 2472266"/>
+              <a:gd name="connsiteX1" fmla="*/ 663786 w 4341706"/>
+              <a:gd name="connsiteY1" fmla="*/ 189653 h 2472266"/>
+              <a:gd name="connsiteX2" fmla="*/ 1093571 w 4341706"/>
+              <a:gd name="connsiteY2" fmla="*/ 1124373 h 2472266"/>
+              <a:gd name="connsiteX3" fmla="*/ 1822026 w 4341706"/>
+              <a:gd name="connsiteY3" fmla="*/ 1456266 h 2472266"/>
+              <a:gd name="connsiteX4" fmla="*/ 3393440 w 4341706"/>
+              <a:gd name="connsiteY4" fmla="*/ 1747520 h 2472266"/>
+              <a:gd name="connsiteX5" fmla="*/ 4341706 w 4341706"/>
+              <a:gd name="connsiteY5" fmla="*/ 2472266 h 2472266"/>
+              <a:gd name="connsiteX0" fmla="*/ 0 w 4341706"/>
+              <a:gd name="connsiteY0" fmla="*/ 0 h 2472266"/>
+              <a:gd name="connsiteX1" fmla="*/ 614845 w 4341706"/>
+              <a:gd name="connsiteY1" fmla="*/ 246001 h 2472266"/>
+              <a:gd name="connsiteX2" fmla="*/ 1093571 w 4341706"/>
+              <a:gd name="connsiteY2" fmla="*/ 1124373 h 2472266"/>
+              <a:gd name="connsiteX3" fmla="*/ 1822026 w 4341706"/>
+              <a:gd name="connsiteY3" fmla="*/ 1456266 h 2472266"/>
+              <a:gd name="connsiteX4" fmla="*/ 3393440 w 4341706"/>
+              <a:gd name="connsiteY4" fmla="*/ 1747520 h 2472266"/>
+              <a:gd name="connsiteX5" fmla="*/ 4341706 w 4341706"/>
+              <a:gd name="connsiteY5" fmla="*/ 2472266 h 2472266"/>
+            </a:gdLst>
+            <a:ahLst/>
+            <a:cxnLst>
+              <a:cxn ang="0">
+                <a:pos x="connsiteX0" y="connsiteY0"/>
+              </a:cxn>
+              <a:cxn ang="0">
+                <a:pos x="connsiteX1" y="connsiteY1"/>
+              </a:cxn>
+              <a:cxn ang="0">
+                <a:pos x="connsiteX2" y="connsiteY2"/>
+              </a:cxn>
+              <a:cxn ang="0">
+                <a:pos x="connsiteX3" y="connsiteY3"/>
+              </a:cxn>
+              <a:cxn ang="0">
+                <a:pos x="connsiteX4" y="connsiteY4"/>
+              </a:cxn>
+              <a:cxn ang="0">
+                <a:pos x="connsiteX5" y="connsiteY5"/>
+              </a:cxn>
+            </a:cxnLst>
+            <a:rect l="l" t="t" r="r" b="b"/>
+            <a:pathLst>
+              <a:path w="4341706" h="2472266">
+                <a:moveTo>
+                  <a:pt x="0" y="0"/>
+                </a:moveTo>
+                <a:cubicBezTo>
+                  <a:pt x="230857" y="1129"/>
+                  <a:pt x="432583" y="58606"/>
+                  <a:pt x="614845" y="246001"/>
+                </a:cubicBezTo>
+                <a:cubicBezTo>
+                  <a:pt x="797107" y="433396"/>
+                  <a:pt x="892374" y="922662"/>
+                  <a:pt x="1093571" y="1124373"/>
+                </a:cubicBezTo>
+                <a:cubicBezTo>
+                  <a:pt x="1294768" y="1326084"/>
+                  <a:pt x="1438715" y="1352408"/>
+                  <a:pt x="1822026" y="1456266"/>
+                </a:cubicBezTo>
+                <a:cubicBezTo>
+                  <a:pt x="2205337" y="1560124"/>
+                  <a:pt x="2973493" y="1578187"/>
+                  <a:pt x="3393440" y="1747520"/>
+                </a:cubicBezTo>
+                <a:cubicBezTo>
+                  <a:pt x="3813387" y="1916853"/>
+                  <a:pt x="4077546" y="2194559"/>
+                  <a:pt x="4341706" y="2472266"/>
+                </a:cubicBezTo>
+              </a:path>
+            </a:pathLst>
+          </a:custGeom>
+          <a:noFill/>
+          <a:ln w="152400">
+            <a:solidFill>
+              <a:schemeClr val="accent4"/>
+            </a:solidFill>
+          </a:ln>
+          <a:effectLst>
+            <a:outerShdw blurRad="12700" dist="76200" dir="7200000" algn="t" rotWithShape="0">
+              <a:prstClr val="black">
+                <a:alpha val="40000"/>
+              </a:prstClr>
+            </a:outerShdw>
+          </a:effectLst>
+        </p:spPr>
+        <p:style>
+          <a:lnRef idx="2">
+            <a:schemeClr val="accent1">
+              <a:shade val="50000"/>
+            </a:schemeClr>
+          </a:lnRef>
+          <a:fillRef idx="1">
+            <a:schemeClr val="accent1"/>
+          </a:fillRef>
+          <a:effectRef idx="0">
+            <a:schemeClr val="accent1"/>
+          </a:effectRef>
+          <a:fontRef idx="minor">
+            <a:schemeClr val="lt1"/>
+          </a:fontRef>
+        </p:style>
+        <p:txBody>
+          <a:bodyPr rtlCol="0" anchor="ctr"/>
+          <a:lstStyle/>
+          <a:p>
+            <a:pPr algn="ctr"/>
+            <a:endParaRPr lang="en-US"/>
+          </a:p>
+        </p:txBody>
+      </p:sp>
+    </p:spTree>
+    <p:extLst>
+      <p:ext uri="{BB962C8B-B14F-4D97-AF65-F5344CB8AC3E}">
+        <p14:creationId xmlns:p14="http://schemas.microsoft.com/office/powerpoint/2010/main" val="2454583062"/>
+      </p:ext>
+    </p:extLst>
+  </p:cSld>
+  <p:clrMapOvr>
+    <a:masterClrMapping/>
+  </p:clrMapOvr>
+</p:sld>
+</file>
+
+<file path=ppt/slides/slide5.xml><?xml version="1.0" encoding="utf-8"?>
+<p:sld xmlns:a="http://schemas.openxmlformats.org/drawingml/2006/main" xmlns:r="http://schemas.openxmlformats.org/officeDocument/2006/relationships" xmlns:p="http://schemas.openxmlformats.org/presentationml/2006/main">
+  <p:cSld>
+    <p:spTree>
+      <p:nvGrpSpPr>
+        <p:cNvPr id="1" name=""/>
+        <p:cNvGrpSpPr/>
+        <p:nvPr/>
+      </p:nvGrpSpPr>
+      <p:grpSpPr>
+        <a:xfrm>
+          <a:off x="0" y="0"/>
+          <a:ext cx="0" cy="0"/>
+          <a:chOff x="0" y="0"/>
+          <a:chExt cx="0" cy="0"/>
+        </a:xfrm>
+      </p:grpSpPr>
+      <p:cxnSp>
+        <p:nvCxnSpPr>
+          <p:cNvPr id="8" name="Straight Arrow Connector 7">
+            <a:extLst>
+              <a:ext uri="{FF2B5EF4-FFF2-40B4-BE49-F238E27FC236}">
+                <a16:creationId xmlns:a16="http://schemas.microsoft.com/office/drawing/2014/main" id="{D02AF6BC-46E4-49E9-8F3F-340D236FA797}"/>
+              </a:ext>
+            </a:extLst>
+          </p:cNvPr>
+          <p:cNvCxnSpPr>
+            <a:cxnSpLocks/>
+          </p:cNvCxnSpPr>
+          <p:nvPr/>
+        </p:nvCxnSpPr>
+        <p:spPr>
+          <a:xfrm flipV="1">
+            <a:off x="379307" y="3156373"/>
+            <a:ext cx="677333" cy="1171788"/>
+          </a:xfrm>
+          <a:prstGeom prst="straightConnector1">
+            <a:avLst/>
+          </a:prstGeom>
+          <a:ln w="190500">
+            <a:solidFill>
+              <a:schemeClr val="tx2">
+                <a:lumMod val="60000"/>
+                <a:lumOff val="40000"/>
+              </a:schemeClr>
+            </a:solidFill>
+            <a:headEnd w="med" len="sm"/>
+            <a:tailEnd type="triangle" w="med" len="sm"/>
+          </a:ln>
+        </p:spPr>
+        <p:style>
+          <a:lnRef idx="1">
+            <a:schemeClr val="accent1"/>
+          </a:lnRef>
+          <a:fillRef idx="0">
+            <a:schemeClr val="accent1"/>
+          </a:fillRef>
+          <a:effectRef idx="0">
+            <a:schemeClr val="accent1"/>
+          </a:effectRef>
+          <a:fontRef idx="minor">
+            <a:schemeClr val="tx1"/>
+          </a:fontRef>
+        </p:style>
+      </p:cxnSp>
+      <p:grpSp>
+        <p:nvGrpSpPr>
+          <p:cNvPr id="6" name="Group 5">
+            <a:extLst>
+              <a:ext uri="{FF2B5EF4-FFF2-40B4-BE49-F238E27FC236}">
+                <a16:creationId xmlns:a16="http://schemas.microsoft.com/office/drawing/2014/main" id="{86859F10-88F1-4413-A726-E72897FC228F}"/>
+              </a:ext>
+            </a:extLst>
+          </p:cNvPr>
+          <p:cNvGrpSpPr/>
+          <p:nvPr/>
+        </p:nvGrpSpPr>
+        <p:grpSpPr>
+          <a:xfrm>
+            <a:off x="209973" y="1012613"/>
+            <a:ext cx="5093546" cy="3474720"/>
+            <a:chOff x="247233" y="900844"/>
+            <a:chExt cx="5093546" cy="3474720"/>
+          </a:xfrm>
+        </p:grpSpPr>
+        <p:cxnSp>
+          <p:nvCxnSpPr>
+            <p:cNvPr id="3" name="Straight Arrow Connector 2">
+              <a:extLst>
+                <a:ext uri="{FF2B5EF4-FFF2-40B4-BE49-F238E27FC236}">
+                  <a16:creationId xmlns:a16="http://schemas.microsoft.com/office/drawing/2014/main" id="{EFDD1E1C-D271-45FB-A1BD-B509B5C45BE1}"/>
+                </a:ext>
+              </a:extLst>
+            </p:cNvPr>
+            <p:cNvCxnSpPr/>
+            <p:nvPr/>
+          </p:nvCxnSpPr>
+          <p:spPr>
+            <a:xfrm>
+              <a:off x="247233" y="4273976"/>
+              <a:ext cx="5093546" cy="0"/>
+            </a:xfrm>
+            <a:prstGeom prst="straightConnector1">
+              <a:avLst/>
+            </a:prstGeom>
+            <a:ln w="190500">
+              <a:solidFill>
+                <a:schemeClr val="tx2"/>
+              </a:solidFill>
+              <a:headEnd w="med" len="sm"/>
+              <a:tailEnd type="triangle" w="med" len="sm"/>
+            </a:ln>
+          </p:spPr>
+          <p:style>
+            <a:lnRef idx="1">
+              <a:schemeClr val="accent1"/>
+            </a:lnRef>
+            <a:fillRef idx="0">
+              <a:schemeClr val="accent1"/>
+            </a:fillRef>
+            <a:effectRef idx="0">
+              <a:schemeClr val="accent1"/>
+            </a:effectRef>
+            <a:fontRef idx="minor">
+              <a:schemeClr val="tx1"/>
+            </a:fontRef>
+          </p:style>
+        </p:cxnSp>
+        <p:cxnSp>
+          <p:nvCxnSpPr>
+            <p:cNvPr id="4" name="Straight Arrow Connector 3">
+              <a:extLst>
+                <a:ext uri="{FF2B5EF4-FFF2-40B4-BE49-F238E27FC236}">
+                  <a16:creationId xmlns:a16="http://schemas.microsoft.com/office/drawing/2014/main" id="{5B36365A-1B6C-4BCD-8DE5-9C10CEC1BB52}"/>
+                </a:ext>
+              </a:extLst>
+            </p:cNvPr>
+            <p:cNvCxnSpPr>
+              <a:cxnSpLocks/>
+            </p:cNvCxnSpPr>
+            <p:nvPr/>
+          </p:nvCxnSpPr>
+          <p:spPr>
+            <a:xfrm flipV="1">
+              <a:off x="342055" y="900844"/>
+              <a:ext cx="0" cy="3474720"/>
+            </a:xfrm>
+            <a:prstGeom prst="straightConnector1">
+              <a:avLst/>
+            </a:prstGeom>
+            <a:ln w="190500">
+              <a:solidFill>
+                <a:schemeClr val="tx2"/>
+              </a:solidFill>
+              <a:headEnd w="med" len="sm"/>
+              <a:tailEnd type="triangle" w="med" len="sm"/>
+            </a:ln>
+          </p:spPr>
+          <p:style>
+            <a:lnRef idx="1">
+              <a:schemeClr val="accent1"/>
+            </a:lnRef>
+            <a:fillRef idx="0">
+              <a:schemeClr val="accent1"/>
+            </a:fillRef>
+            <a:effectRef idx="0">
+              <a:schemeClr val="accent1"/>
+            </a:effectRef>
+            <a:fontRef idx="minor">
+              <a:schemeClr val="tx1"/>
+            </a:fontRef>
+          </p:style>
+        </p:cxnSp>
+      </p:grpSp>
+      <p:sp>
+        <p:nvSpPr>
+          <p:cNvPr id="7" name="Freeform: Shape 6">
+            <a:extLst>
+              <a:ext uri="{FF2B5EF4-FFF2-40B4-BE49-F238E27FC236}">
+                <a16:creationId xmlns:a16="http://schemas.microsoft.com/office/drawing/2014/main" id="{926A1611-4F6A-466E-A495-EF557A7F0C30}"/>
+              </a:ext>
+            </a:extLst>
+          </p:cNvPr>
+          <p:cNvSpPr/>
+          <p:nvPr/>
+        </p:nvSpPr>
+        <p:spPr>
+          <a:xfrm>
+            <a:off x="677330" y="1930399"/>
+            <a:ext cx="3986106" cy="2103119"/>
+          </a:xfrm>
+          <a:custGeom>
+            <a:avLst/>
+            <a:gdLst>
+              <a:gd name="connsiteX0" fmla="*/ 0 w 4341706"/>
+              <a:gd name="connsiteY0" fmla="*/ 0 h 2472266"/>
+              <a:gd name="connsiteX1" fmla="*/ 663786 w 4341706"/>
+              <a:gd name="connsiteY1" fmla="*/ 189653 h 2472266"/>
+              <a:gd name="connsiteX2" fmla="*/ 1212426 w 4341706"/>
+              <a:gd name="connsiteY2" fmla="*/ 1124373 h 2472266"/>
+              <a:gd name="connsiteX3" fmla="*/ 1822026 w 4341706"/>
+              <a:gd name="connsiteY3" fmla="*/ 1456266 h 2472266"/>
+              <a:gd name="connsiteX4" fmla="*/ 3393440 w 4341706"/>
+              <a:gd name="connsiteY4" fmla="*/ 1747520 h 2472266"/>
+              <a:gd name="connsiteX5" fmla="*/ 4341706 w 4341706"/>
+              <a:gd name="connsiteY5" fmla="*/ 2472266 h 2472266"/>
+              <a:gd name="connsiteX0" fmla="*/ 0 w 4341706"/>
+              <a:gd name="connsiteY0" fmla="*/ 0 h 2472266"/>
+              <a:gd name="connsiteX1" fmla="*/ 663786 w 4341706"/>
+              <a:gd name="connsiteY1" fmla="*/ 189653 h 2472266"/>
+              <a:gd name="connsiteX2" fmla="*/ 1177468 w 4341706"/>
+              <a:gd name="connsiteY2" fmla="*/ 1124373 h 2472266"/>
+              <a:gd name="connsiteX3" fmla="*/ 1822026 w 4341706"/>
+              <a:gd name="connsiteY3" fmla="*/ 1456266 h 2472266"/>
+              <a:gd name="connsiteX4" fmla="*/ 3393440 w 4341706"/>
+              <a:gd name="connsiteY4" fmla="*/ 1747520 h 2472266"/>
+              <a:gd name="connsiteX5" fmla="*/ 4341706 w 4341706"/>
+              <a:gd name="connsiteY5" fmla="*/ 2472266 h 2472266"/>
+              <a:gd name="connsiteX0" fmla="*/ 0 w 4341706"/>
+              <a:gd name="connsiteY0" fmla="*/ 0 h 2472266"/>
+              <a:gd name="connsiteX1" fmla="*/ 663786 w 4341706"/>
+              <a:gd name="connsiteY1" fmla="*/ 189653 h 2472266"/>
+              <a:gd name="connsiteX2" fmla="*/ 1093571 w 4341706"/>
+              <a:gd name="connsiteY2" fmla="*/ 1124373 h 2472266"/>
+              <a:gd name="connsiteX3" fmla="*/ 1822026 w 4341706"/>
+              <a:gd name="connsiteY3" fmla="*/ 1456266 h 2472266"/>
+              <a:gd name="connsiteX4" fmla="*/ 3393440 w 4341706"/>
+              <a:gd name="connsiteY4" fmla="*/ 1747520 h 2472266"/>
+              <a:gd name="connsiteX5" fmla="*/ 4341706 w 4341706"/>
+              <a:gd name="connsiteY5" fmla="*/ 2472266 h 2472266"/>
+              <a:gd name="connsiteX0" fmla="*/ 0 w 4341706"/>
+              <a:gd name="connsiteY0" fmla="*/ 0 h 2472266"/>
+              <a:gd name="connsiteX1" fmla="*/ 614845 w 4341706"/>
+              <a:gd name="connsiteY1" fmla="*/ 246001 h 2472266"/>
+              <a:gd name="connsiteX2" fmla="*/ 1093571 w 4341706"/>
+              <a:gd name="connsiteY2" fmla="*/ 1124373 h 2472266"/>
+              <a:gd name="connsiteX3" fmla="*/ 1822026 w 4341706"/>
+              <a:gd name="connsiteY3" fmla="*/ 1456266 h 2472266"/>
+              <a:gd name="connsiteX4" fmla="*/ 3393440 w 4341706"/>
+              <a:gd name="connsiteY4" fmla="*/ 1747520 h 2472266"/>
+              <a:gd name="connsiteX5" fmla="*/ 4341706 w 4341706"/>
+              <a:gd name="connsiteY5" fmla="*/ 2472266 h 2472266"/>
+              <a:gd name="connsiteX0" fmla="*/ 0 w 4341706"/>
+              <a:gd name="connsiteY0" fmla="*/ 0 h 2472266"/>
+              <a:gd name="connsiteX1" fmla="*/ 593404 w 4341706"/>
+              <a:gd name="connsiteY1" fmla="*/ 297278 h 2472266"/>
+              <a:gd name="connsiteX2" fmla="*/ 1093571 w 4341706"/>
+              <a:gd name="connsiteY2" fmla="*/ 1124373 h 2472266"/>
+              <a:gd name="connsiteX3" fmla="*/ 1822026 w 4341706"/>
+              <a:gd name="connsiteY3" fmla="*/ 1456266 h 2472266"/>
+              <a:gd name="connsiteX4" fmla="*/ 3393440 w 4341706"/>
+              <a:gd name="connsiteY4" fmla="*/ 1747520 h 2472266"/>
+              <a:gd name="connsiteX5" fmla="*/ 4341706 w 4341706"/>
+              <a:gd name="connsiteY5" fmla="*/ 2472266 h 2472266"/>
+              <a:gd name="connsiteX0" fmla="*/ 0 w 4205915"/>
+              <a:gd name="connsiteY0" fmla="*/ 0 h 2401742"/>
+              <a:gd name="connsiteX1" fmla="*/ 457613 w 4205915"/>
+              <a:gd name="connsiteY1" fmla="*/ 226754 h 2401742"/>
+              <a:gd name="connsiteX2" fmla="*/ 957780 w 4205915"/>
+              <a:gd name="connsiteY2" fmla="*/ 1053849 h 2401742"/>
+              <a:gd name="connsiteX3" fmla="*/ 1686235 w 4205915"/>
+              <a:gd name="connsiteY3" fmla="*/ 1385742 h 2401742"/>
+              <a:gd name="connsiteX4" fmla="*/ 3257649 w 4205915"/>
+              <a:gd name="connsiteY4" fmla="*/ 1676996 h 2401742"/>
+              <a:gd name="connsiteX5" fmla="*/ 4205915 w 4205915"/>
+              <a:gd name="connsiteY5" fmla="*/ 2401742 h 2401742"/>
+              <a:gd name="connsiteX0" fmla="*/ 0 w 4205915"/>
+              <a:gd name="connsiteY0" fmla="*/ 0 h 2433087"/>
+              <a:gd name="connsiteX1" fmla="*/ 457613 w 4205915"/>
+              <a:gd name="connsiteY1" fmla="*/ 258099 h 2433087"/>
+              <a:gd name="connsiteX2" fmla="*/ 957780 w 4205915"/>
+              <a:gd name="connsiteY2" fmla="*/ 1085194 h 2433087"/>
+              <a:gd name="connsiteX3" fmla="*/ 1686235 w 4205915"/>
+              <a:gd name="connsiteY3" fmla="*/ 1417087 h 2433087"/>
+              <a:gd name="connsiteX4" fmla="*/ 3257649 w 4205915"/>
+              <a:gd name="connsiteY4" fmla="*/ 1708341 h 2433087"/>
+              <a:gd name="connsiteX5" fmla="*/ 4205915 w 4205915"/>
+              <a:gd name="connsiteY5" fmla="*/ 2433087 h 2433087"/>
+              <a:gd name="connsiteX0" fmla="*/ 0 w 4205915"/>
+              <a:gd name="connsiteY0" fmla="*/ 0 h 2433087"/>
+              <a:gd name="connsiteX1" fmla="*/ 457613 w 4205915"/>
+              <a:gd name="connsiteY1" fmla="*/ 258099 h 2433087"/>
+              <a:gd name="connsiteX2" fmla="*/ 957780 w 4205915"/>
+              <a:gd name="connsiteY2" fmla="*/ 1085194 h 2433087"/>
+              <a:gd name="connsiteX3" fmla="*/ 1686235 w 4205915"/>
+              <a:gd name="connsiteY3" fmla="*/ 1417087 h 2433087"/>
+              <a:gd name="connsiteX4" fmla="*/ 3257649 w 4205915"/>
+              <a:gd name="connsiteY4" fmla="*/ 1708341 h 2433087"/>
+              <a:gd name="connsiteX5" fmla="*/ 4205915 w 4205915"/>
+              <a:gd name="connsiteY5" fmla="*/ 2433087 h 2433087"/>
+            </a:gdLst>
+            <a:ahLst/>
+            <a:cxnLst>
+              <a:cxn ang="0">
+                <a:pos x="connsiteX0" y="connsiteY0"/>
+              </a:cxn>
+              <a:cxn ang="0">
+                <a:pos x="connsiteX1" y="connsiteY1"/>
+              </a:cxn>
+              <a:cxn ang="0">
+                <a:pos x="connsiteX2" y="connsiteY2"/>
+              </a:cxn>
+              <a:cxn ang="0">
+                <a:pos x="connsiteX3" y="connsiteY3"/>
+              </a:cxn>
+              <a:cxn ang="0">
+                <a:pos x="connsiteX4" y="connsiteY4"/>
+              </a:cxn>
+              <a:cxn ang="0">
+                <a:pos x="connsiteX5" y="connsiteY5"/>
+              </a:cxn>
+            </a:cxnLst>
+            <a:rect l="l" t="t" r="r" b="b"/>
+            <a:pathLst>
+              <a:path w="4205915" h="2433087">
+                <a:moveTo>
+                  <a:pt x="0" y="0"/>
+                </a:moveTo>
+                <a:cubicBezTo>
+                  <a:pt x="223709" y="40309"/>
+                  <a:pt x="297983" y="77233"/>
+                  <a:pt x="457613" y="258099"/>
+                </a:cubicBezTo>
+                <a:cubicBezTo>
+                  <a:pt x="617243" y="438965"/>
+                  <a:pt x="753010" y="892029"/>
+                  <a:pt x="957780" y="1085194"/>
+                </a:cubicBezTo>
+                <a:cubicBezTo>
+                  <a:pt x="1162550" y="1278359"/>
+                  <a:pt x="1302924" y="1313229"/>
+                  <a:pt x="1686235" y="1417087"/>
+                </a:cubicBezTo>
+                <a:cubicBezTo>
+                  <a:pt x="2069546" y="1520945"/>
+                  <a:pt x="2837702" y="1539008"/>
+                  <a:pt x="3257649" y="1708341"/>
+                </a:cubicBezTo>
+                <a:cubicBezTo>
+                  <a:pt x="3677596" y="1877674"/>
+                  <a:pt x="3941755" y="2155380"/>
+                  <a:pt x="4205915" y="2433087"/>
+                </a:cubicBezTo>
+              </a:path>
+            </a:pathLst>
+          </a:custGeom>
+          <a:noFill/>
+          <a:ln w="152400">
+            <a:solidFill>
+              <a:schemeClr val="accent4">
+                <a:lumMod val="60000"/>
+                <a:lumOff val="40000"/>
+              </a:schemeClr>
+            </a:solidFill>
+          </a:ln>
+          <a:effectLst>
+            <a:outerShdw blurRad="12700" dist="76200" dir="7200000" algn="t" rotWithShape="0">
+              <a:prstClr val="black">
+                <a:alpha val="40000"/>
+              </a:prstClr>
+            </a:outerShdw>
+          </a:effectLst>
+        </p:spPr>
+        <p:style>
+          <a:lnRef idx="2">
+            <a:schemeClr val="accent1">
+              <a:shade val="50000"/>
+            </a:schemeClr>
+          </a:lnRef>
+          <a:fillRef idx="1">
+            <a:schemeClr val="accent1"/>
+          </a:fillRef>
+          <a:effectRef idx="0">
+            <a:schemeClr val="accent1"/>
+          </a:effectRef>
+          <a:fontRef idx="minor">
+            <a:schemeClr val="lt1"/>
+          </a:fontRef>
+        </p:style>
+        <p:txBody>
+          <a:bodyPr rtlCol="0" anchor="ctr"/>
+          <a:lstStyle/>
+          <a:p>
+            <a:pPr algn="ctr"/>
+            <a:endParaRPr lang="en-US"/>
+          </a:p>
+        </p:txBody>
+      </p:sp>
+      <p:sp>
+        <p:nvSpPr>
+          <p:cNvPr id="10" name="Freeform: Shape 9">
+            <a:extLst>
+              <a:ext uri="{FF2B5EF4-FFF2-40B4-BE49-F238E27FC236}">
+                <a16:creationId xmlns:a16="http://schemas.microsoft.com/office/drawing/2014/main" id="{AB9C2B95-9E47-4054-815E-94ADA1164998}"/>
+              </a:ext>
+            </a:extLst>
+          </p:cNvPr>
+          <p:cNvSpPr/>
+          <p:nvPr/>
+        </p:nvSpPr>
+        <p:spPr>
+          <a:xfrm>
+            <a:off x="853436" y="1595109"/>
+            <a:ext cx="3982719" cy="2218266"/>
+          </a:xfrm>
+          <a:custGeom>
+            <a:avLst/>
+            <a:gdLst>
+              <a:gd name="connsiteX0" fmla="*/ 0 w 4341706"/>
+              <a:gd name="connsiteY0" fmla="*/ 0 h 2472266"/>
+              <a:gd name="connsiteX1" fmla="*/ 663786 w 4341706"/>
+              <a:gd name="connsiteY1" fmla="*/ 189653 h 2472266"/>
+              <a:gd name="connsiteX2" fmla="*/ 1212426 w 4341706"/>
+              <a:gd name="connsiteY2" fmla="*/ 1124373 h 2472266"/>
+              <a:gd name="connsiteX3" fmla="*/ 1822026 w 4341706"/>
+              <a:gd name="connsiteY3" fmla="*/ 1456266 h 2472266"/>
+              <a:gd name="connsiteX4" fmla="*/ 3393440 w 4341706"/>
+              <a:gd name="connsiteY4" fmla="*/ 1747520 h 2472266"/>
+              <a:gd name="connsiteX5" fmla="*/ 4341706 w 4341706"/>
+              <a:gd name="connsiteY5" fmla="*/ 2472266 h 2472266"/>
+              <a:gd name="connsiteX0" fmla="*/ 0 w 4341706"/>
+              <a:gd name="connsiteY0" fmla="*/ 0 h 2472266"/>
+              <a:gd name="connsiteX1" fmla="*/ 663786 w 4341706"/>
+              <a:gd name="connsiteY1" fmla="*/ 189653 h 2472266"/>
+              <a:gd name="connsiteX2" fmla="*/ 1177468 w 4341706"/>
+              <a:gd name="connsiteY2" fmla="*/ 1124373 h 2472266"/>
+              <a:gd name="connsiteX3" fmla="*/ 1822026 w 4341706"/>
+              <a:gd name="connsiteY3" fmla="*/ 1456266 h 2472266"/>
+              <a:gd name="connsiteX4" fmla="*/ 3393440 w 4341706"/>
+              <a:gd name="connsiteY4" fmla="*/ 1747520 h 2472266"/>
+              <a:gd name="connsiteX5" fmla="*/ 4341706 w 4341706"/>
+              <a:gd name="connsiteY5" fmla="*/ 2472266 h 2472266"/>
+              <a:gd name="connsiteX0" fmla="*/ 0 w 4341706"/>
+              <a:gd name="connsiteY0" fmla="*/ 0 h 2472266"/>
+              <a:gd name="connsiteX1" fmla="*/ 663786 w 4341706"/>
+              <a:gd name="connsiteY1" fmla="*/ 189653 h 2472266"/>
+              <a:gd name="connsiteX2" fmla="*/ 1093571 w 4341706"/>
+              <a:gd name="connsiteY2" fmla="*/ 1124373 h 2472266"/>
+              <a:gd name="connsiteX3" fmla="*/ 1822026 w 4341706"/>
+              <a:gd name="connsiteY3" fmla="*/ 1456266 h 2472266"/>
+              <a:gd name="connsiteX4" fmla="*/ 3393440 w 4341706"/>
+              <a:gd name="connsiteY4" fmla="*/ 1747520 h 2472266"/>
+              <a:gd name="connsiteX5" fmla="*/ 4341706 w 4341706"/>
+              <a:gd name="connsiteY5" fmla="*/ 2472266 h 2472266"/>
+              <a:gd name="connsiteX0" fmla="*/ 0 w 4341706"/>
+              <a:gd name="connsiteY0" fmla="*/ 0 h 2472266"/>
+              <a:gd name="connsiteX1" fmla="*/ 614845 w 4341706"/>
+              <a:gd name="connsiteY1" fmla="*/ 246001 h 2472266"/>
+              <a:gd name="connsiteX2" fmla="*/ 1093571 w 4341706"/>
+              <a:gd name="connsiteY2" fmla="*/ 1124373 h 2472266"/>
+              <a:gd name="connsiteX3" fmla="*/ 1822026 w 4341706"/>
+              <a:gd name="connsiteY3" fmla="*/ 1456266 h 2472266"/>
+              <a:gd name="connsiteX4" fmla="*/ 3393440 w 4341706"/>
+              <a:gd name="connsiteY4" fmla="*/ 1747520 h 2472266"/>
+              <a:gd name="connsiteX5" fmla="*/ 4341706 w 4341706"/>
+              <a:gd name="connsiteY5" fmla="*/ 2472266 h 2472266"/>
+              <a:gd name="connsiteX0" fmla="*/ 0 w 4568293"/>
+              <a:gd name="connsiteY0" fmla="*/ 0 h 2472266"/>
+              <a:gd name="connsiteX1" fmla="*/ 841432 w 4568293"/>
+              <a:gd name="connsiteY1" fmla="*/ 246001 h 2472266"/>
+              <a:gd name="connsiteX2" fmla="*/ 1320158 w 4568293"/>
+              <a:gd name="connsiteY2" fmla="*/ 1124373 h 2472266"/>
+              <a:gd name="connsiteX3" fmla="*/ 2048613 w 4568293"/>
+              <a:gd name="connsiteY3" fmla="*/ 1456266 h 2472266"/>
+              <a:gd name="connsiteX4" fmla="*/ 3620027 w 4568293"/>
+              <a:gd name="connsiteY4" fmla="*/ 1747520 h 2472266"/>
+              <a:gd name="connsiteX5" fmla="*/ 4568293 w 4568293"/>
+              <a:gd name="connsiteY5" fmla="*/ 2472266 h 2472266"/>
+              <a:gd name="connsiteX0" fmla="*/ 0 w 4568293"/>
+              <a:gd name="connsiteY0" fmla="*/ 0 h 2472266"/>
+              <a:gd name="connsiteX1" fmla="*/ 834123 w 4568293"/>
+              <a:gd name="connsiteY1" fmla="*/ 282627 h 2472266"/>
+              <a:gd name="connsiteX2" fmla="*/ 1320158 w 4568293"/>
+              <a:gd name="connsiteY2" fmla="*/ 1124373 h 2472266"/>
+              <a:gd name="connsiteX3" fmla="*/ 2048613 w 4568293"/>
+              <a:gd name="connsiteY3" fmla="*/ 1456266 h 2472266"/>
+              <a:gd name="connsiteX4" fmla="*/ 3620027 w 4568293"/>
+              <a:gd name="connsiteY4" fmla="*/ 1747520 h 2472266"/>
+              <a:gd name="connsiteX5" fmla="*/ 4568293 w 4568293"/>
+              <a:gd name="connsiteY5" fmla="*/ 2472266 h 2472266"/>
+              <a:gd name="connsiteX0" fmla="*/ 0 w 4568293"/>
+              <a:gd name="connsiteY0" fmla="*/ 0 h 2472266"/>
+              <a:gd name="connsiteX1" fmla="*/ 819505 w 4568293"/>
+              <a:gd name="connsiteY1" fmla="*/ 304602 h 2472266"/>
+              <a:gd name="connsiteX2" fmla="*/ 1320158 w 4568293"/>
+              <a:gd name="connsiteY2" fmla="*/ 1124373 h 2472266"/>
+              <a:gd name="connsiteX3" fmla="*/ 2048613 w 4568293"/>
+              <a:gd name="connsiteY3" fmla="*/ 1456266 h 2472266"/>
+              <a:gd name="connsiteX4" fmla="*/ 3620027 w 4568293"/>
+              <a:gd name="connsiteY4" fmla="*/ 1747520 h 2472266"/>
+              <a:gd name="connsiteX5" fmla="*/ 4568293 w 4568293"/>
+              <a:gd name="connsiteY5" fmla="*/ 2472266 h 2472266"/>
+              <a:gd name="connsiteX0" fmla="*/ 0 w 4568293"/>
+              <a:gd name="connsiteY0" fmla="*/ 0 h 2472266"/>
+              <a:gd name="connsiteX1" fmla="*/ 819505 w 4568293"/>
+              <a:gd name="connsiteY1" fmla="*/ 304602 h 2472266"/>
+              <a:gd name="connsiteX2" fmla="*/ 1320158 w 4568293"/>
+              <a:gd name="connsiteY2" fmla="*/ 1124373 h 2472266"/>
+              <a:gd name="connsiteX3" fmla="*/ 2048613 w 4568293"/>
+              <a:gd name="connsiteY3" fmla="*/ 1456266 h 2472266"/>
+              <a:gd name="connsiteX4" fmla="*/ 3620027 w 4568293"/>
+              <a:gd name="connsiteY4" fmla="*/ 1747520 h 2472266"/>
+              <a:gd name="connsiteX5" fmla="*/ 4568293 w 4568293"/>
+              <a:gd name="connsiteY5" fmla="*/ 2472266 h 2472266"/>
+              <a:gd name="connsiteX0" fmla="*/ 0 w 4243533"/>
+              <a:gd name="connsiteY0" fmla="*/ 0 h 2399013"/>
+              <a:gd name="connsiteX1" fmla="*/ 494745 w 4243533"/>
+              <a:gd name="connsiteY1" fmla="*/ 231349 h 2399013"/>
+              <a:gd name="connsiteX2" fmla="*/ 995398 w 4243533"/>
+              <a:gd name="connsiteY2" fmla="*/ 1051120 h 2399013"/>
+              <a:gd name="connsiteX3" fmla="*/ 1723853 w 4243533"/>
+              <a:gd name="connsiteY3" fmla="*/ 1383013 h 2399013"/>
+              <a:gd name="connsiteX4" fmla="*/ 3295267 w 4243533"/>
+              <a:gd name="connsiteY4" fmla="*/ 1674267 h 2399013"/>
+              <a:gd name="connsiteX5" fmla="*/ 4243533 w 4243533"/>
+              <a:gd name="connsiteY5" fmla="*/ 2399013 h 2399013"/>
+              <a:gd name="connsiteX0" fmla="*/ 0 w 4243533"/>
+              <a:gd name="connsiteY0" fmla="*/ 0 h 2399013"/>
+              <a:gd name="connsiteX1" fmla="*/ 494745 w 4243533"/>
+              <a:gd name="connsiteY1" fmla="*/ 231349 h 2399013"/>
+              <a:gd name="connsiteX2" fmla="*/ 995398 w 4243533"/>
+              <a:gd name="connsiteY2" fmla="*/ 1051120 h 2399013"/>
+              <a:gd name="connsiteX3" fmla="*/ 1723853 w 4243533"/>
+              <a:gd name="connsiteY3" fmla="*/ 1383013 h 2399013"/>
+              <a:gd name="connsiteX4" fmla="*/ 3295267 w 4243533"/>
+              <a:gd name="connsiteY4" fmla="*/ 1674267 h 2399013"/>
+              <a:gd name="connsiteX5" fmla="*/ 4243533 w 4243533"/>
+              <a:gd name="connsiteY5" fmla="*/ 2399013 h 2399013"/>
+              <a:gd name="connsiteX0" fmla="*/ 0 w 4243533"/>
+              <a:gd name="connsiteY0" fmla="*/ 0 h 2399013"/>
+              <a:gd name="connsiteX1" fmla="*/ 480312 w 4243533"/>
+              <a:gd name="connsiteY1" fmla="*/ 282626 h 2399013"/>
+              <a:gd name="connsiteX2" fmla="*/ 995398 w 4243533"/>
+              <a:gd name="connsiteY2" fmla="*/ 1051120 h 2399013"/>
+              <a:gd name="connsiteX3" fmla="*/ 1723853 w 4243533"/>
+              <a:gd name="connsiteY3" fmla="*/ 1383013 h 2399013"/>
+              <a:gd name="connsiteX4" fmla="*/ 3295267 w 4243533"/>
+              <a:gd name="connsiteY4" fmla="*/ 1674267 h 2399013"/>
+              <a:gd name="connsiteX5" fmla="*/ 4243533 w 4243533"/>
+              <a:gd name="connsiteY5" fmla="*/ 2399013 h 2399013"/>
+            </a:gdLst>
+            <a:ahLst/>
+            <a:cxnLst>
+              <a:cxn ang="0">
+                <a:pos x="connsiteX0" y="connsiteY0"/>
+              </a:cxn>
+              <a:cxn ang="0">
+                <a:pos x="connsiteX1" y="connsiteY1"/>
+              </a:cxn>
+              <a:cxn ang="0">
+                <a:pos x="connsiteX2" y="connsiteY2"/>
+              </a:cxn>
+              <a:cxn ang="0">
+                <a:pos x="connsiteX3" y="connsiteY3"/>
+              </a:cxn>
+              <a:cxn ang="0">
+                <a:pos x="connsiteX4" y="connsiteY4"/>
+              </a:cxn>
+              <a:cxn ang="0">
+                <a:pos x="connsiteX5" y="connsiteY5"/>
+              </a:cxn>
+            </a:cxnLst>
+            <a:rect l="l" t="t" r="r" b="b"/>
+            <a:pathLst>
+              <a:path w="4243533" h="2399013">
+                <a:moveTo>
+                  <a:pt x="0" y="0"/>
+                </a:moveTo>
+                <a:cubicBezTo>
+                  <a:pt x="230857" y="59730"/>
+                  <a:pt x="314412" y="107439"/>
+                  <a:pt x="480312" y="282626"/>
+                </a:cubicBezTo>
+                <a:cubicBezTo>
+                  <a:pt x="646212" y="457813"/>
+                  <a:pt x="788141" y="867722"/>
+                  <a:pt x="995398" y="1051120"/>
+                </a:cubicBezTo>
+                <a:cubicBezTo>
+                  <a:pt x="1202655" y="1234518"/>
+                  <a:pt x="1340542" y="1279155"/>
+                  <a:pt x="1723853" y="1383013"/>
+                </a:cubicBezTo>
+                <a:cubicBezTo>
+                  <a:pt x="2107164" y="1486871"/>
+                  <a:pt x="2875320" y="1504934"/>
+                  <a:pt x="3295267" y="1674267"/>
+                </a:cubicBezTo>
+                <a:cubicBezTo>
+                  <a:pt x="3715214" y="1843600"/>
+                  <a:pt x="3979373" y="2121306"/>
+                  <a:pt x="4243533" y="2399013"/>
+                </a:cubicBezTo>
+              </a:path>
+            </a:pathLst>
+          </a:custGeom>
+          <a:noFill/>
+          <a:ln w="152400">
+            <a:solidFill>
+              <a:schemeClr val="accent4">
+                <a:lumMod val="40000"/>
+                <a:lumOff val="60000"/>
+              </a:schemeClr>
+            </a:solidFill>
+          </a:ln>
+          <a:effectLst>
+            <a:outerShdw blurRad="12700" dist="76200" dir="7200000" algn="t" rotWithShape="0">
+              <a:prstClr val="black">
+                <a:alpha val="40000"/>
+              </a:prstClr>
+            </a:outerShdw>
+          </a:effectLst>
+        </p:spPr>
+        <p:style>
+          <a:lnRef idx="2">
+            <a:schemeClr val="accent1">
+              <a:shade val="50000"/>
+            </a:schemeClr>
+          </a:lnRef>
+          <a:fillRef idx="1">
+            <a:schemeClr val="accent1"/>
+          </a:fillRef>
+          <a:effectRef idx="0">
+            <a:schemeClr val="accent1"/>
+          </a:effectRef>
+          <a:fontRef idx="minor">
+            <a:schemeClr val="lt1"/>
+          </a:fontRef>
+        </p:style>
+        <p:txBody>
+          <a:bodyPr rtlCol="0" anchor="ctr"/>
+          <a:lstStyle/>
+          <a:p>
+            <a:pPr algn="ctr"/>
+            <a:endParaRPr lang="en-US"/>
+          </a:p>
+        </p:txBody>
+      </p:sp>
+      <p:sp>
+        <p:nvSpPr>
+          <p:cNvPr id="11" name="Freeform: Shape 10">
+            <a:extLst>
+              <a:ext uri="{FF2B5EF4-FFF2-40B4-BE49-F238E27FC236}">
+                <a16:creationId xmlns:a16="http://schemas.microsoft.com/office/drawing/2014/main" id="{7590AEBD-533A-4372-ADFC-C4395457E009}"/>
+              </a:ext>
+            </a:extLst>
+          </p:cNvPr>
+          <p:cNvSpPr/>
+          <p:nvPr/>
+        </p:nvSpPr>
+        <p:spPr>
+          <a:xfrm>
+            <a:off x="514766" y="2309703"/>
+            <a:ext cx="3833707" cy="1852510"/>
+          </a:xfrm>
+          <a:custGeom>
+            <a:avLst/>
+            <a:gdLst>
+              <a:gd name="connsiteX0" fmla="*/ 0 w 4341706"/>
+              <a:gd name="connsiteY0" fmla="*/ 0 h 2472266"/>
+              <a:gd name="connsiteX1" fmla="*/ 663786 w 4341706"/>
+              <a:gd name="connsiteY1" fmla="*/ 189653 h 2472266"/>
+              <a:gd name="connsiteX2" fmla="*/ 1212426 w 4341706"/>
+              <a:gd name="connsiteY2" fmla="*/ 1124373 h 2472266"/>
+              <a:gd name="connsiteX3" fmla="*/ 1822026 w 4341706"/>
+              <a:gd name="connsiteY3" fmla="*/ 1456266 h 2472266"/>
+              <a:gd name="connsiteX4" fmla="*/ 3393440 w 4341706"/>
+              <a:gd name="connsiteY4" fmla="*/ 1747520 h 2472266"/>
+              <a:gd name="connsiteX5" fmla="*/ 4341706 w 4341706"/>
+              <a:gd name="connsiteY5" fmla="*/ 2472266 h 2472266"/>
+              <a:gd name="connsiteX0" fmla="*/ 0 w 4341706"/>
+              <a:gd name="connsiteY0" fmla="*/ 0 h 2472266"/>
+              <a:gd name="connsiteX1" fmla="*/ 663786 w 4341706"/>
+              <a:gd name="connsiteY1" fmla="*/ 189653 h 2472266"/>
+              <a:gd name="connsiteX2" fmla="*/ 1177468 w 4341706"/>
+              <a:gd name="connsiteY2" fmla="*/ 1124373 h 2472266"/>
+              <a:gd name="connsiteX3" fmla="*/ 1822026 w 4341706"/>
+              <a:gd name="connsiteY3" fmla="*/ 1456266 h 2472266"/>
+              <a:gd name="connsiteX4" fmla="*/ 3393440 w 4341706"/>
+              <a:gd name="connsiteY4" fmla="*/ 1747520 h 2472266"/>
+              <a:gd name="connsiteX5" fmla="*/ 4341706 w 4341706"/>
+              <a:gd name="connsiteY5" fmla="*/ 2472266 h 2472266"/>
+              <a:gd name="connsiteX0" fmla="*/ 0 w 4341706"/>
+              <a:gd name="connsiteY0" fmla="*/ 0 h 2472266"/>
+              <a:gd name="connsiteX1" fmla="*/ 663786 w 4341706"/>
+              <a:gd name="connsiteY1" fmla="*/ 189653 h 2472266"/>
+              <a:gd name="connsiteX2" fmla="*/ 1093571 w 4341706"/>
+              <a:gd name="connsiteY2" fmla="*/ 1124373 h 2472266"/>
+              <a:gd name="connsiteX3" fmla="*/ 1822026 w 4341706"/>
+              <a:gd name="connsiteY3" fmla="*/ 1456266 h 2472266"/>
+              <a:gd name="connsiteX4" fmla="*/ 3393440 w 4341706"/>
+              <a:gd name="connsiteY4" fmla="*/ 1747520 h 2472266"/>
+              <a:gd name="connsiteX5" fmla="*/ 4341706 w 4341706"/>
+              <a:gd name="connsiteY5" fmla="*/ 2472266 h 2472266"/>
+              <a:gd name="connsiteX0" fmla="*/ 0 w 4341706"/>
+              <a:gd name="connsiteY0" fmla="*/ 0 h 2472266"/>
+              <a:gd name="connsiteX1" fmla="*/ 614845 w 4341706"/>
+              <a:gd name="connsiteY1" fmla="*/ 246001 h 2472266"/>
+              <a:gd name="connsiteX2" fmla="*/ 1093571 w 4341706"/>
+              <a:gd name="connsiteY2" fmla="*/ 1124373 h 2472266"/>
+              <a:gd name="connsiteX3" fmla="*/ 1822026 w 4341706"/>
+              <a:gd name="connsiteY3" fmla="*/ 1456266 h 2472266"/>
+              <a:gd name="connsiteX4" fmla="*/ 3393440 w 4341706"/>
+              <a:gd name="connsiteY4" fmla="*/ 1747520 h 2472266"/>
+              <a:gd name="connsiteX5" fmla="*/ 4341706 w 4341706"/>
+              <a:gd name="connsiteY5" fmla="*/ 2472266 h 2472266"/>
+              <a:gd name="connsiteX0" fmla="*/ 0 w 4341706"/>
+              <a:gd name="connsiteY0" fmla="*/ 0 h 2472266"/>
+              <a:gd name="connsiteX1" fmla="*/ 614845 w 4341706"/>
+              <a:gd name="connsiteY1" fmla="*/ 246001 h 2472266"/>
+              <a:gd name="connsiteX2" fmla="*/ 1032312 w 4341706"/>
+              <a:gd name="connsiteY2" fmla="*/ 1124373 h 2472266"/>
+              <a:gd name="connsiteX3" fmla="*/ 1822026 w 4341706"/>
+              <a:gd name="connsiteY3" fmla="*/ 1456266 h 2472266"/>
+              <a:gd name="connsiteX4" fmla="*/ 3393440 w 4341706"/>
+              <a:gd name="connsiteY4" fmla="*/ 1747520 h 2472266"/>
+              <a:gd name="connsiteX5" fmla="*/ 4341706 w 4341706"/>
+              <a:gd name="connsiteY5" fmla="*/ 2472266 h 2472266"/>
+              <a:gd name="connsiteX0" fmla="*/ 0 w 4341706"/>
+              <a:gd name="connsiteY0" fmla="*/ 0 h 2472266"/>
+              <a:gd name="connsiteX1" fmla="*/ 568902 w 4341706"/>
+              <a:gd name="connsiteY1" fmla="*/ 283532 h 2472266"/>
+              <a:gd name="connsiteX2" fmla="*/ 1032312 w 4341706"/>
+              <a:gd name="connsiteY2" fmla="*/ 1124373 h 2472266"/>
+              <a:gd name="connsiteX3" fmla="*/ 1822026 w 4341706"/>
+              <a:gd name="connsiteY3" fmla="*/ 1456266 h 2472266"/>
+              <a:gd name="connsiteX4" fmla="*/ 3393440 w 4341706"/>
+              <a:gd name="connsiteY4" fmla="*/ 1747520 h 2472266"/>
+              <a:gd name="connsiteX5" fmla="*/ 4341706 w 4341706"/>
+              <a:gd name="connsiteY5" fmla="*/ 2472266 h 2472266"/>
+              <a:gd name="connsiteX0" fmla="*/ 0 w 4334049"/>
+              <a:gd name="connsiteY0" fmla="*/ 0 h 2566091"/>
+              <a:gd name="connsiteX1" fmla="*/ 561245 w 4334049"/>
+              <a:gd name="connsiteY1" fmla="*/ 377357 h 2566091"/>
+              <a:gd name="connsiteX2" fmla="*/ 1024655 w 4334049"/>
+              <a:gd name="connsiteY2" fmla="*/ 1218198 h 2566091"/>
+              <a:gd name="connsiteX3" fmla="*/ 1814369 w 4334049"/>
+              <a:gd name="connsiteY3" fmla="*/ 1550091 h 2566091"/>
+              <a:gd name="connsiteX4" fmla="*/ 3385783 w 4334049"/>
+              <a:gd name="connsiteY4" fmla="*/ 1841345 h 2566091"/>
+              <a:gd name="connsiteX5" fmla="*/ 4334049 w 4334049"/>
+              <a:gd name="connsiteY5" fmla="*/ 2566091 h 2566091"/>
+              <a:gd name="connsiteX0" fmla="*/ 0 w 4334049"/>
+              <a:gd name="connsiteY0" fmla="*/ 0 h 2566091"/>
+              <a:gd name="connsiteX1" fmla="*/ 561245 w 4334049"/>
+              <a:gd name="connsiteY1" fmla="*/ 377357 h 2566091"/>
+              <a:gd name="connsiteX2" fmla="*/ 1055285 w 4334049"/>
+              <a:gd name="connsiteY2" fmla="*/ 1180668 h 2566091"/>
+              <a:gd name="connsiteX3" fmla="*/ 1814369 w 4334049"/>
+              <a:gd name="connsiteY3" fmla="*/ 1550091 h 2566091"/>
+              <a:gd name="connsiteX4" fmla="*/ 3385783 w 4334049"/>
+              <a:gd name="connsiteY4" fmla="*/ 1841345 h 2566091"/>
+              <a:gd name="connsiteX5" fmla="*/ 4334049 w 4334049"/>
+              <a:gd name="connsiteY5" fmla="*/ 2566091 h 2566091"/>
+            </a:gdLst>
+            <a:ahLst/>
+            <a:cxnLst>
+              <a:cxn ang="0">
+                <a:pos x="connsiteX0" y="connsiteY0"/>
+              </a:cxn>
+              <a:cxn ang="0">
+                <a:pos x="connsiteX1" y="connsiteY1"/>
+              </a:cxn>
+              <a:cxn ang="0">
+                <a:pos x="connsiteX2" y="connsiteY2"/>
+              </a:cxn>
+              <a:cxn ang="0">
+                <a:pos x="connsiteX3" y="connsiteY3"/>
+              </a:cxn>
+              <a:cxn ang="0">
+                <a:pos x="connsiteX4" y="connsiteY4"/>
+              </a:cxn>
+              <a:cxn ang="0">
+                <a:pos x="connsiteX5" y="connsiteY5"/>
+              </a:cxn>
+            </a:cxnLst>
+            <a:rect l="l" t="t" r="r" b="b"/>
+            <a:pathLst>
+              <a:path w="4334049" h="2566091">
+                <a:moveTo>
+                  <a:pt x="0" y="0"/>
+                </a:moveTo>
+                <a:cubicBezTo>
+                  <a:pt x="230857" y="1129"/>
+                  <a:pt x="385364" y="180579"/>
+                  <a:pt x="561245" y="377357"/>
+                </a:cubicBezTo>
+                <a:cubicBezTo>
+                  <a:pt x="737126" y="574135"/>
+                  <a:pt x="846431" y="985212"/>
+                  <a:pt x="1055285" y="1180668"/>
+                </a:cubicBezTo>
+                <a:cubicBezTo>
+                  <a:pt x="1264139" y="1376124"/>
+                  <a:pt x="1425953" y="1439978"/>
+                  <a:pt x="1814369" y="1550091"/>
+                </a:cubicBezTo>
+                <a:cubicBezTo>
+                  <a:pt x="2202785" y="1660204"/>
+                  <a:pt x="2965836" y="1672012"/>
+                  <a:pt x="3385783" y="1841345"/>
+                </a:cubicBezTo>
+                <a:cubicBezTo>
+                  <a:pt x="3805730" y="2010678"/>
+                  <a:pt x="4069889" y="2288384"/>
+                  <a:pt x="4334049" y="2566091"/>
+                </a:cubicBezTo>
+              </a:path>
+            </a:pathLst>
+          </a:custGeom>
+          <a:noFill/>
+          <a:ln w="152400">
+            <a:solidFill>
+              <a:schemeClr val="accent4"/>
+            </a:solidFill>
+          </a:ln>
+          <a:effectLst>
+            <a:outerShdw blurRad="12700" dist="76200" dir="7200000" algn="t" rotWithShape="0">
+              <a:prstClr val="black">
+                <a:alpha val="40000"/>
+              </a:prstClr>
+            </a:outerShdw>
+          </a:effectLst>
+        </p:spPr>
+        <p:style>
+          <a:lnRef idx="2">
+            <a:schemeClr val="accent1">
+              <a:shade val="50000"/>
+            </a:schemeClr>
+          </a:lnRef>
+          <a:fillRef idx="1">
+            <a:schemeClr val="accent1"/>
+          </a:fillRef>
+          <a:effectRef idx="0">
+            <a:schemeClr val="accent1"/>
+          </a:effectRef>
+          <a:fontRef idx="minor">
+            <a:schemeClr val="lt1"/>
+          </a:fontRef>
+        </p:style>
+        <p:txBody>
+          <a:bodyPr rtlCol="0" anchor="ctr"/>
+          <a:lstStyle/>
+          <a:p>
+            <a:pPr algn="ctr"/>
+            <a:endParaRPr lang="en-US"/>
+          </a:p>
+        </p:txBody>
+      </p:sp>
+    </p:spTree>
+    <p:extLst>
+      <p:ext uri="{BB962C8B-B14F-4D97-AF65-F5344CB8AC3E}">
+        <p14:creationId xmlns:p14="http://schemas.microsoft.com/office/powerpoint/2010/main" val="4034602536"/>
       </p:ext>
     </p:extLst>
   </p:cSld>

</xml_diff>

<commit_message>
added 3d and comparison tab to Arch
</commit_message>
<xml_diff>
--- a/resources/icons.pptx
+++ b/resources/icons.pptx
@@ -5,7 +5,7 @@
     <p:sldMasterId id="2147483672" r:id="rId1"/>
   </p:sldMasterIdLst>
   <p:notesMasterIdLst>
-    <p:notesMasterId r:id="rId7"/>
+    <p:notesMasterId r:id="rId8"/>
   </p:notesMasterIdLst>
   <p:sldIdLst>
     <p:sldId id="277" r:id="rId2"/>
@@ -13,6 +13,7 @@
     <p:sldId id="278" r:id="rId4"/>
     <p:sldId id="280" r:id="rId5"/>
     <p:sldId id="281" r:id="rId6"/>
+    <p:sldId id="282" r:id="rId7"/>
   </p:sldIdLst>
   <p:sldSz cx="5486400" cy="5486400"/>
   <p:notesSz cx="6858000" cy="9144000"/>
@@ -201,7 +202,7 @@
           <a:p>
             <a:fld id="{173FD435-C119-4590-9D53-7CAF83F19020}" type="datetimeFigureOut">
               <a:rPr lang="en-US" smtClean="0"/>
-              <a:t>5/31/2019</a:t>
+              <a:t>6/1/2019</a:t>
             </a:fld>
             <a:endParaRPr lang="en-US"/>
           </a:p>
@@ -851,7 +852,7 @@
           <a:p>
             <a:fld id="{D296FE55-24A0-4405-87BA-F203EB2AA989}" type="datetimeFigureOut">
               <a:rPr lang="en-US" smtClean="0"/>
-              <a:t>5/31/2019</a:t>
+              <a:t>6/1/2019</a:t>
             </a:fld>
             <a:endParaRPr lang="en-US"/>
           </a:p>
@@ -1021,7 +1022,7 @@
           <a:p>
             <a:fld id="{D296FE55-24A0-4405-87BA-F203EB2AA989}" type="datetimeFigureOut">
               <a:rPr lang="en-US" smtClean="0"/>
-              <a:t>5/31/2019</a:t>
+              <a:t>6/1/2019</a:t>
             </a:fld>
             <a:endParaRPr lang="en-US"/>
           </a:p>
@@ -1201,7 +1202,7 @@
           <a:p>
             <a:fld id="{D296FE55-24A0-4405-87BA-F203EB2AA989}" type="datetimeFigureOut">
               <a:rPr lang="en-US" smtClean="0"/>
-              <a:t>5/31/2019</a:t>
+              <a:t>6/1/2019</a:t>
             </a:fld>
             <a:endParaRPr lang="en-US"/>
           </a:p>
@@ -1371,7 +1372,7 @@
           <a:p>
             <a:fld id="{D296FE55-24A0-4405-87BA-F203EB2AA989}" type="datetimeFigureOut">
               <a:rPr lang="en-US" smtClean="0"/>
-              <a:t>5/31/2019</a:t>
+              <a:t>6/1/2019</a:t>
             </a:fld>
             <a:endParaRPr lang="en-US"/>
           </a:p>
@@ -1615,7 +1616,7 @@
           <a:p>
             <a:fld id="{D296FE55-24A0-4405-87BA-F203EB2AA989}" type="datetimeFigureOut">
               <a:rPr lang="en-US" smtClean="0"/>
-              <a:t>5/31/2019</a:t>
+              <a:t>6/1/2019</a:t>
             </a:fld>
             <a:endParaRPr lang="en-US"/>
           </a:p>
@@ -1847,7 +1848,7 @@
           <a:p>
             <a:fld id="{D296FE55-24A0-4405-87BA-F203EB2AA989}" type="datetimeFigureOut">
               <a:rPr lang="en-US" smtClean="0"/>
-              <a:t>5/31/2019</a:t>
+              <a:t>6/1/2019</a:t>
             </a:fld>
             <a:endParaRPr lang="en-US"/>
           </a:p>
@@ -2214,7 +2215,7 @@
           <a:p>
             <a:fld id="{D296FE55-24A0-4405-87BA-F203EB2AA989}" type="datetimeFigureOut">
               <a:rPr lang="en-US" smtClean="0"/>
-              <a:t>5/31/2019</a:t>
+              <a:t>6/1/2019</a:t>
             </a:fld>
             <a:endParaRPr lang="en-US"/>
           </a:p>
@@ -2332,7 +2333,7 @@
           <a:p>
             <a:fld id="{D296FE55-24A0-4405-87BA-F203EB2AA989}" type="datetimeFigureOut">
               <a:rPr lang="en-US" smtClean="0"/>
-              <a:t>5/31/2019</a:t>
+              <a:t>6/1/2019</a:t>
             </a:fld>
             <a:endParaRPr lang="en-US"/>
           </a:p>
@@ -2427,7 +2428,7 @@
           <a:p>
             <a:fld id="{D296FE55-24A0-4405-87BA-F203EB2AA989}" type="datetimeFigureOut">
               <a:rPr lang="en-US" smtClean="0"/>
-              <a:t>5/31/2019</a:t>
+              <a:t>6/1/2019</a:t>
             </a:fld>
             <a:endParaRPr lang="en-US"/>
           </a:p>
@@ -2704,7 +2705,7 @@
           <a:p>
             <a:fld id="{D296FE55-24A0-4405-87BA-F203EB2AA989}" type="datetimeFigureOut">
               <a:rPr lang="en-US" smtClean="0"/>
-              <a:t>5/31/2019</a:t>
+              <a:t>6/1/2019</a:t>
             </a:fld>
             <a:endParaRPr lang="en-US"/>
           </a:p>
@@ -2961,7 +2962,7 @@
           <a:p>
             <a:fld id="{D296FE55-24A0-4405-87BA-F203EB2AA989}" type="datetimeFigureOut">
               <a:rPr lang="en-US" smtClean="0"/>
-              <a:t>5/31/2019</a:t>
+              <a:t>6/1/2019</a:t>
             </a:fld>
             <a:endParaRPr lang="en-US"/>
           </a:p>
@@ -3174,7 +3175,7 @@
           <a:p>
             <a:fld id="{D296FE55-24A0-4405-87BA-F203EB2AA989}" type="datetimeFigureOut">
               <a:rPr lang="en-US" smtClean="0"/>
-              <a:t>5/31/2019</a:t>
+              <a:t>6/1/2019</a:t>
             </a:fld>
             <a:endParaRPr lang="en-US"/>
           </a:p>
@@ -4524,6 +4525,460 @@
       </p:grpSp>
       <p:sp>
         <p:nvSpPr>
+          <p:cNvPr id="11" name="Freeform: Shape 10">
+            <a:extLst>
+              <a:ext uri="{FF2B5EF4-FFF2-40B4-BE49-F238E27FC236}">
+                <a16:creationId xmlns:a16="http://schemas.microsoft.com/office/drawing/2014/main" id="{7590AEBD-533A-4372-ADFC-C4395457E009}"/>
+              </a:ext>
+            </a:extLst>
+          </p:cNvPr>
+          <p:cNvSpPr/>
+          <p:nvPr/>
+        </p:nvSpPr>
+        <p:spPr>
+          <a:xfrm>
+            <a:off x="717961" y="1943943"/>
+            <a:ext cx="4091101" cy="1791550"/>
+          </a:xfrm>
+          <a:custGeom>
+            <a:avLst/>
+            <a:gdLst>
+              <a:gd name="connsiteX0" fmla="*/ 0 w 4341706"/>
+              <a:gd name="connsiteY0" fmla="*/ 0 h 2472266"/>
+              <a:gd name="connsiteX1" fmla="*/ 663786 w 4341706"/>
+              <a:gd name="connsiteY1" fmla="*/ 189653 h 2472266"/>
+              <a:gd name="connsiteX2" fmla="*/ 1212426 w 4341706"/>
+              <a:gd name="connsiteY2" fmla="*/ 1124373 h 2472266"/>
+              <a:gd name="connsiteX3" fmla="*/ 1822026 w 4341706"/>
+              <a:gd name="connsiteY3" fmla="*/ 1456266 h 2472266"/>
+              <a:gd name="connsiteX4" fmla="*/ 3393440 w 4341706"/>
+              <a:gd name="connsiteY4" fmla="*/ 1747520 h 2472266"/>
+              <a:gd name="connsiteX5" fmla="*/ 4341706 w 4341706"/>
+              <a:gd name="connsiteY5" fmla="*/ 2472266 h 2472266"/>
+              <a:gd name="connsiteX0" fmla="*/ 0 w 4341706"/>
+              <a:gd name="connsiteY0" fmla="*/ 0 h 2472266"/>
+              <a:gd name="connsiteX1" fmla="*/ 663786 w 4341706"/>
+              <a:gd name="connsiteY1" fmla="*/ 189653 h 2472266"/>
+              <a:gd name="connsiteX2" fmla="*/ 1177468 w 4341706"/>
+              <a:gd name="connsiteY2" fmla="*/ 1124373 h 2472266"/>
+              <a:gd name="connsiteX3" fmla="*/ 1822026 w 4341706"/>
+              <a:gd name="connsiteY3" fmla="*/ 1456266 h 2472266"/>
+              <a:gd name="connsiteX4" fmla="*/ 3393440 w 4341706"/>
+              <a:gd name="connsiteY4" fmla="*/ 1747520 h 2472266"/>
+              <a:gd name="connsiteX5" fmla="*/ 4341706 w 4341706"/>
+              <a:gd name="connsiteY5" fmla="*/ 2472266 h 2472266"/>
+              <a:gd name="connsiteX0" fmla="*/ 0 w 4341706"/>
+              <a:gd name="connsiteY0" fmla="*/ 0 h 2472266"/>
+              <a:gd name="connsiteX1" fmla="*/ 663786 w 4341706"/>
+              <a:gd name="connsiteY1" fmla="*/ 189653 h 2472266"/>
+              <a:gd name="connsiteX2" fmla="*/ 1093571 w 4341706"/>
+              <a:gd name="connsiteY2" fmla="*/ 1124373 h 2472266"/>
+              <a:gd name="connsiteX3" fmla="*/ 1822026 w 4341706"/>
+              <a:gd name="connsiteY3" fmla="*/ 1456266 h 2472266"/>
+              <a:gd name="connsiteX4" fmla="*/ 3393440 w 4341706"/>
+              <a:gd name="connsiteY4" fmla="*/ 1747520 h 2472266"/>
+              <a:gd name="connsiteX5" fmla="*/ 4341706 w 4341706"/>
+              <a:gd name="connsiteY5" fmla="*/ 2472266 h 2472266"/>
+              <a:gd name="connsiteX0" fmla="*/ 0 w 4341706"/>
+              <a:gd name="connsiteY0" fmla="*/ 0 h 2472266"/>
+              <a:gd name="connsiteX1" fmla="*/ 614845 w 4341706"/>
+              <a:gd name="connsiteY1" fmla="*/ 246001 h 2472266"/>
+              <a:gd name="connsiteX2" fmla="*/ 1093571 w 4341706"/>
+              <a:gd name="connsiteY2" fmla="*/ 1124373 h 2472266"/>
+              <a:gd name="connsiteX3" fmla="*/ 1822026 w 4341706"/>
+              <a:gd name="connsiteY3" fmla="*/ 1456266 h 2472266"/>
+              <a:gd name="connsiteX4" fmla="*/ 3393440 w 4341706"/>
+              <a:gd name="connsiteY4" fmla="*/ 1747520 h 2472266"/>
+              <a:gd name="connsiteX5" fmla="*/ 4341706 w 4341706"/>
+              <a:gd name="connsiteY5" fmla="*/ 2472266 h 2472266"/>
+              <a:gd name="connsiteX0" fmla="*/ 0 w 4341706"/>
+              <a:gd name="connsiteY0" fmla="*/ 0 h 2472266"/>
+              <a:gd name="connsiteX1" fmla="*/ 614845 w 4341706"/>
+              <a:gd name="connsiteY1" fmla="*/ 246001 h 2472266"/>
+              <a:gd name="connsiteX2" fmla="*/ 1032312 w 4341706"/>
+              <a:gd name="connsiteY2" fmla="*/ 1124373 h 2472266"/>
+              <a:gd name="connsiteX3" fmla="*/ 1822026 w 4341706"/>
+              <a:gd name="connsiteY3" fmla="*/ 1456266 h 2472266"/>
+              <a:gd name="connsiteX4" fmla="*/ 3393440 w 4341706"/>
+              <a:gd name="connsiteY4" fmla="*/ 1747520 h 2472266"/>
+              <a:gd name="connsiteX5" fmla="*/ 4341706 w 4341706"/>
+              <a:gd name="connsiteY5" fmla="*/ 2472266 h 2472266"/>
+              <a:gd name="connsiteX0" fmla="*/ 0 w 4341706"/>
+              <a:gd name="connsiteY0" fmla="*/ 0 h 2472266"/>
+              <a:gd name="connsiteX1" fmla="*/ 568902 w 4341706"/>
+              <a:gd name="connsiteY1" fmla="*/ 283532 h 2472266"/>
+              <a:gd name="connsiteX2" fmla="*/ 1032312 w 4341706"/>
+              <a:gd name="connsiteY2" fmla="*/ 1124373 h 2472266"/>
+              <a:gd name="connsiteX3" fmla="*/ 1822026 w 4341706"/>
+              <a:gd name="connsiteY3" fmla="*/ 1456266 h 2472266"/>
+              <a:gd name="connsiteX4" fmla="*/ 3393440 w 4341706"/>
+              <a:gd name="connsiteY4" fmla="*/ 1747520 h 2472266"/>
+              <a:gd name="connsiteX5" fmla="*/ 4341706 w 4341706"/>
+              <a:gd name="connsiteY5" fmla="*/ 2472266 h 2472266"/>
+              <a:gd name="connsiteX0" fmla="*/ 0 w 4334049"/>
+              <a:gd name="connsiteY0" fmla="*/ 0 h 2566091"/>
+              <a:gd name="connsiteX1" fmla="*/ 561245 w 4334049"/>
+              <a:gd name="connsiteY1" fmla="*/ 377357 h 2566091"/>
+              <a:gd name="connsiteX2" fmla="*/ 1024655 w 4334049"/>
+              <a:gd name="connsiteY2" fmla="*/ 1218198 h 2566091"/>
+              <a:gd name="connsiteX3" fmla="*/ 1814369 w 4334049"/>
+              <a:gd name="connsiteY3" fmla="*/ 1550091 h 2566091"/>
+              <a:gd name="connsiteX4" fmla="*/ 3385783 w 4334049"/>
+              <a:gd name="connsiteY4" fmla="*/ 1841345 h 2566091"/>
+              <a:gd name="connsiteX5" fmla="*/ 4334049 w 4334049"/>
+              <a:gd name="connsiteY5" fmla="*/ 2566091 h 2566091"/>
+              <a:gd name="connsiteX0" fmla="*/ 0 w 4334049"/>
+              <a:gd name="connsiteY0" fmla="*/ 0 h 2566091"/>
+              <a:gd name="connsiteX1" fmla="*/ 561245 w 4334049"/>
+              <a:gd name="connsiteY1" fmla="*/ 377357 h 2566091"/>
+              <a:gd name="connsiteX2" fmla="*/ 1055285 w 4334049"/>
+              <a:gd name="connsiteY2" fmla="*/ 1180668 h 2566091"/>
+              <a:gd name="connsiteX3" fmla="*/ 1814369 w 4334049"/>
+              <a:gd name="connsiteY3" fmla="*/ 1550091 h 2566091"/>
+              <a:gd name="connsiteX4" fmla="*/ 3385783 w 4334049"/>
+              <a:gd name="connsiteY4" fmla="*/ 1841345 h 2566091"/>
+              <a:gd name="connsiteX5" fmla="*/ 4334049 w 4334049"/>
+              <a:gd name="connsiteY5" fmla="*/ 2566091 h 2566091"/>
+              <a:gd name="connsiteX0" fmla="*/ 0 w 4334049"/>
+              <a:gd name="connsiteY0" fmla="*/ 0 h 2566091"/>
+              <a:gd name="connsiteX1" fmla="*/ 561245 w 4334049"/>
+              <a:gd name="connsiteY1" fmla="*/ 377357 h 2566091"/>
+              <a:gd name="connsiteX2" fmla="*/ 1055285 w 4334049"/>
+              <a:gd name="connsiteY2" fmla="*/ 1180668 h 2566091"/>
+              <a:gd name="connsiteX3" fmla="*/ 1814369 w 4334049"/>
+              <a:gd name="connsiteY3" fmla="*/ 1550091 h 2566091"/>
+              <a:gd name="connsiteX4" fmla="*/ 3385783 w 4334049"/>
+              <a:gd name="connsiteY4" fmla="*/ 1841345 h 2566091"/>
+              <a:gd name="connsiteX5" fmla="*/ 4334049 w 4334049"/>
+              <a:gd name="connsiteY5" fmla="*/ 2566091 h 2566091"/>
+              <a:gd name="connsiteX0" fmla="*/ 0 w 4334049"/>
+              <a:gd name="connsiteY0" fmla="*/ 0 h 2566091"/>
+              <a:gd name="connsiteX1" fmla="*/ 561245 w 4334049"/>
+              <a:gd name="connsiteY1" fmla="*/ 377357 h 2566091"/>
+              <a:gd name="connsiteX2" fmla="*/ 1055285 w 4334049"/>
+              <a:gd name="connsiteY2" fmla="*/ 1180668 h 2566091"/>
+              <a:gd name="connsiteX3" fmla="*/ 1814369 w 4334049"/>
+              <a:gd name="connsiteY3" fmla="*/ 1550091 h 2566091"/>
+              <a:gd name="connsiteX4" fmla="*/ 3385783 w 4334049"/>
+              <a:gd name="connsiteY4" fmla="*/ 1841345 h 2566091"/>
+              <a:gd name="connsiteX5" fmla="*/ 4334049 w 4334049"/>
+              <a:gd name="connsiteY5" fmla="*/ 2566091 h 2566091"/>
+              <a:gd name="connsiteX0" fmla="*/ 0 w 4334049"/>
+              <a:gd name="connsiteY0" fmla="*/ 0 h 2566091"/>
+              <a:gd name="connsiteX1" fmla="*/ 561245 w 4334049"/>
+              <a:gd name="connsiteY1" fmla="*/ 452415 h 2566091"/>
+              <a:gd name="connsiteX2" fmla="*/ 1055285 w 4334049"/>
+              <a:gd name="connsiteY2" fmla="*/ 1180668 h 2566091"/>
+              <a:gd name="connsiteX3" fmla="*/ 1814369 w 4334049"/>
+              <a:gd name="connsiteY3" fmla="*/ 1550091 h 2566091"/>
+              <a:gd name="connsiteX4" fmla="*/ 3385783 w 4334049"/>
+              <a:gd name="connsiteY4" fmla="*/ 1841345 h 2566091"/>
+              <a:gd name="connsiteX5" fmla="*/ 4334049 w 4334049"/>
+              <a:gd name="connsiteY5" fmla="*/ 2566091 h 2566091"/>
+              <a:gd name="connsiteX0" fmla="*/ 0 w 4334049"/>
+              <a:gd name="connsiteY0" fmla="*/ 0 h 2566091"/>
+              <a:gd name="connsiteX1" fmla="*/ 561245 w 4334049"/>
+              <a:gd name="connsiteY1" fmla="*/ 452415 h 2566091"/>
+              <a:gd name="connsiteX2" fmla="*/ 1055285 w 4334049"/>
+              <a:gd name="connsiteY2" fmla="*/ 1180668 h 2566091"/>
+              <a:gd name="connsiteX3" fmla="*/ 1814369 w 4334049"/>
+              <a:gd name="connsiteY3" fmla="*/ 1550091 h 2566091"/>
+              <a:gd name="connsiteX4" fmla="*/ 3385783 w 4334049"/>
+              <a:gd name="connsiteY4" fmla="*/ 1841345 h 2566091"/>
+              <a:gd name="connsiteX5" fmla="*/ 4334049 w 4334049"/>
+              <a:gd name="connsiteY5" fmla="*/ 2566091 h 2566091"/>
+              <a:gd name="connsiteX0" fmla="*/ 0 w 4334049"/>
+              <a:gd name="connsiteY0" fmla="*/ 0 h 2566091"/>
+              <a:gd name="connsiteX1" fmla="*/ 561245 w 4334049"/>
+              <a:gd name="connsiteY1" fmla="*/ 452415 h 2566091"/>
+              <a:gd name="connsiteX2" fmla="*/ 1055285 w 4334049"/>
+              <a:gd name="connsiteY2" fmla="*/ 1180668 h 2566091"/>
+              <a:gd name="connsiteX3" fmla="*/ 1814369 w 4334049"/>
+              <a:gd name="connsiteY3" fmla="*/ 1550091 h 2566091"/>
+              <a:gd name="connsiteX4" fmla="*/ 3342659 w 4334049"/>
+              <a:gd name="connsiteY4" fmla="*/ 1907021 h 2566091"/>
+              <a:gd name="connsiteX5" fmla="*/ 4334049 w 4334049"/>
+              <a:gd name="connsiteY5" fmla="*/ 2566091 h 2566091"/>
+              <a:gd name="connsiteX0" fmla="*/ 0 w 4334049"/>
+              <a:gd name="connsiteY0" fmla="*/ 0 h 2566091"/>
+              <a:gd name="connsiteX1" fmla="*/ 561245 w 4334049"/>
+              <a:gd name="connsiteY1" fmla="*/ 452415 h 2566091"/>
+              <a:gd name="connsiteX2" fmla="*/ 1055285 w 4334049"/>
+              <a:gd name="connsiteY2" fmla="*/ 1180668 h 2566091"/>
+              <a:gd name="connsiteX3" fmla="*/ 1814369 w 4334049"/>
+              <a:gd name="connsiteY3" fmla="*/ 1550091 h 2566091"/>
+              <a:gd name="connsiteX4" fmla="*/ 3342659 w 4334049"/>
+              <a:gd name="connsiteY4" fmla="*/ 1907021 h 2566091"/>
+              <a:gd name="connsiteX5" fmla="*/ 4334049 w 4334049"/>
+              <a:gd name="connsiteY5" fmla="*/ 2566091 h 2566091"/>
+              <a:gd name="connsiteX0" fmla="*/ 0 w 4341236"/>
+              <a:gd name="connsiteY0" fmla="*/ 0 h 2481649"/>
+              <a:gd name="connsiteX1" fmla="*/ 561245 w 4341236"/>
+              <a:gd name="connsiteY1" fmla="*/ 452415 h 2481649"/>
+              <a:gd name="connsiteX2" fmla="*/ 1055285 w 4341236"/>
+              <a:gd name="connsiteY2" fmla="*/ 1180668 h 2481649"/>
+              <a:gd name="connsiteX3" fmla="*/ 1814369 w 4341236"/>
+              <a:gd name="connsiteY3" fmla="*/ 1550091 h 2481649"/>
+              <a:gd name="connsiteX4" fmla="*/ 3342659 w 4341236"/>
+              <a:gd name="connsiteY4" fmla="*/ 1907021 h 2481649"/>
+              <a:gd name="connsiteX5" fmla="*/ 4341236 w 4341236"/>
+              <a:gd name="connsiteY5" fmla="*/ 2481649 h 2481649"/>
+            </a:gdLst>
+            <a:ahLst/>
+            <a:cxnLst>
+              <a:cxn ang="0">
+                <a:pos x="connsiteX0" y="connsiteY0"/>
+              </a:cxn>
+              <a:cxn ang="0">
+                <a:pos x="connsiteX1" y="connsiteY1"/>
+              </a:cxn>
+              <a:cxn ang="0">
+                <a:pos x="connsiteX2" y="connsiteY2"/>
+              </a:cxn>
+              <a:cxn ang="0">
+                <a:pos x="connsiteX3" y="connsiteY3"/>
+              </a:cxn>
+              <a:cxn ang="0">
+                <a:pos x="connsiteX4" y="connsiteY4"/>
+              </a:cxn>
+              <a:cxn ang="0">
+                <a:pos x="connsiteX5" y="connsiteY5"/>
+              </a:cxn>
+            </a:cxnLst>
+            <a:rect l="l" t="t" r="r" b="b"/>
+            <a:pathLst>
+              <a:path w="4341236" h="2481649">
+                <a:moveTo>
+                  <a:pt x="0" y="0"/>
+                </a:moveTo>
+                <a:cubicBezTo>
+                  <a:pt x="259606" y="198159"/>
+                  <a:pt x="385364" y="255637"/>
+                  <a:pt x="561245" y="452415"/>
+                </a:cubicBezTo>
+                <a:cubicBezTo>
+                  <a:pt x="737126" y="649193"/>
+                  <a:pt x="846431" y="997722"/>
+                  <a:pt x="1055285" y="1180668"/>
+                </a:cubicBezTo>
+                <a:cubicBezTo>
+                  <a:pt x="1264139" y="1363614"/>
+                  <a:pt x="1433140" y="1429032"/>
+                  <a:pt x="1814369" y="1550091"/>
+                </a:cubicBezTo>
+                <a:cubicBezTo>
+                  <a:pt x="2195598" y="1671150"/>
+                  <a:pt x="2922712" y="1737688"/>
+                  <a:pt x="3342659" y="1907021"/>
+                </a:cubicBezTo>
+                <a:cubicBezTo>
+                  <a:pt x="3762606" y="2076354"/>
+                  <a:pt x="4048327" y="2344678"/>
+                  <a:pt x="4341236" y="2481649"/>
+                </a:cubicBezTo>
+              </a:path>
+            </a:pathLst>
+          </a:custGeom>
+          <a:noFill/>
+          <a:ln w="841375">
+            <a:gradFill flip="none" rotWithShape="1">
+              <a:gsLst>
+                <a:gs pos="12000">
+                  <a:schemeClr val="accent4">
+                    <a:lumMod val="67000"/>
+                  </a:schemeClr>
+                </a:gs>
+                <a:gs pos="43000">
+                  <a:schemeClr val="accent4">
+                    <a:lumMod val="97000"/>
+                    <a:lumOff val="3000"/>
+                  </a:schemeClr>
+                </a:gs>
+                <a:gs pos="84000">
+                  <a:schemeClr val="accent4">
+                    <a:lumMod val="20000"/>
+                    <a:lumOff val="80000"/>
+                  </a:schemeClr>
+                </a:gs>
+              </a:gsLst>
+              <a:lin ang="13200000" scaled="0"/>
+              <a:tileRect/>
+            </a:gradFill>
+          </a:ln>
+          <a:effectLst>
+            <a:outerShdw blurRad="12700" dist="76200" dir="7200000" algn="t" rotWithShape="0">
+              <a:prstClr val="black">
+                <a:alpha val="40000"/>
+              </a:prstClr>
+            </a:outerShdw>
+          </a:effectLst>
+        </p:spPr>
+        <p:style>
+          <a:lnRef idx="2">
+            <a:schemeClr val="accent1">
+              <a:shade val="50000"/>
+            </a:schemeClr>
+          </a:lnRef>
+          <a:fillRef idx="1">
+            <a:schemeClr val="accent1"/>
+          </a:fillRef>
+          <a:effectRef idx="0">
+            <a:schemeClr val="accent1"/>
+          </a:effectRef>
+          <a:fontRef idx="minor">
+            <a:schemeClr val="lt1"/>
+          </a:fontRef>
+        </p:style>
+        <p:txBody>
+          <a:bodyPr rtlCol="0" anchor="ctr"/>
+          <a:lstStyle/>
+          <a:p>
+            <a:pPr algn="ctr"/>
+            <a:endParaRPr lang="en-US"/>
+          </a:p>
+        </p:txBody>
+      </p:sp>
+    </p:spTree>
+    <p:extLst>
+      <p:ext uri="{BB962C8B-B14F-4D97-AF65-F5344CB8AC3E}">
+        <p14:creationId xmlns:p14="http://schemas.microsoft.com/office/powerpoint/2010/main" val="4034602536"/>
+      </p:ext>
+    </p:extLst>
+  </p:cSld>
+  <p:clrMapOvr>
+    <a:masterClrMapping/>
+  </p:clrMapOvr>
+</p:sld>
+</file>
+
+<file path=ppt/slides/slide6.xml><?xml version="1.0" encoding="utf-8"?>
+<p:sld xmlns:a="http://schemas.openxmlformats.org/drawingml/2006/main" xmlns:r="http://schemas.openxmlformats.org/officeDocument/2006/relationships" xmlns:p="http://schemas.openxmlformats.org/presentationml/2006/main">
+  <p:cSld>
+    <p:spTree>
+      <p:nvGrpSpPr>
+        <p:cNvPr id="1" name=""/>
+        <p:cNvGrpSpPr/>
+        <p:nvPr/>
+      </p:nvGrpSpPr>
+      <p:grpSpPr>
+        <a:xfrm>
+          <a:off x="0" y="0"/>
+          <a:ext cx="0" cy="0"/>
+          <a:chOff x="0" y="0"/>
+          <a:chExt cx="0" cy="0"/>
+        </a:xfrm>
+      </p:grpSpPr>
+      <p:grpSp>
+        <p:nvGrpSpPr>
+          <p:cNvPr id="6" name="Group 5">
+            <a:extLst>
+              <a:ext uri="{FF2B5EF4-FFF2-40B4-BE49-F238E27FC236}">
+                <a16:creationId xmlns:a16="http://schemas.microsoft.com/office/drawing/2014/main" id="{86859F10-88F1-4413-A726-E72897FC228F}"/>
+              </a:ext>
+            </a:extLst>
+          </p:cNvPr>
+          <p:cNvGrpSpPr/>
+          <p:nvPr/>
+        </p:nvGrpSpPr>
+        <p:grpSpPr>
+          <a:xfrm>
+            <a:off x="209973" y="1012613"/>
+            <a:ext cx="5093546" cy="3474720"/>
+            <a:chOff x="247233" y="900844"/>
+            <a:chExt cx="5093546" cy="3474720"/>
+          </a:xfrm>
+        </p:grpSpPr>
+        <p:cxnSp>
+          <p:nvCxnSpPr>
+            <p:cNvPr id="3" name="Straight Arrow Connector 2">
+              <a:extLst>
+                <a:ext uri="{FF2B5EF4-FFF2-40B4-BE49-F238E27FC236}">
+                  <a16:creationId xmlns:a16="http://schemas.microsoft.com/office/drawing/2014/main" id="{EFDD1E1C-D271-45FB-A1BD-B509B5C45BE1}"/>
+                </a:ext>
+              </a:extLst>
+            </p:cNvPr>
+            <p:cNvCxnSpPr/>
+            <p:nvPr/>
+          </p:nvCxnSpPr>
+          <p:spPr>
+            <a:xfrm>
+              <a:off x="247233" y="4273976"/>
+              <a:ext cx="5093546" cy="0"/>
+            </a:xfrm>
+            <a:prstGeom prst="straightConnector1">
+              <a:avLst/>
+            </a:prstGeom>
+            <a:ln w="190500">
+              <a:solidFill>
+                <a:schemeClr val="tx2"/>
+              </a:solidFill>
+              <a:headEnd w="med" len="sm"/>
+              <a:tailEnd type="triangle" w="med" len="sm"/>
+            </a:ln>
+          </p:spPr>
+          <p:style>
+            <a:lnRef idx="1">
+              <a:schemeClr val="accent1"/>
+            </a:lnRef>
+            <a:fillRef idx="0">
+              <a:schemeClr val="accent1"/>
+            </a:fillRef>
+            <a:effectRef idx="0">
+              <a:schemeClr val="accent1"/>
+            </a:effectRef>
+            <a:fontRef idx="minor">
+              <a:schemeClr val="tx1"/>
+            </a:fontRef>
+          </p:style>
+        </p:cxnSp>
+        <p:cxnSp>
+          <p:nvCxnSpPr>
+            <p:cNvPr id="4" name="Straight Arrow Connector 3">
+              <a:extLst>
+                <a:ext uri="{FF2B5EF4-FFF2-40B4-BE49-F238E27FC236}">
+                  <a16:creationId xmlns:a16="http://schemas.microsoft.com/office/drawing/2014/main" id="{5B36365A-1B6C-4BCD-8DE5-9C10CEC1BB52}"/>
+                </a:ext>
+              </a:extLst>
+            </p:cNvPr>
+            <p:cNvCxnSpPr>
+              <a:cxnSpLocks/>
+            </p:cNvCxnSpPr>
+            <p:nvPr/>
+          </p:nvCxnSpPr>
+          <p:spPr>
+            <a:xfrm flipV="1">
+              <a:off x="342055" y="900844"/>
+              <a:ext cx="0" cy="3474720"/>
+            </a:xfrm>
+            <a:prstGeom prst="straightConnector1">
+              <a:avLst/>
+            </a:prstGeom>
+            <a:ln w="190500">
+              <a:solidFill>
+                <a:schemeClr val="tx2"/>
+              </a:solidFill>
+              <a:headEnd w="med" len="sm"/>
+              <a:tailEnd type="triangle" w="med" len="sm"/>
+            </a:ln>
+          </p:spPr>
+          <p:style>
+            <a:lnRef idx="1">
+              <a:schemeClr val="accent1"/>
+            </a:lnRef>
+            <a:fillRef idx="0">
+              <a:schemeClr val="accent1"/>
+            </a:fillRef>
+            <a:effectRef idx="0">
+              <a:schemeClr val="accent1"/>
+            </a:effectRef>
+            <a:fontRef idx="minor">
+              <a:schemeClr val="tx1"/>
+            </a:fontRef>
+          </p:style>
+        </p:cxnSp>
+      </p:grpSp>
+      <p:sp>
+        <p:nvSpPr>
           <p:cNvPr id="7" name="Freeform: Shape 6">
             <a:extLst>
               <a:ext uri="{FF2B5EF4-FFF2-40B4-BE49-F238E27FC236}">
@@ -5200,7 +5655,7 @@
     </p:spTree>
     <p:extLst>
       <p:ext uri="{BB962C8B-B14F-4D97-AF65-F5344CB8AC3E}">
-        <p14:creationId xmlns:p14="http://schemas.microsoft.com/office/powerpoint/2010/main" val="4034602536"/>
+        <p14:creationId xmlns:p14="http://schemas.microsoft.com/office/powerpoint/2010/main" val="4148452192"/>
       </p:ext>
     </p:extLst>
   </p:cSld>

</xml_diff>

<commit_message>
modified Setup dialog to show both app and lib settings
</commit_message>
<xml_diff>
--- a/resources/icons.pptx
+++ b/resources/icons.pptx
@@ -5,7 +5,7 @@
     <p:sldMasterId id="2147483672" r:id="rId1"/>
   </p:sldMasterIdLst>
   <p:notesMasterIdLst>
-    <p:notesMasterId r:id="rId8"/>
+    <p:notesMasterId r:id="rId10"/>
   </p:notesMasterIdLst>
   <p:sldIdLst>
     <p:sldId id="277" r:id="rId2"/>
@@ -14,6 +14,8 @@
     <p:sldId id="280" r:id="rId5"/>
     <p:sldId id="281" r:id="rId6"/>
     <p:sldId id="282" r:id="rId7"/>
+    <p:sldId id="283" r:id="rId8"/>
+    <p:sldId id="284" r:id="rId9"/>
   </p:sldIdLst>
   <p:sldSz cx="5486400" cy="5486400"/>
   <p:notesSz cx="6858000" cy="9144000"/>
@@ -202,7 +204,7 @@
           <a:p>
             <a:fld id="{173FD435-C119-4590-9D53-7CAF83F19020}" type="datetimeFigureOut">
               <a:rPr lang="en-US" smtClean="0"/>
-              <a:t>6/1/2019</a:t>
+              <a:t>6/5/2019</a:t>
             </a:fld>
             <a:endParaRPr lang="en-US"/>
           </a:p>
@@ -721,6 +723,174 @@
 </p:notes>
 </file>
 
+<file path=ppt/notesSlides/notesSlide4.xml><?xml version="1.0" encoding="utf-8"?>
+<p:notes xmlns:a="http://schemas.openxmlformats.org/drawingml/2006/main" xmlns:r="http://schemas.openxmlformats.org/officeDocument/2006/relationships" xmlns:p="http://schemas.openxmlformats.org/presentationml/2006/main">
+  <p:cSld>
+    <p:spTree>
+      <p:nvGrpSpPr>
+        <p:cNvPr id="1" name=""/>
+        <p:cNvGrpSpPr/>
+        <p:nvPr/>
+      </p:nvGrpSpPr>
+      <p:grpSpPr>
+        <a:xfrm>
+          <a:off x="0" y="0"/>
+          <a:ext cx="0" cy="0"/>
+          <a:chOff x="0" y="0"/>
+          <a:chExt cx="0" cy="0"/>
+        </a:xfrm>
+      </p:grpSpPr>
+      <p:sp>
+        <p:nvSpPr>
+          <p:cNvPr id="2" name="Slide Image Placeholder 1"/>
+          <p:cNvSpPr>
+            <a:spLocks noGrp="1" noRot="1" noChangeAspect="1"/>
+          </p:cNvSpPr>
+          <p:nvPr>
+            <p:ph type="sldImg"/>
+          </p:nvPr>
+        </p:nvSpPr>
+        <p:spPr/>
+      </p:sp>
+      <p:sp>
+        <p:nvSpPr>
+          <p:cNvPr id="3" name="Notes Placeholder 2"/>
+          <p:cNvSpPr>
+            <a:spLocks noGrp="1"/>
+          </p:cNvSpPr>
+          <p:nvPr>
+            <p:ph type="body" idx="1"/>
+          </p:nvPr>
+        </p:nvSpPr>
+        <p:spPr/>
+        <p:txBody>
+          <a:bodyPr/>
+          <a:lstStyle/>
+          <a:p>
+            <a:endParaRPr lang="en-US" dirty="0"/>
+          </a:p>
+        </p:txBody>
+      </p:sp>
+      <p:sp>
+        <p:nvSpPr>
+          <p:cNvPr id="4" name="Slide Number Placeholder 3"/>
+          <p:cNvSpPr>
+            <a:spLocks noGrp="1"/>
+          </p:cNvSpPr>
+          <p:nvPr>
+            <p:ph type="sldNum" sz="quarter" idx="10"/>
+          </p:nvPr>
+        </p:nvSpPr>
+        <p:spPr/>
+        <p:txBody>
+          <a:bodyPr/>
+          <a:lstStyle/>
+          <a:p>
+            <a:fld id="{EE6CE23A-BB01-46B4-BDD6-2DE3EFA83C70}" type="slidenum">
+              <a:rPr lang="en-US" smtClean="0"/>
+              <a:t>7</a:t>
+            </a:fld>
+            <a:endParaRPr lang="en-US"/>
+          </a:p>
+        </p:txBody>
+      </p:sp>
+    </p:spTree>
+    <p:extLst>
+      <p:ext uri="{BB962C8B-B14F-4D97-AF65-F5344CB8AC3E}">
+        <p14:creationId xmlns:p14="http://schemas.microsoft.com/office/powerpoint/2010/main" val="3962243157"/>
+      </p:ext>
+    </p:extLst>
+  </p:cSld>
+  <p:clrMapOvr>
+    <a:masterClrMapping/>
+  </p:clrMapOvr>
+</p:notes>
+</file>
+
+<file path=ppt/notesSlides/notesSlide5.xml><?xml version="1.0" encoding="utf-8"?>
+<p:notes xmlns:a="http://schemas.openxmlformats.org/drawingml/2006/main" xmlns:r="http://schemas.openxmlformats.org/officeDocument/2006/relationships" xmlns:p="http://schemas.openxmlformats.org/presentationml/2006/main">
+  <p:cSld>
+    <p:spTree>
+      <p:nvGrpSpPr>
+        <p:cNvPr id="1" name=""/>
+        <p:cNvGrpSpPr/>
+        <p:nvPr/>
+      </p:nvGrpSpPr>
+      <p:grpSpPr>
+        <a:xfrm>
+          <a:off x="0" y="0"/>
+          <a:ext cx="0" cy="0"/>
+          <a:chOff x="0" y="0"/>
+          <a:chExt cx="0" cy="0"/>
+        </a:xfrm>
+      </p:grpSpPr>
+      <p:sp>
+        <p:nvSpPr>
+          <p:cNvPr id="2" name="Slide Image Placeholder 1"/>
+          <p:cNvSpPr>
+            <a:spLocks noGrp="1" noRot="1" noChangeAspect="1"/>
+          </p:cNvSpPr>
+          <p:nvPr>
+            <p:ph type="sldImg"/>
+          </p:nvPr>
+        </p:nvSpPr>
+        <p:spPr/>
+      </p:sp>
+      <p:sp>
+        <p:nvSpPr>
+          <p:cNvPr id="3" name="Notes Placeholder 2"/>
+          <p:cNvSpPr>
+            <a:spLocks noGrp="1"/>
+          </p:cNvSpPr>
+          <p:nvPr>
+            <p:ph type="body" idx="1"/>
+          </p:nvPr>
+        </p:nvSpPr>
+        <p:spPr/>
+        <p:txBody>
+          <a:bodyPr/>
+          <a:lstStyle/>
+          <a:p>
+            <a:endParaRPr lang="en-US" dirty="0"/>
+          </a:p>
+        </p:txBody>
+      </p:sp>
+      <p:sp>
+        <p:nvSpPr>
+          <p:cNvPr id="4" name="Slide Number Placeholder 3"/>
+          <p:cNvSpPr>
+            <a:spLocks noGrp="1"/>
+          </p:cNvSpPr>
+          <p:nvPr>
+            <p:ph type="sldNum" sz="quarter" idx="10"/>
+          </p:nvPr>
+        </p:nvSpPr>
+        <p:spPr/>
+        <p:txBody>
+          <a:bodyPr/>
+          <a:lstStyle/>
+          <a:p>
+            <a:fld id="{EE6CE23A-BB01-46B4-BDD6-2DE3EFA83C70}" type="slidenum">
+              <a:rPr lang="en-US" smtClean="0"/>
+              <a:t>8</a:t>
+            </a:fld>
+            <a:endParaRPr lang="en-US"/>
+          </a:p>
+        </p:txBody>
+      </p:sp>
+    </p:spTree>
+    <p:extLst>
+      <p:ext uri="{BB962C8B-B14F-4D97-AF65-F5344CB8AC3E}">
+        <p14:creationId xmlns:p14="http://schemas.microsoft.com/office/powerpoint/2010/main" val="89610565"/>
+      </p:ext>
+    </p:extLst>
+  </p:cSld>
+  <p:clrMapOvr>
+    <a:masterClrMapping/>
+  </p:clrMapOvr>
+</p:notes>
+</file>
+
 <file path=ppt/slideLayouts/slideLayout1.xml><?xml version="1.0" encoding="utf-8"?>
 <p:sldLayout xmlns:a="http://schemas.openxmlformats.org/drawingml/2006/main" xmlns:r="http://schemas.openxmlformats.org/officeDocument/2006/relationships" xmlns:p="http://schemas.openxmlformats.org/presentationml/2006/main" type="title" preserve="1">
   <p:cSld name="Title Slide">
@@ -852,7 +1022,7 @@
           <a:p>
             <a:fld id="{D296FE55-24A0-4405-87BA-F203EB2AA989}" type="datetimeFigureOut">
               <a:rPr lang="en-US" smtClean="0"/>
-              <a:t>6/1/2019</a:t>
+              <a:t>6/5/2019</a:t>
             </a:fld>
             <a:endParaRPr lang="en-US"/>
           </a:p>
@@ -1022,7 +1192,7 @@
           <a:p>
             <a:fld id="{D296FE55-24A0-4405-87BA-F203EB2AA989}" type="datetimeFigureOut">
               <a:rPr lang="en-US" smtClean="0"/>
-              <a:t>6/1/2019</a:t>
+              <a:t>6/5/2019</a:t>
             </a:fld>
             <a:endParaRPr lang="en-US"/>
           </a:p>
@@ -1202,7 +1372,7 @@
           <a:p>
             <a:fld id="{D296FE55-24A0-4405-87BA-F203EB2AA989}" type="datetimeFigureOut">
               <a:rPr lang="en-US" smtClean="0"/>
-              <a:t>6/1/2019</a:t>
+              <a:t>6/5/2019</a:t>
             </a:fld>
             <a:endParaRPr lang="en-US"/>
           </a:p>
@@ -1372,7 +1542,7 @@
           <a:p>
             <a:fld id="{D296FE55-24A0-4405-87BA-F203EB2AA989}" type="datetimeFigureOut">
               <a:rPr lang="en-US" smtClean="0"/>
-              <a:t>6/1/2019</a:t>
+              <a:t>6/5/2019</a:t>
             </a:fld>
             <a:endParaRPr lang="en-US"/>
           </a:p>
@@ -1616,7 +1786,7 @@
           <a:p>
             <a:fld id="{D296FE55-24A0-4405-87BA-F203EB2AA989}" type="datetimeFigureOut">
               <a:rPr lang="en-US" smtClean="0"/>
-              <a:t>6/1/2019</a:t>
+              <a:t>6/5/2019</a:t>
             </a:fld>
             <a:endParaRPr lang="en-US"/>
           </a:p>
@@ -1848,7 +2018,7 @@
           <a:p>
             <a:fld id="{D296FE55-24A0-4405-87BA-F203EB2AA989}" type="datetimeFigureOut">
               <a:rPr lang="en-US" smtClean="0"/>
-              <a:t>6/1/2019</a:t>
+              <a:t>6/5/2019</a:t>
             </a:fld>
             <a:endParaRPr lang="en-US"/>
           </a:p>
@@ -2215,7 +2385,7 @@
           <a:p>
             <a:fld id="{D296FE55-24A0-4405-87BA-F203EB2AA989}" type="datetimeFigureOut">
               <a:rPr lang="en-US" smtClean="0"/>
-              <a:t>6/1/2019</a:t>
+              <a:t>6/5/2019</a:t>
             </a:fld>
             <a:endParaRPr lang="en-US"/>
           </a:p>
@@ -2333,7 +2503,7 @@
           <a:p>
             <a:fld id="{D296FE55-24A0-4405-87BA-F203EB2AA989}" type="datetimeFigureOut">
               <a:rPr lang="en-US" smtClean="0"/>
-              <a:t>6/1/2019</a:t>
+              <a:t>6/5/2019</a:t>
             </a:fld>
             <a:endParaRPr lang="en-US"/>
           </a:p>
@@ -2428,7 +2598,7 @@
           <a:p>
             <a:fld id="{D296FE55-24A0-4405-87BA-F203EB2AA989}" type="datetimeFigureOut">
               <a:rPr lang="en-US" smtClean="0"/>
-              <a:t>6/1/2019</a:t>
+              <a:t>6/5/2019</a:t>
             </a:fld>
             <a:endParaRPr lang="en-US"/>
           </a:p>
@@ -2705,7 +2875,7 @@
           <a:p>
             <a:fld id="{D296FE55-24A0-4405-87BA-F203EB2AA989}" type="datetimeFigureOut">
               <a:rPr lang="en-US" smtClean="0"/>
-              <a:t>6/1/2019</a:t>
+              <a:t>6/5/2019</a:t>
             </a:fld>
             <a:endParaRPr lang="en-US"/>
           </a:p>
@@ -2962,7 +3132,7 @@
           <a:p>
             <a:fld id="{D296FE55-24A0-4405-87BA-F203EB2AA989}" type="datetimeFigureOut">
               <a:rPr lang="en-US" smtClean="0"/>
-              <a:t>6/1/2019</a:t>
+              <a:t>6/5/2019</a:t>
             </a:fld>
             <a:endParaRPr lang="en-US"/>
           </a:p>
@@ -3175,7 +3345,7 @@
           <a:p>
             <a:fld id="{D296FE55-24A0-4405-87BA-F203EB2AA989}" type="datetimeFigureOut">
               <a:rPr lang="en-US" smtClean="0"/>
-              <a:t>6/1/2019</a:t>
+              <a:t>6/5/2019</a:t>
             </a:fld>
             <a:endParaRPr lang="en-US"/>
           </a:p>
@@ -5656,6 +5826,202 @@
     <p:extLst>
       <p:ext uri="{BB962C8B-B14F-4D97-AF65-F5344CB8AC3E}">
         <p14:creationId xmlns:p14="http://schemas.microsoft.com/office/powerpoint/2010/main" val="4148452192"/>
+      </p:ext>
+    </p:extLst>
+  </p:cSld>
+  <p:clrMapOvr>
+    <a:masterClrMapping/>
+  </p:clrMapOvr>
+</p:sld>
+</file>
+
+<file path=ppt/slides/slide7.xml><?xml version="1.0" encoding="utf-8"?>
+<p:sld xmlns:a="http://schemas.openxmlformats.org/drawingml/2006/main" xmlns:r="http://schemas.openxmlformats.org/officeDocument/2006/relationships" xmlns:p="http://schemas.openxmlformats.org/presentationml/2006/main">
+  <p:cSld>
+    <p:spTree>
+      <p:nvGrpSpPr>
+        <p:cNvPr id="1" name=""/>
+        <p:cNvGrpSpPr/>
+        <p:nvPr/>
+      </p:nvGrpSpPr>
+      <p:grpSpPr>
+        <a:xfrm>
+          <a:off x="0" y="0"/>
+          <a:ext cx="0" cy="0"/>
+          <a:chOff x="0" y="0"/>
+          <a:chExt cx="0" cy="0"/>
+        </a:xfrm>
+      </p:grpSpPr>
+      <p:sp>
+        <p:nvSpPr>
+          <p:cNvPr id="7" name="Rectangle 6">
+            <a:extLst>
+              <a:ext uri="{FF2B5EF4-FFF2-40B4-BE49-F238E27FC236}">
+                <a16:creationId xmlns:a16="http://schemas.microsoft.com/office/drawing/2014/main" id="{E374BAB0-D569-4A3B-B4CD-86201611567C}"/>
+              </a:ext>
+            </a:extLst>
+          </p:cNvPr>
+          <p:cNvSpPr/>
+          <p:nvPr/>
+        </p:nvSpPr>
+        <p:spPr>
+          <a:xfrm>
+            <a:off x="312886" y="858069"/>
+            <a:ext cx="4860625" cy="3770263"/>
+          </a:xfrm>
+          <a:prstGeom prst="rect">
+            <a:avLst/>
+          </a:prstGeom>
+          <a:noFill/>
+          <a:effectLst>
+            <a:outerShdw blurRad="25400" dist="101600" dir="2700000" algn="tl" rotWithShape="0">
+              <a:srgbClr val="FFC000"/>
+            </a:outerShdw>
+          </a:effectLst>
+        </p:spPr>
+        <p:txBody>
+          <a:bodyPr wrap="none" lIns="91440" tIns="45720" rIns="91440" bIns="45720" anchor="ctr">
+            <a:spAutoFit/>
+            <a:scene3d>
+              <a:camera prst="orthographicFront"/>
+              <a:lightRig rig="soft" dir="t">
+                <a:rot lat="0" lon="0" rev="15600000"/>
+              </a:lightRig>
+            </a:scene3d>
+            <a:sp3d extrusionH="57150" prstMaterial="softEdge">
+              <a:bevelT w="25400" h="38100"/>
+            </a:sp3d>
+          </a:bodyPr>
+          <a:lstStyle/>
+          <a:p>
+            <a:pPr algn="ctr"/>
+            <a:r>
+              <a:rPr lang="en-US" sz="23900" cap="small" dirty="0">
+                <a:ln/>
+                <a:solidFill>
+                  <a:schemeClr val="accent1">
+                    <a:lumMod val="50000"/>
+                  </a:schemeClr>
+                </a:solidFill>
+                <a:latin typeface="Abadi" panose="020B0604020104020204" pitchFamily="34" charset="0"/>
+              </a:rPr>
+              <a:t>App</a:t>
+            </a:r>
+            <a:endParaRPr lang="en-US" sz="23900" cap="small" spc="0" dirty="0">
+              <a:ln/>
+              <a:solidFill>
+                <a:schemeClr val="accent1">
+                  <a:lumMod val="50000"/>
+                </a:schemeClr>
+              </a:solidFill>
+              <a:effectLst/>
+              <a:latin typeface="Abadi" panose="020B0604020104020204" pitchFamily="34" charset="0"/>
+            </a:endParaRPr>
+          </a:p>
+        </p:txBody>
+      </p:sp>
+    </p:spTree>
+    <p:extLst>
+      <p:ext uri="{BB962C8B-B14F-4D97-AF65-F5344CB8AC3E}">
+        <p14:creationId xmlns:p14="http://schemas.microsoft.com/office/powerpoint/2010/main" val="410005468"/>
+      </p:ext>
+    </p:extLst>
+  </p:cSld>
+  <p:clrMapOvr>
+    <a:masterClrMapping/>
+  </p:clrMapOvr>
+</p:sld>
+</file>
+
+<file path=ppt/slides/slide8.xml><?xml version="1.0" encoding="utf-8"?>
+<p:sld xmlns:a="http://schemas.openxmlformats.org/drawingml/2006/main" xmlns:r="http://schemas.openxmlformats.org/officeDocument/2006/relationships" xmlns:p="http://schemas.openxmlformats.org/presentationml/2006/main">
+  <p:cSld>
+    <p:spTree>
+      <p:nvGrpSpPr>
+        <p:cNvPr id="1" name=""/>
+        <p:cNvGrpSpPr/>
+        <p:nvPr/>
+      </p:nvGrpSpPr>
+      <p:grpSpPr>
+        <a:xfrm>
+          <a:off x="0" y="0"/>
+          <a:ext cx="0" cy="0"/>
+          <a:chOff x="0" y="0"/>
+          <a:chExt cx="0" cy="0"/>
+        </a:xfrm>
+      </p:grpSpPr>
+      <p:sp>
+        <p:nvSpPr>
+          <p:cNvPr id="7" name="Rectangle 6">
+            <a:extLst>
+              <a:ext uri="{FF2B5EF4-FFF2-40B4-BE49-F238E27FC236}">
+                <a16:creationId xmlns:a16="http://schemas.microsoft.com/office/drawing/2014/main" id="{E374BAB0-D569-4A3B-B4CD-86201611567C}"/>
+              </a:ext>
+            </a:extLst>
+          </p:cNvPr>
+          <p:cNvSpPr/>
+          <p:nvPr/>
+        </p:nvSpPr>
+        <p:spPr>
+          <a:xfrm>
+            <a:off x="848290" y="858069"/>
+            <a:ext cx="3789819" cy="3770263"/>
+          </a:xfrm>
+          <a:prstGeom prst="rect">
+            <a:avLst/>
+          </a:prstGeom>
+          <a:noFill/>
+          <a:effectLst>
+            <a:outerShdw blurRad="25400" dist="101600" dir="2700000" algn="tl" rotWithShape="0">
+              <a:srgbClr val="FFC000"/>
+            </a:outerShdw>
+          </a:effectLst>
+        </p:spPr>
+        <p:txBody>
+          <a:bodyPr wrap="none" lIns="91440" tIns="45720" rIns="91440" bIns="45720" anchor="ctr">
+            <a:spAutoFit/>
+            <a:scene3d>
+              <a:camera prst="orthographicFront"/>
+              <a:lightRig rig="soft" dir="t">
+                <a:rot lat="0" lon="0" rev="15600000"/>
+              </a:lightRig>
+            </a:scene3d>
+            <a:sp3d extrusionH="57150" prstMaterial="softEdge">
+              <a:bevelT w="25400" h="38100"/>
+            </a:sp3d>
+          </a:bodyPr>
+          <a:lstStyle/>
+          <a:p>
+            <a:pPr algn="ctr"/>
+            <a:r>
+              <a:rPr lang="en-US" sz="23900" cap="small" dirty="0">
+                <a:ln/>
+                <a:solidFill>
+                  <a:schemeClr val="accent1">
+                    <a:lumMod val="50000"/>
+                  </a:schemeClr>
+                </a:solidFill>
+                <a:latin typeface="Abadi" panose="020B0604020104020204" pitchFamily="34" charset="0"/>
+              </a:rPr>
+              <a:t>Lib</a:t>
+            </a:r>
+            <a:endParaRPr lang="en-US" sz="23900" cap="small" spc="0" dirty="0">
+              <a:ln/>
+              <a:solidFill>
+                <a:schemeClr val="accent1">
+                  <a:lumMod val="50000"/>
+                </a:schemeClr>
+              </a:solidFill>
+              <a:effectLst/>
+              <a:latin typeface="Abadi" panose="020B0604020104020204" pitchFamily="34" charset="0"/>
+            </a:endParaRPr>
+          </a:p>
+        </p:txBody>
+      </p:sp>
+    </p:spTree>
+    <p:extLst>
+      <p:ext uri="{BB962C8B-B14F-4D97-AF65-F5344CB8AC3E}">
+        <p14:creationId xmlns:p14="http://schemas.microsoft.com/office/powerpoint/2010/main" val="1066145922"/>
       </p:ext>
     </p:extLst>
   </p:cSld>

</xml_diff>

<commit_message>
added project info dialog
</commit_message>
<xml_diff>
--- a/resources/icons.pptx
+++ b/resources/icons.pptx
@@ -5,7 +5,7 @@
     <p:sldMasterId id="2147483672" r:id="rId1"/>
   </p:sldMasterIdLst>
   <p:notesMasterIdLst>
-    <p:notesMasterId r:id="rId10"/>
+    <p:notesMasterId r:id="rId14"/>
   </p:notesMasterIdLst>
   <p:sldIdLst>
     <p:sldId id="277" r:id="rId2"/>
@@ -16,6 +16,10 @@
     <p:sldId id="282" r:id="rId7"/>
     <p:sldId id="283" r:id="rId8"/>
     <p:sldId id="284" r:id="rId9"/>
+    <p:sldId id="285" r:id="rId10"/>
+    <p:sldId id="287" r:id="rId11"/>
+    <p:sldId id="286" r:id="rId12"/>
+    <p:sldId id="288" r:id="rId13"/>
   </p:sldIdLst>
   <p:sldSz cx="5486400" cy="5486400"/>
   <p:notesSz cx="6858000" cy="9144000"/>
@@ -882,6 +886,90 @@
     <p:extLst>
       <p:ext uri="{BB962C8B-B14F-4D97-AF65-F5344CB8AC3E}">
         <p14:creationId xmlns:p14="http://schemas.microsoft.com/office/powerpoint/2010/main" val="89610565"/>
+      </p:ext>
+    </p:extLst>
+  </p:cSld>
+  <p:clrMapOvr>
+    <a:masterClrMapping/>
+  </p:clrMapOvr>
+</p:notes>
+</file>
+
+<file path=ppt/notesSlides/notesSlide6.xml><?xml version="1.0" encoding="utf-8"?>
+<p:notes xmlns:a="http://schemas.openxmlformats.org/drawingml/2006/main" xmlns:r="http://schemas.openxmlformats.org/officeDocument/2006/relationships" xmlns:p="http://schemas.openxmlformats.org/presentationml/2006/main">
+  <p:cSld>
+    <p:spTree>
+      <p:nvGrpSpPr>
+        <p:cNvPr id="1" name=""/>
+        <p:cNvGrpSpPr/>
+        <p:nvPr/>
+      </p:nvGrpSpPr>
+      <p:grpSpPr>
+        <a:xfrm>
+          <a:off x="0" y="0"/>
+          <a:ext cx="0" cy="0"/>
+          <a:chOff x="0" y="0"/>
+          <a:chExt cx="0" cy="0"/>
+        </a:xfrm>
+      </p:grpSpPr>
+      <p:sp>
+        <p:nvSpPr>
+          <p:cNvPr id="2" name="Slide Image Placeholder 1"/>
+          <p:cNvSpPr>
+            <a:spLocks noGrp="1" noRot="1" noChangeAspect="1"/>
+          </p:cNvSpPr>
+          <p:nvPr>
+            <p:ph type="sldImg"/>
+          </p:nvPr>
+        </p:nvSpPr>
+        <p:spPr/>
+      </p:sp>
+      <p:sp>
+        <p:nvSpPr>
+          <p:cNvPr id="3" name="Notes Placeholder 2"/>
+          <p:cNvSpPr>
+            <a:spLocks noGrp="1"/>
+          </p:cNvSpPr>
+          <p:nvPr>
+            <p:ph type="body" idx="1"/>
+          </p:nvPr>
+        </p:nvSpPr>
+        <p:spPr/>
+        <p:txBody>
+          <a:bodyPr/>
+          <a:lstStyle/>
+          <a:p>
+            <a:endParaRPr lang="en-US" dirty="0"/>
+          </a:p>
+        </p:txBody>
+      </p:sp>
+      <p:sp>
+        <p:nvSpPr>
+          <p:cNvPr id="4" name="Slide Number Placeholder 3"/>
+          <p:cNvSpPr>
+            <a:spLocks noGrp="1"/>
+          </p:cNvSpPr>
+          <p:nvPr>
+            <p:ph type="sldNum" sz="quarter" idx="10"/>
+          </p:nvPr>
+        </p:nvSpPr>
+        <p:spPr/>
+        <p:txBody>
+          <a:bodyPr/>
+          <a:lstStyle/>
+          <a:p>
+            <a:fld id="{EE6CE23A-BB01-46B4-BDD6-2DE3EFA83C70}" type="slidenum">
+              <a:rPr lang="en-US" smtClean="0"/>
+              <a:t>9</a:t>
+            </a:fld>
+            <a:endParaRPr lang="en-US"/>
+          </a:p>
+        </p:txBody>
+      </p:sp>
+    </p:spTree>
+    <p:extLst>
+      <p:ext uri="{BB962C8B-B14F-4D97-AF65-F5344CB8AC3E}">
+        <p14:creationId xmlns:p14="http://schemas.microsoft.com/office/powerpoint/2010/main" val="101664225"/>
       </p:ext>
     </p:extLst>
   </p:cSld>
@@ -3921,6 +4009,592 @@
 </p:sld>
 </file>
 
+<file path=ppt/slides/slide10.xml><?xml version="1.0" encoding="utf-8"?>
+<p:sld xmlns:a="http://schemas.openxmlformats.org/drawingml/2006/main" xmlns:r="http://schemas.openxmlformats.org/officeDocument/2006/relationships" xmlns:p="http://schemas.openxmlformats.org/presentationml/2006/main">
+  <p:cSld>
+    <p:spTree>
+      <p:nvGrpSpPr>
+        <p:cNvPr id="1" name=""/>
+        <p:cNvGrpSpPr/>
+        <p:nvPr/>
+      </p:nvGrpSpPr>
+      <p:grpSpPr>
+        <a:xfrm>
+          <a:off x="0" y="0"/>
+          <a:ext cx="0" cy="0"/>
+          <a:chOff x="0" y="0"/>
+          <a:chExt cx="0" cy="0"/>
+        </a:xfrm>
+      </p:grpSpPr>
+      <p:grpSp>
+        <p:nvGrpSpPr>
+          <p:cNvPr id="4" name="Group 3">
+            <a:extLst>
+              <a:ext uri="{FF2B5EF4-FFF2-40B4-BE49-F238E27FC236}">
+                <a16:creationId xmlns:a16="http://schemas.microsoft.com/office/drawing/2014/main" id="{B9420A6E-866A-4423-85E6-D0E6DCA87756}"/>
+              </a:ext>
+            </a:extLst>
+          </p:cNvPr>
+          <p:cNvGrpSpPr/>
+          <p:nvPr/>
+        </p:nvGrpSpPr>
+        <p:grpSpPr>
+          <a:xfrm>
+            <a:off x="1000815" y="527352"/>
+            <a:ext cx="3937025" cy="4128827"/>
+            <a:chOff x="772220" y="424114"/>
+            <a:chExt cx="3937025" cy="4128827"/>
+          </a:xfrm>
+        </p:grpSpPr>
+        <mc:AlternateContent xmlns:mc="http://schemas.openxmlformats.org/markup-compatibility/2006" xmlns:am3d="http://schemas.microsoft.com/office/drawing/2017/model3d">
+          <mc:Choice Requires="am3d">
+            <p:graphicFrame>
+              <p:nvGraphicFramePr>
+                <p:cNvPr id="8" name="3D Model 7" descr="Light Gray Cube">
+                  <a:extLst>
+                    <a:ext uri="{FF2B5EF4-FFF2-40B4-BE49-F238E27FC236}">
+                      <a16:creationId xmlns:a16="http://schemas.microsoft.com/office/drawing/2014/main" id="{69F1E340-AB0C-47C0-B827-8B634C558014}"/>
+                    </a:ext>
+                  </a:extLst>
+                </p:cNvPr>
+                <p:cNvGraphicFramePr>
+                  <a:graphicFrameLocks noChangeAspect="1"/>
+                </p:cNvGraphicFramePr>
+                <p:nvPr>
+                  <p:extLst>
+                    <p:ext uri="{D42A27DB-BD31-4B8C-83A1-F6EECF244321}">
+                      <p14:modId xmlns:p14="http://schemas.microsoft.com/office/powerpoint/2010/main" val="3386929070"/>
+                    </p:ext>
+                  </p:extLst>
+                </p:nvPr>
+              </p:nvGraphicFramePr>
+              <p:xfrm>
+                <a:off x="800531" y="424114"/>
+                <a:ext cx="3657600" cy="4128827"/>
+              </p:xfrm>
+              <a:graphic>
+                <a:graphicData uri="http://schemas.microsoft.com/office/drawing/2017/model3d">
+                  <am3d:model3d r:embed="rId2">
+                    <am3d:spPr>
+                      <a:xfrm>
+                        <a:off x="0" y="0"/>
+                        <a:ext cx="3657600" cy="4128827"/>
+                      </a:xfrm>
+                      <a:prstGeom prst="rect">
+                        <a:avLst/>
+                      </a:prstGeom>
+                    </am3d:spPr>
+                    <am3d:camera>
+                      <am3d:pos x="0" y="0" z="81469193"/>
+                      <am3d:up dx="0" dy="36000000" dz="0"/>
+                      <am3d:lookAt x="0" y="0" z="0"/>
+                      <am3d:perspective fov="2700000"/>
+                    </am3d:camera>
+                    <am3d:trans>
+                      <am3d:meterPerModelUnit n="7140529" d="1000000"/>
+                      <am3d:preTrans dx="0" dy="-17999995" dz="5866"/>
+                      <am3d:scale>
+                        <am3d:sx n="1000000" d="1000000"/>
+                        <am3d:sy n="1000000" d="1000000"/>
+                        <am3d:sz n="1000000" d="1000000"/>
+                      </am3d:scale>
+                      <am3d:rot ax="2343375" ay="-1887805" az="-1377214"/>
+                      <am3d:postTrans dx="0" dy="0" dz="0"/>
+                    </am3d:trans>
+                    <am3d:attrSrcUrl r:id="rId3"/>
+                    <am3d:raster rName="Office3DRenderer" rVer="16.0.8326">
+                      <am3d:blip r:embed="rId4"/>
+                    </am3d:raster>
+                    <am3d:objViewport viewportSz="4151414"/>
+                    <am3d:ambientLight>
+                      <am3d:clr>
+                        <a:scrgbClr r="50000" g="50000" b="50000"/>
+                      </am3d:clr>
+                      <am3d:illuminance n="500000" d="1000000"/>
+                    </am3d:ambientLight>
+                    <am3d:ptLight rad="0">
+                      <am3d:clr>
+                        <a:scrgbClr r="100000" g="75000" b="50000"/>
+                      </am3d:clr>
+                      <am3d:intensity n="9765625" d="1000000"/>
+                      <am3d:pos x="21959998" y="70920001" z="16344003"/>
+                    </am3d:ptLight>
+                    <am3d:ptLight rad="0">
+                      <am3d:clr>
+                        <a:scrgbClr r="40000" g="60000" b="95000"/>
+                      </am3d:clr>
+                      <am3d:intensity n="12250000" d="1000000"/>
+                      <am3d:pos x="-37964106" y="51130435" z="57631972"/>
+                    </am3d:ptLight>
+                    <am3d:ptLight rad="0">
+                      <am3d:clr>
+                        <a:scrgbClr r="86837" g="72700" b="100000"/>
+                      </am3d:clr>
+                      <am3d:intensity n="3125000" d="1000000"/>
+                      <am3d:pos x="-37739122" y="58056624" z="-34769649"/>
+                    </am3d:ptLight>
+                  </am3d:model3d>
+                </a:graphicData>
+              </a:graphic>
+            </p:graphicFrame>
+          </mc:Choice>
+          <mc:Fallback xmlns="">
+            <p:pic>
+              <p:nvPicPr>
+                <p:cNvPr id="8" name="3D Model 7" descr="Light Gray Cube">
+                  <a:extLst>
+                    <a:ext uri="{FF2B5EF4-FFF2-40B4-BE49-F238E27FC236}">
+                      <a16:creationId xmlns:a16="http://schemas.microsoft.com/office/drawing/2014/main" id="{69F1E340-AB0C-47C0-B827-8B634C558014}"/>
+                    </a:ext>
+                  </a:extLst>
+                </p:cNvPr>
+                <p:cNvPicPr>
+                  <a:picLocks noGrp="1" noRot="1" noChangeAspect="1" noMove="1" noResize="1" noEditPoints="1" noAdjustHandles="1" noChangeArrowheads="1" noChangeShapeType="1" noCrop="1"/>
+                </p:cNvPicPr>
+                <p:nvPr/>
+              </p:nvPicPr>
+              <p:blipFill>
+                <a:blip r:embed="rId5"/>
+                <a:stretch>
+                  <a:fillRect/>
+                </a:stretch>
+              </p:blipFill>
+              <p:spPr>
+                <a:xfrm>
+                  <a:off x="1029126" y="527352"/>
+                  <a:ext cx="3657600" cy="4128827"/>
+                </a:xfrm>
+                <a:prstGeom prst="rect">
+                  <a:avLst/>
+                </a:prstGeom>
+              </p:spPr>
+            </p:pic>
+          </mc:Fallback>
+        </mc:AlternateContent>
+        <p:sp>
+          <p:nvSpPr>
+            <p:cNvPr id="12" name="Rectangle 11">
+              <a:extLst>
+                <a:ext uri="{FF2B5EF4-FFF2-40B4-BE49-F238E27FC236}">
+                  <a16:creationId xmlns:a16="http://schemas.microsoft.com/office/drawing/2014/main" id="{B779E194-FD56-48F7-9185-B67C72A68069}"/>
+                </a:ext>
+              </a:extLst>
+            </p:cNvPr>
+            <p:cNvSpPr/>
+            <p:nvPr/>
+          </p:nvSpPr>
+          <p:spPr>
+            <a:xfrm>
+              <a:off x="1438992" y="475039"/>
+              <a:ext cx="2330245" cy="2094271"/>
+            </a:xfrm>
+            <a:prstGeom prst="rect">
+              <a:avLst/>
+            </a:prstGeom>
+            <a:noFill/>
+            <a:ln>
+              <a:noFill/>
+            </a:ln>
+            <a:scene3d>
+              <a:camera prst="orthographicFront">
+                <a:rot lat="2552741" lon="18598819" rev="18001557"/>
+              </a:camera>
+              <a:lightRig rig="threePt" dir="t"/>
+            </a:scene3d>
+          </p:spPr>
+          <p:style>
+            <a:lnRef idx="2">
+              <a:schemeClr val="accent1">
+                <a:shade val="50000"/>
+              </a:schemeClr>
+            </a:lnRef>
+            <a:fillRef idx="1">
+              <a:schemeClr val="accent1"/>
+            </a:fillRef>
+            <a:effectRef idx="0">
+              <a:schemeClr val="accent1"/>
+            </a:effectRef>
+            <a:fontRef idx="minor">
+              <a:schemeClr val="lt1"/>
+            </a:fontRef>
+          </p:style>
+          <p:txBody>
+            <a:bodyPr rtlCol="0" anchor="ctr"/>
+            <a:lstStyle/>
+            <a:p>
+              <a:pPr algn="ctr"/>
+              <a:r>
+                <a:rPr lang="en-US" sz="13800" b="1" dirty="0">
+                  <a:solidFill>
+                    <a:srgbClr val="FFC000"/>
+                  </a:solidFill>
+                </a:rPr>
+                <a:t>O</a:t>
+              </a:r>
+            </a:p>
+          </p:txBody>
+        </p:sp>
+        <p:sp>
+          <p:nvSpPr>
+            <p:cNvPr id="13" name="Rectangle 12">
+              <a:extLst>
+                <a:ext uri="{FF2B5EF4-FFF2-40B4-BE49-F238E27FC236}">
+                  <a16:creationId xmlns:a16="http://schemas.microsoft.com/office/drawing/2014/main" id="{2D4A6298-119B-4C3C-A96D-4EF645ABA848}"/>
+                </a:ext>
+              </a:extLst>
+            </p:cNvPr>
+            <p:cNvSpPr/>
+            <p:nvPr/>
+          </p:nvSpPr>
+          <p:spPr>
+            <a:xfrm>
+              <a:off x="772220" y="1899454"/>
+              <a:ext cx="2330245" cy="2094271"/>
+            </a:xfrm>
+            <a:prstGeom prst="rect">
+              <a:avLst/>
+            </a:prstGeom>
+            <a:noFill/>
+            <a:ln>
+              <a:noFill/>
+            </a:ln>
+            <a:scene3d>
+              <a:camera prst="orthographicFront">
+                <a:rot lat="2257826" lon="2547079" rev="122781"/>
+              </a:camera>
+              <a:lightRig rig="threePt" dir="t"/>
+            </a:scene3d>
+          </p:spPr>
+          <p:style>
+            <a:lnRef idx="2">
+              <a:schemeClr val="accent1">
+                <a:shade val="50000"/>
+              </a:schemeClr>
+            </a:lnRef>
+            <a:fillRef idx="1">
+              <a:schemeClr val="accent1"/>
+            </a:fillRef>
+            <a:effectRef idx="0">
+              <a:schemeClr val="accent1"/>
+            </a:effectRef>
+            <a:fontRef idx="minor">
+              <a:schemeClr val="lt1"/>
+            </a:fontRef>
+          </p:style>
+          <p:txBody>
+            <a:bodyPr rtlCol="0" anchor="ctr"/>
+            <a:lstStyle/>
+            <a:p>
+              <a:pPr algn="ctr"/>
+              <a:r>
+                <a:rPr lang="en-US" sz="13800" b="1" dirty="0">
+                  <a:solidFill>
+                    <a:srgbClr val="FFC000"/>
+                  </a:solidFill>
+                </a:rPr>
+                <a:t>B</a:t>
+              </a:r>
+            </a:p>
+          </p:txBody>
+        </p:sp>
+        <p:sp>
+          <p:nvSpPr>
+            <p:cNvPr id="14" name="Rectangle 13">
+              <a:extLst>
+                <a:ext uri="{FF2B5EF4-FFF2-40B4-BE49-F238E27FC236}">
+                  <a16:creationId xmlns:a16="http://schemas.microsoft.com/office/drawing/2014/main" id="{AB28A863-3C07-4F2F-A811-39CE88F0F90E}"/>
+                </a:ext>
+              </a:extLst>
+            </p:cNvPr>
+            <p:cNvSpPr/>
+            <p:nvPr/>
+          </p:nvSpPr>
+          <p:spPr>
+            <a:xfrm>
+              <a:off x="2379000" y="1801783"/>
+              <a:ext cx="2330245" cy="2094271"/>
+            </a:xfrm>
+            <a:prstGeom prst="rect">
+              <a:avLst/>
+            </a:prstGeom>
+            <a:noFill/>
+            <a:ln>
+              <a:noFill/>
+            </a:ln>
+            <a:scene3d>
+              <a:camera prst="orthographicFront">
+                <a:rot lat="2069043" lon="18063368" rev="21329114"/>
+              </a:camera>
+              <a:lightRig rig="threePt" dir="t"/>
+            </a:scene3d>
+          </p:spPr>
+          <p:style>
+            <a:lnRef idx="2">
+              <a:schemeClr val="accent1">
+                <a:shade val="50000"/>
+              </a:schemeClr>
+            </a:lnRef>
+            <a:fillRef idx="1">
+              <a:schemeClr val="accent1"/>
+            </a:fillRef>
+            <a:effectRef idx="0">
+              <a:schemeClr val="accent1"/>
+            </a:effectRef>
+            <a:fontRef idx="minor">
+              <a:schemeClr val="lt1"/>
+            </a:fontRef>
+          </p:style>
+          <p:txBody>
+            <a:bodyPr rtlCol="0" anchor="ctr"/>
+            <a:lstStyle/>
+            <a:p>
+              <a:pPr algn="ctr"/>
+              <a:r>
+                <a:rPr lang="en-US" sz="13800" b="1" dirty="0">
+                  <a:solidFill>
+                    <a:srgbClr val="FFC000"/>
+                  </a:solidFill>
+                </a:rPr>
+                <a:t>S</a:t>
+              </a:r>
+            </a:p>
+          </p:txBody>
+        </p:sp>
+      </p:grpSp>
+    </p:spTree>
+    <p:extLst>
+      <p:ext uri="{BB962C8B-B14F-4D97-AF65-F5344CB8AC3E}">
+        <p14:creationId xmlns:p14="http://schemas.microsoft.com/office/powerpoint/2010/main" val="2448726400"/>
+      </p:ext>
+    </p:extLst>
+  </p:cSld>
+  <p:clrMapOvr>
+    <a:masterClrMapping/>
+  </p:clrMapOvr>
+</p:sld>
+</file>
+
+<file path=ppt/slides/slide11.xml><?xml version="1.0" encoding="utf-8"?>
+<p:sld xmlns:a="http://schemas.openxmlformats.org/drawingml/2006/main" xmlns:r="http://schemas.openxmlformats.org/officeDocument/2006/relationships" xmlns:p="http://schemas.openxmlformats.org/presentationml/2006/main">
+  <p:cSld>
+    <p:spTree>
+      <p:nvGrpSpPr>
+        <p:cNvPr id="1" name=""/>
+        <p:cNvGrpSpPr/>
+        <p:nvPr/>
+      </p:nvGrpSpPr>
+      <p:grpSpPr>
+        <a:xfrm>
+          <a:off x="0" y="0"/>
+          <a:ext cx="0" cy="0"/>
+          <a:chOff x="0" y="0"/>
+          <a:chExt cx="0" cy="0"/>
+        </a:xfrm>
+      </p:grpSpPr>
+      <p:pic>
+        <p:nvPicPr>
+          <p:cNvPr id="3" name="Picture 2">
+            <a:extLst>
+              <a:ext uri="{FF2B5EF4-FFF2-40B4-BE49-F238E27FC236}">
+                <a16:creationId xmlns:a16="http://schemas.microsoft.com/office/drawing/2014/main" id="{0D34F097-D281-4C5D-B750-5E6882FD3A8F}"/>
+              </a:ext>
+            </a:extLst>
+          </p:cNvPr>
+          <p:cNvPicPr>
+            <a:picLocks noChangeAspect="1"/>
+          </p:cNvPicPr>
+          <p:nvPr/>
+        </p:nvPicPr>
+        <p:blipFill>
+          <a:blip r:embed="rId2">
+            <a:extLst>
+              <a:ext uri="{28A0092B-C50C-407E-A947-70E740481C1C}">
+                <a14:useLocalDpi xmlns:a14="http://schemas.microsoft.com/office/drawing/2010/main" val="0"/>
+              </a:ext>
+            </a:extLst>
+          </a:blip>
+          <a:stretch>
+            <a:fillRect/>
+          </a:stretch>
+        </p:blipFill>
+        <p:spPr>
+          <a:xfrm>
+            <a:off x="548640" y="548640"/>
+            <a:ext cx="4389120" cy="4389120"/>
+          </a:xfrm>
+          <a:prstGeom prst="rect">
+            <a:avLst/>
+          </a:prstGeom>
+        </p:spPr>
+      </p:pic>
+      <p:sp>
+        <p:nvSpPr>
+          <p:cNvPr id="5" name="TextBox 4">
+            <a:extLst>
+              <a:ext uri="{FF2B5EF4-FFF2-40B4-BE49-F238E27FC236}">
+                <a16:creationId xmlns:a16="http://schemas.microsoft.com/office/drawing/2014/main" id="{1A8D0982-E7FE-478C-B369-E2828A9DDEF6}"/>
+              </a:ext>
+            </a:extLst>
+          </p:cNvPr>
+          <p:cNvSpPr txBox="1"/>
+          <p:nvPr/>
+        </p:nvSpPr>
+        <p:spPr>
+          <a:xfrm>
+            <a:off x="4142681" y="2296563"/>
+            <a:ext cx="1205779" cy="3770263"/>
+          </a:xfrm>
+          <a:prstGeom prst="rect">
+            <a:avLst/>
+          </a:prstGeom>
+          <a:noFill/>
+        </p:spPr>
+        <p:txBody>
+          <a:bodyPr wrap="none" rtlCol="0">
+            <a:spAutoFit/>
+          </a:bodyPr>
+          <a:lstStyle/>
+          <a:p>
+            <a:r>
+              <a:rPr lang="en-US" sz="23900" b="1" dirty="0" err="1">
+                <a:solidFill>
+                  <a:schemeClr val="accent1">
+                    <a:lumMod val="50000"/>
+                  </a:schemeClr>
+                </a:solidFill>
+                <a:latin typeface="Book Antiqua" panose="02040602050305030304" pitchFamily="18" charset="0"/>
+              </a:rPr>
+              <a:t>i</a:t>
+            </a:r>
+            <a:endParaRPr lang="en-US" sz="23900" b="1" dirty="0">
+              <a:solidFill>
+                <a:schemeClr val="accent1">
+                  <a:lumMod val="50000"/>
+                </a:schemeClr>
+              </a:solidFill>
+              <a:latin typeface="Book Antiqua" panose="02040602050305030304" pitchFamily="18" charset="0"/>
+            </a:endParaRPr>
+          </a:p>
+        </p:txBody>
+      </p:sp>
+    </p:spTree>
+    <p:extLst>
+      <p:ext uri="{BB962C8B-B14F-4D97-AF65-F5344CB8AC3E}">
+        <p14:creationId xmlns:p14="http://schemas.microsoft.com/office/powerpoint/2010/main" val="2917644879"/>
+      </p:ext>
+    </p:extLst>
+  </p:cSld>
+  <p:clrMapOvr>
+    <a:masterClrMapping/>
+  </p:clrMapOvr>
+</p:sld>
+</file>
+
+<file path=ppt/slides/slide12.xml><?xml version="1.0" encoding="utf-8"?>
+<p:sld xmlns:a="http://schemas.openxmlformats.org/drawingml/2006/main" xmlns:r="http://schemas.openxmlformats.org/officeDocument/2006/relationships" xmlns:p="http://schemas.openxmlformats.org/presentationml/2006/main">
+  <p:cSld>
+    <p:spTree>
+      <p:nvGrpSpPr>
+        <p:cNvPr id="1" name=""/>
+        <p:cNvGrpSpPr/>
+        <p:nvPr/>
+      </p:nvGrpSpPr>
+      <p:grpSpPr>
+        <a:xfrm>
+          <a:off x="0" y="0"/>
+          <a:ext cx="0" cy="0"/>
+          <a:chOff x="0" y="0"/>
+          <a:chExt cx="0" cy="0"/>
+        </a:xfrm>
+      </p:grpSpPr>
+      <p:pic>
+        <p:nvPicPr>
+          <p:cNvPr id="3" name="Picture 2">
+            <a:extLst>
+              <a:ext uri="{FF2B5EF4-FFF2-40B4-BE49-F238E27FC236}">
+                <a16:creationId xmlns:a16="http://schemas.microsoft.com/office/drawing/2014/main" id="{0D34F097-D281-4C5D-B750-5E6882FD3A8F}"/>
+              </a:ext>
+            </a:extLst>
+          </p:cNvPr>
+          <p:cNvPicPr>
+            <a:picLocks noChangeAspect="1"/>
+          </p:cNvPicPr>
+          <p:nvPr/>
+        </p:nvPicPr>
+        <p:blipFill>
+          <a:blip r:embed="rId2">
+            <a:extLst>
+              <a:ext uri="{28A0092B-C50C-407E-A947-70E740481C1C}">
+                <a14:useLocalDpi xmlns:a14="http://schemas.microsoft.com/office/drawing/2010/main" val="0"/>
+              </a:ext>
+            </a:extLst>
+          </a:blip>
+          <a:stretch>
+            <a:fillRect/>
+          </a:stretch>
+        </p:blipFill>
+        <p:spPr>
+          <a:xfrm>
+            <a:off x="548640" y="548640"/>
+            <a:ext cx="4389120" cy="4389120"/>
+          </a:xfrm>
+          <a:prstGeom prst="rect">
+            <a:avLst/>
+          </a:prstGeom>
+        </p:spPr>
+      </p:pic>
+      <p:pic>
+        <p:nvPicPr>
+          <p:cNvPr id="4" name="Graphic 3" descr="Chevron arrows">
+            <a:extLst>
+              <a:ext uri="{FF2B5EF4-FFF2-40B4-BE49-F238E27FC236}">
+                <a16:creationId xmlns:a16="http://schemas.microsoft.com/office/drawing/2014/main" id="{7D89515E-BF01-4862-977F-85B659E77726}"/>
+              </a:ext>
+            </a:extLst>
+          </p:cNvPr>
+          <p:cNvPicPr>
+            <a:picLocks/>
+          </p:cNvPicPr>
+          <p:nvPr/>
+        </p:nvPicPr>
+        <p:blipFill>
+          <a:blip r:embed="rId3">
+            <a:extLst>
+              <a:ext uri="{28A0092B-C50C-407E-A947-70E740481C1C}">
+                <a14:useLocalDpi xmlns:a14="http://schemas.microsoft.com/office/drawing/2010/main" val="0"/>
+              </a:ext>
+              <a:ext uri="{96DAC541-7B7A-43D3-8B79-37D633B846F1}">
+                <asvg:svgBlip xmlns:asvg="http://schemas.microsoft.com/office/drawing/2016/SVG/main" r:embed="rId4"/>
+              </a:ext>
+            </a:extLst>
+          </a:blip>
+          <a:stretch>
+            <a:fillRect/>
+          </a:stretch>
+        </p:blipFill>
+        <p:spPr>
+          <a:xfrm>
+            <a:off x="3751545" y="3050088"/>
+            <a:ext cx="1680993" cy="2793304"/>
+          </a:xfrm>
+          <a:prstGeom prst="rect">
+            <a:avLst/>
+          </a:prstGeom>
+        </p:spPr>
+      </p:pic>
+    </p:spTree>
+    <p:extLst>
+      <p:ext uri="{BB962C8B-B14F-4D97-AF65-F5344CB8AC3E}">
+        <p14:creationId xmlns:p14="http://schemas.microsoft.com/office/powerpoint/2010/main" val="3421487877"/>
+      </p:ext>
+    </p:extLst>
+  </p:cSld>
+  <p:clrMapOvr>
+    <a:masterClrMapping/>
+  </p:clrMapOvr>
+</p:sld>
+</file>
+
 <file path=ppt/slides/slide2.xml><?xml version="1.0" encoding="utf-8"?>
 <p:sld xmlns:a="http://schemas.openxmlformats.org/drawingml/2006/main" xmlns:r="http://schemas.openxmlformats.org/officeDocument/2006/relationships" xmlns:p="http://schemas.openxmlformats.org/presentationml/2006/main">
   <p:cSld>
@@ -6022,6 +6696,104 @@
     <p:extLst>
       <p:ext uri="{BB962C8B-B14F-4D97-AF65-F5344CB8AC3E}">
         <p14:creationId xmlns:p14="http://schemas.microsoft.com/office/powerpoint/2010/main" val="1066145922"/>
+      </p:ext>
+    </p:extLst>
+  </p:cSld>
+  <p:clrMapOvr>
+    <a:masterClrMapping/>
+  </p:clrMapOvr>
+</p:sld>
+</file>
+
+<file path=ppt/slides/slide9.xml><?xml version="1.0" encoding="utf-8"?>
+<p:sld xmlns:a="http://schemas.openxmlformats.org/drawingml/2006/main" xmlns:r="http://schemas.openxmlformats.org/officeDocument/2006/relationships" xmlns:p="http://schemas.openxmlformats.org/presentationml/2006/main">
+  <p:cSld>
+    <p:spTree>
+      <p:nvGrpSpPr>
+        <p:cNvPr id="1" name=""/>
+        <p:cNvGrpSpPr/>
+        <p:nvPr/>
+      </p:nvGrpSpPr>
+      <p:grpSpPr>
+        <a:xfrm>
+          <a:off x="0" y="0"/>
+          <a:ext cx="0" cy="0"/>
+          <a:chOff x="0" y="0"/>
+          <a:chExt cx="0" cy="0"/>
+        </a:xfrm>
+      </p:grpSpPr>
+      <p:sp>
+        <p:nvSpPr>
+          <p:cNvPr id="7" name="Rectangle 6">
+            <a:extLst>
+              <a:ext uri="{FF2B5EF4-FFF2-40B4-BE49-F238E27FC236}">
+                <a16:creationId xmlns:a16="http://schemas.microsoft.com/office/drawing/2014/main" id="{E374BAB0-D569-4A3B-B4CD-86201611567C}"/>
+              </a:ext>
+            </a:extLst>
+          </p:cNvPr>
+          <p:cNvSpPr/>
+          <p:nvPr/>
+        </p:nvSpPr>
+        <p:spPr>
+          <a:xfrm>
+            <a:off x="-10919" y="858069"/>
+            <a:ext cx="5508238" cy="3770263"/>
+          </a:xfrm>
+          <a:prstGeom prst="rect">
+            <a:avLst/>
+          </a:prstGeom>
+          <a:noFill/>
+          <a:effectLst>
+            <a:outerShdw blurRad="25400" dist="101600" dir="2700000" algn="tl" rotWithShape="0">
+              <a:srgbClr val="FFC000"/>
+            </a:outerShdw>
+          </a:effectLst>
+        </p:spPr>
+        <p:txBody>
+          <a:bodyPr wrap="none" lIns="91440" tIns="45720" rIns="91440" bIns="45720" anchor="ctr">
+            <a:spAutoFit/>
+            <a:scene3d>
+              <a:camera prst="orthographicFront"/>
+              <a:lightRig rig="soft" dir="t">
+                <a:rot lat="0" lon="0" rev="15600000"/>
+              </a:lightRig>
+            </a:scene3d>
+            <a:sp3d extrusionH="57150" prstMaterial="softEdge">
+              <a:bevelT w="25400" h="38100"/>
+            </a:sp3d>
+          </a:bodyPr>
+          <a:lstStyle/>
+          <a:p>
+            <a:pPr algn="ctr"/>
+            <a:r>
+              <a:rPr lang="en-US" sz="23900" cap="small" dirty="0">
+                <a:ln/>
+                <a:solidFill>
+                  <a:schemeClr val="accent1">
+                    <a:lumMod val="50000"/>
+                  </a:schemeClr>
+                </a:solidFill>
+                <a:latin typeface="Abadi" panose="020B0604020104020204" pitchFamily="34" charset="0"/>
+              </a:rPr>
+              <a:t>Info</a:t>
+            </a:r>
+            <a:endParaRPr lang="en-US" sz="23900" cap="small" spc="0" dirty="0">
+              <a:ln/>
+              <a:solidFill>
+                <a:schemeClr val="accent1">
+                  <a:lumMod val="50000"/>
+                </a:schemeClr>
+              </a:solidFill>
+              <a:effectLst/>
+              <a:latin typeface="Abadi" panose="020B0604020104020204" pitchFamily="34" charset="0"/>
+            </a:endParaRPr>
+          </a:p>
+        </p:txBody>
+      </p:sp>
+    </p:spTree>
+    <p:extLst>
+      <p:ext uri="{BB962C8B-B14F-4D97-AF65-F5344CB8AC3E}">
+        <p14:creationId xmlns:p14="http://schemas.microsoft.com/office/powerpoint/2010/main" val="1816550991"/>
       </p:ext>
     </p:extLst>
   </p:cSld>

</xml_diff>